<commit_message>
Updated for March 2017 session
</commit_message>
<xml_diff>
--- a/WelcomePresentation-SmartDevs.pptx
+++ b/WelcomePresentation-SmartDevs.pptx
@@ -5,7 +5,7 @@
     <p:sldMasterId id="2147483648" r:id="rId1"/>
   </p:sldMasterIdLst>
   <p:notesMasterIdLst>
-    <p:notesMasterId r:id="rId9"/>
+    <p:notesMasterId r:id="rId10"/>
   </p:notesMasterIdLst>
   <p:sldIdLst>
     <p:sldId id="256" r:id="rId2"/>
@@ -13,8 +13,9 @@
     <p:sldId id="257" r:id="rId4"/>
     <p:sldId id="268" r:id="rId5"/>
     <p:sldId id="272" r:id="rId6"/>
-    <p:sldId id="274" r:id="rId7"/>
-    <p:sldId id="269" r:id="rId8"/>
+    <p:sldId id="275" r:id="rId7"/>
+    <p:sldId id="274" r:id="rId8"/>
+    <p:sldId id="269" r:id="rId9"/>
   </p:sldIdLst>
   <p:sldSz cx="12192000" cy="6858000"/>
   <p:notesSz cx="6858000" cy="9144000"/>
@@ -214,7 +215,7 @@
           <a:p>
             <a:fld id="{8D928C90-A2F3-492C-9840-8080881BD1C3}" type="datetimeFigureOut">
               <a:rPr lang="en-GB" smtClean="0"/>
-              <a:t>13/02/2017</a:t>
+              <a:t>13/03/2017</a:t>
             </a:fld>
             <a:endParaRPr lang="en-GB"/>
           </a:p>
@@ -734,7 +735,96 @@
           <a:p>
             <a:fld id="{9E596088-AF84-4048-9612-0BD6F107496A}" type="slidenum">
               <a:rPr lang="en-GB" smtClean="0"/>
-              <a:t>7</a:t>
+              <a:t>6</a:t>
+            </a:fld>
+            <a:endParaRPr lang="en-GB"/>
+          </a:p>
+        </p:txBody>
+      </p:sp>
+    </p:spTree>
+    <p:extLst>
+      <p:ext uri="{BB962C8B-B14F-4D97-AF65-F5344CB8AC3E}">
+        <p14:creationId xmlns:p14="http://schemas.microsoft.com/office/powerpoint/2010/main" val="1084305320"/>
+      </p:ext>
+    </p:extLst>
+  </p:cSld>
+  <p:clrMapOvr>
+    <a:masterClrMapping/>
+  </p:clrMapOvr>
+</p:notes>
+</file>
+
+<file path=ppt/notesSlides/notesSlide4.xml><?xml version="1.0" encoding="utf-8"?>
+<p:notes xmlns:a="http://schemas.openxmlformats.org/drawingml/2006/main" xmlns:r="http://schemas.openxmlformats.org/officeDocument/2006/relationships" xmlns:p="http://schemas.openxmlformats.org/presentationml/2006/main">
+  <p:cSld>
+    <p:spTree>
+      <p:nvGrpSpPr>
+        <p:cNvPr id="1" name=""/>
+        <p:cNvGrpSpPr/>
+        <p:nvPr/>
+      </p:nvGrpSpPr>
+      <p:grpSpPr>
+        <a:xfrm>
+          <a:off x="0" y="0"/>
+          <a:ext cx="0" cy="0"/>
+          <a:chOff x="0" y="0"/>
+          <a:chExt cx="0" cy="0"/>
+        </a:xfrm>
+      </p:grpSpPr>
+      <p:sp>
+        <p:nvSpPr>
+          <p:cNvPr id="2" name="Slide Image Placeholder 1"/>
+          <p:cNvSpPr>
+            <a:spLocks noGrp="1" noRot="1" noChangeAspect="1"/>
+          </p:cNvSpPr>
+          <p:nvPr>
+            <p:ph type="sldImg"/>
+          </p:nvPr>
+        </p:nvSpPr>
+        <p:spPr>
+          <a:xfrm>
+            <a:off x="381000" y="685800"/>
+            <a:ext cx="6096000" cy="3429000"/>
+          </a:xfrm>
+        </p:spPr>
+      </p:sp>
+      <p:sp>
+        <p:nvSpPr>
+          <p:cNvPr id="3" name="Notes Placeholder 2"/>
+          <p:cNvSpPr>
+            <a:spLocks noGrp="1"/>
+          </p:cNvSpPr>
+          <p:nvPr>
+            <p:ph type="body" idx="1"/>
+          </p:nvPr>
+        </p:nvSpPr>
+        <p:spPr/>
+        <p:txBody>
+          <a:bodyPr/>
+          <a:lstStyle/>
+          <a:p>
+            <a:endParaRPr lang="en-GB" dirty="0"/>
+          </a:p>
+        </p:txBody>
+      </p:sp>
+      <p:sp>
+        <p:nvSpPr>
+          <p:cNvPr id="4" name="Slide Number Placeholder 3"/>
+          <p:cNvSpPr>
+            <a:spLocks noGrp="1"/>
+          </p:cNvSpPr>
+          <p:nvPr>
+            <p:ph type="sldNum" sz="quarter" idx="10"/>
+          </p:nvPr>
+        </p:nvSpPr>
+        <p:spPr/>
+        <p:txBody>
+          <a:bodyPr/>
+          <a:lstStyle/>
+          <a:p>
+            <a:fld id="{9E596088-AF84-4048-9612-0BD6F107496A}" type="slidenum">
+              <a:rPr lang="en-GB" smtClean="0"/>
+              <a:t>8</a:t>
             </a:fld>
             <a:endParaRPr lang="en-GB"/>
           </a:p>
@@ -935,7 +1025,7 @@
             <a:fld id="{8050458D-74A9-43CA-B6DD-6642C7D97BC8}" type="datetimeFigureOut">
               <a:rPr lang="en-US" smtClean="0"/>
               <a:pPr/>
-              <a:t>2/13/2017</a:t>
+              <a:t>3/13/2017</a:t>
             </a:fld>
             <a:endParaRPr lang="en-GB"/>
           </a:p>
@@ -1102,7 +1192,7 @@
             <a:fld id="{8050458D-74A9-43CA-B6DD-6642C7D97BC8}" type="datetimeFigureOut">
               <a:rPr lang="en-US" smtClean="0"/>
               <a:pPr/>
-              <a:t>2/13/2017</a:t>
+              <a:t>3/13/2017</a:t>
             </a:fld>
             <a:endParaRPr lang="en-GB"/>
           </a:p>
@@ -1279,7 +1369,7 @@
             <a:fld id="{8050458D-74A9-43CA-B6DD-6642C7D97BC8}" type="datetimeFigureOut">
               <a:rPr lang="en-US" smtClean="0"/>
               <a:pPr/>
-              <a:t>2/13/2017</a:t>
+              <a:t>3/13/2017</a:t>
             </a:fld>
             <a:endParaRPr lang="en-GB"/>
           </a:p>
@@ -1446,7 +1536,7 @@
             <a:fld id="{8050458D-74A9-43CA-B6DD-6642C7D97BC8}" type="datetimeFigureOut">
               <a:rPr lang="en-US" smtClean="0"/>
               <a:pPr/>
-              <a:t>2/13/2017</a:t>
+              <a:t>3/13/2017</a:t>
             </a:fld>
             <a:endParaRPr lang="en-GB"/>
           </a:p>
@@ -1689,7 +1779,7 @@
             <a:fld id="{8050458D-74A9-43CA-B6DD-6642C7D97BC8}" type="datetimeFigureOut">
               <a:rPr lang="en-US" smtClean="0"/>
               <a:pPr/>
-              <a:t>2/13/2017</a:t>
+              <a:t>3/13/2017</a:t>
             </a:fld>
             <a:endParaRPr lang="en-GB"/>
           </a:p>
@@ -1974,7 +2064,7 @@
             <a:fld id="{8050458D-74A9-43CA-B6DD-6642C7D97BC8}" type="datetimeFigureOut">
               <a:rPr lang="en-US" smtClean="0"/>
               <a:pPr/>
-              <a:t>2/13/2017</a:t>
+              <a:t>3/13/2017</a:t>
             </a:fld>
             <a:endParaRPr lang="en-GB"/>
           </a:p>
@@ -2393,7 +2483,7 @@
             <a:fld id="{8050458D-74A9-43CA-B6DD-6642C7D97BC8}" type="datetimeFigureOut">
               <a:rPr lang="en-US" smtClean="0"/>
               <a:pPr/>
-              <a:t>2/13/2017</a:t>
+              <a:t>3/13/2017</a:t>
             </a:fld>
             <a:endParaRPr lang="en-GB"/>
           </a:p>
@@ -2508,7 +2598,7 @@
             <a:fld id="{8050458D-74A9-43CA-B6DD-6642C7D97BC8}" type="datetimeFigureOut">
               <a:rPr lang="en-US" smtClean="0"/>
               <a:pPr/>
-              <a:t>2/13/2017</a:t>
+              <a:t>3/13/2017</a:t>
             </a:fld>
             <a:endParaRPr lang="en-GB"/>
           </a:p>
@@ -2600,7 +2690,7 @@
             <a:fld id="{8050458D-74A9-43CA-B6DD-6642C7D97BC8}" type="datetimeFigureOut">
               <a:rPr lang="en-US" smtClean="0"/>
               <a:pPr/>
-              <a:t>2/13/2017</a:t>
+              <a:t>3/13/2017</a:t>
             </a:fld>
             <a:endParaRPr lang="en-GB"/>
           </a:p>
@@ -2874,7 +2964,7 @@
             <a:fld id="{8050458D-74A9-43CA-B6DD-6642C7D97BC8}" type="datetimeFigureOut">
               <a:rPr lang="en-US" smtClean="0"/>
               <a:pPr/>
-              <a:t>2/13/2017</a:t>
+              <a:t>3/13/2017</a:t>
             </a:fld>
             <a:endParaRPr lang="en-GB"/>
           </a:p>
@@ -3124,7 +3214,7 @@
             <a:fld id="{8050458D-74A9-43CA-B6DD-6642C7D97BC8}" type="datetimeFigureOut">
               <a:rPr lang="en-US" smtClean="0"/>
               <a:pPr/>
-              <a:t>2/13/2017</a:t>
+              <a:t>3/13/2017</a:t>
             </a:fld>
             <a:endParaRPr lang="en-GB"/>
           </a:p>
@@ -3337,7 +3427,7 @@
             <a:fld id="{8050458D-74A9-43CA-B6DD-6642C7D97BC8}" type="datetimeFigureOut">
               <a:rPr lang="en-US" smtClean="0"/>
               <a:pPr/>
-              <a:t>2/13/2017</a:t>
+              <a:t>3/13/2017</a:t>
             </a:fld>
             <a:endParaRPr lang="en-GB"/>
           </a:p>
@@ -4943,177 +5033,142 @@
           </a:bodyPr>
           <a:lstStyle/>
           <a:p>
+            <a:pPr>
+              <a:spcBef>
+                <a:spcPct val="0"/>
+              </a:spcBef>
+              <a:defRPr/>
+            </a:pPr>
+            <a:r>
+              <a:rPr lang="en-GB" sz="6000" b="1" dirty="0">
+                <a:solidFill>
+                  <a:schemeClr val="bg1"/>
+                </a:solidFill>
+                <a:latin typeface="+mj-lt"/>
+                <a:ea typeface="+mj-ea"/>
+                <a:cs typeface="+mj-cs"/>
+              </a:rPr>
+              <a:t>Coming up</a:t>
+            </a:r>
+            <a:br>
+              <a:rPr lang="en-GB" sz="6000" b="1" dirty="0">
+                <a:solidFill>
+                  <a:schemeClr val="bg1"/>
+                </a:solidFill>
+                <a:latin typeface="+mj-lt"/>
+                <a:ea typeface="+mj-ea"/>
+                <a:cs typeface="+mj-cs"/>
+              </a:rPr>
+            </a:br>
+            <a:r>
+              <a:rPr lang="en-GB" sz="2800" b="1" dirty="0">
+                <a:solidFill>
+                  <a:schemeClr val="bg1"/>
+                </a:solidFill>
+                <a:latin typeface="+mj-lt"/>
+                <a:ea typeface="+mj-ea"/>
+                <a:cs typeface="+mj-cs"/>
+              </a:rPr>
+              <a:t>DevOps with Matteo Emili, we need a vote…</a:t>
+            </a:r>
+          </a:p>
+          <a:p>
+            <a:pPr>
+              <a:spcBef>
+                <a:spcPct val="0"/>
+              </a:spcBef>
+              <a:defRPr/>
+            </a:pPr>
+            <a:br>
+              <a:rPr lang="en-GB" sz="2800" b="1" dirty="0">
+                <a:solidFill>
+                  <a:schemeClr val="bg1"/>
+                </a:solidFill>
+                <a:latin typeface="+mj-lt"/>
+                <a:ea typeface="+mj-ea"/>
+                <a:cs typeface="+mj-cs"/>
+              </a:rPr>
+            </a:br>
+            <a:r>
+              <a:rPr lang="en-GB" b="1" dirty="0">
+                <a:solidFill>
+                  <a:schemeClr val="bg1"/>
+                </a:solidFill>
+                <a:latin typeface="+mj-lt"/>
+                <a:ea typeface="+mj-ea"/>
+                <a:cs typeface="+mj-cs"/>
+              </a:rPr>
+              <a:t>1. </a:t>
+            </a:r>
+            <a:r>
+              <a:rPr lang="en-GB" b="1" dirty="0">
+                <a:solidFill>
+                  <a:schemeClr val="bg1"/>
+                </a:solidFill>
+              </a:rPr>
+              <a:t>Hybrid DevOps stacks in action</a:t>
+            </a:r>
+          </a:p>
+          <a:p>
+            <a:pPr>
+              <a:spcBef>
+                <a:spcPct val="0"/>
+              </a:spcBef>
+              <a:defRPr/>
+            </a:pPr>
+            <a:r>
+              <a:rPr lang="en-GB" b="1" dirty="0">
+                <a:solidFill>
+                  <a:schemeClr val="bg1"/>
+                </a:solidFill>
+              </a:rPr>
+              <a:t>2. A year of </a:t>
+            </a:r>
+            <a:r>
+              <a:rPr lang="en-GB" b="1" dirty="0" err="1">
+                <a:solidFill>
+                  <a:schemeClr val="bg1"/>
+                </a:solidFill>
+              </a:rPr>
+              <a:t>SonarQube</a:t>
+            </a:r>
+            <a:r>
+              <a:rPr lang="en-GB" b="1" dirty="0">
+                <a:solidFill>
+                  <a:schemeClr val="bg1"/>
+                </a:solidFill>
+              </a:rPr>
+              <a:t> and TFS/VSTS: ten tips from the real world</a:t>
+            </a:r>
+          </a:p>
+          <a:p>
+            <a:pPr>
+              <a:spcBef>
+                <a:spcPct val="0"/>
+              </a:spcBef>
+              <a:defRPr/>
+            </a:pPr>
+            <a:r>
+              <a:rPr lang="en-GB" b="1" dirty="0">
+                <a:solidFill>
+                  <a:schemeClr val="bg1"/>
+                </a:solidFill>
+              </a:rPr>
+              <a:t>3. Packages as the first choice when deploying: how?</a:t>
+            </a:r>
+          </a:p>
+          <a:p>
             <a:pPr algn="ctr">
               <a:spcBef>
                 <a:spcPct val="0"/>
               </a:spcBef>
               <a:defRPr/>
             </a:pPr>
-            <a:r>
-              <a:rPr lang="en-GB" sz="6000" b="1" dirty="0">
-                <a:solidFill>
-                  <a:schemeClr val="bg1">
-                    <a:lumMod val="95000"/>
-                  </a:schemeClr>
-                </a:solidFill>
-                <a:latin typeface="+mj-lt"/>
-                <a:ea typeface="+mj-ea"/>
-                <a:cs typeface="+mj-cs"/>
-              </a:rPr>
-              <a:t>Coming up</a:t>
-            </a:r>
-            <a:br>
-              <a:rPr lang="en-GB" sz="6000" b="1" dirty="0">
-                <a:solidFill>
-                  <a:schemeClr val="bg1">
-                    <a:lumMod val="95000"/>
-                  </a:schemeClr>
-                </a:solidFill>
-                <a:latin typeface="+mj-lt"/>
-                <a:ea typeface="+mj-ea"/>
-                <a:cs typeface="+mj-cs"/>
-              </a:rPr>
-            </a:br>
-            <a:r>
-              <a:rPr lang="en-GB" sz="2800" b="1" dirty="0">
-                <a:solidFill>
-                  <a:schemeClr val="bg1">
-                    <a:lumMod val="95000"/>
-                  </a:schemeClr>
-                </a:solidFill>
-                <a:latin typeface="+mj-lt"/>
-                <a:ea typeface="+mj-ea"/>
-                <a:cs typeface="+mj-cs"/>
-              </a:rPr>
-              <a:t>Mark Allan on Azure Functions and </a:t>
-            </a:r>
-            <a:r>
-              <a:rPr lang="en-GB" sz="2800" b="1" dirty="0" err="1">
-                <a:solidFill>
-                  <a:schemeClr val="bg1">
-                    <a:lumMod val="95000"/>
-                  </a:schemeClr>
-                </a:solidFill>
-                <a:latin typeface="+mj-lt"/>
-                <a:ea typeface="+mj-ea"/>
-                <a:cs typeface="+mj-cs"/>
-              </a:rPr>
-              <a:t>DocumentDB</a:t>
-            </a:r>
             <a:endParaRPr lang="en-GB" sz="2800" b="1" dirty="0">
               <a:solidFill>
                 <a:schemeClr val="bg1">
                   <a:lumMod val="95000"/>
                 </a:schemeClr>
-              </a:solidFill>
-              <a:latin typeface="+mj-lt"/>
-              <a:ea typeface="+mj-ea"/>
-              <a:cs typeface="+mj-cs"/>
-            </a:endParaRPr>
-          </a:p>
-          <a:p>
-            <a:pPr algn="ctr">
-              <a:spcBef>
-                <a:spcPct val="0"/>
-              </a:spcBef>
-              <a:defRPr/>
-            </a:pPr>
-            <a:r>
-              <a:rPr lang="en-GB" sz="2800" b="1" dirty="0">
-                <a:solidFill>
-                  <a:schemeClr val="bg1">
-                    <a:lumMod val="95000"/>
-                  </a:schemeClr>
-                </a:solidFill>
-                <a:latin typeface="+mj-lt"/>
-                <a:ea typeface="+mj-ea"/>
-                <a:cs typeface="+mj-cs"/>
-              </a:rPr>
-              <a:t>DevOps with Matteo Emili</a:t>
-            </a:r>
-          </a:p>
-          <a:p>
-            <a:pPr algn="ctr">
-              <a:spcBef>
-                <a:spcPct val="0"/>
-              </a:spcBef>
-              <a:defRPr/>
-            </a:pPr>
-            <a:r>
-              <a:rPr lang="en-GB" sz="2800" b="1" dirty="0">
-                <a:solidFill>
-                  <a:schemeClr val="bg1">
-                    <a:lumMod val="95000"/>
-                  </a:schemeClr>
-                </a:solidFill>
-                <a:latin typeface="+mj-lt"/>
-                <a:ea typeface="+mj-ea"/>
-                <a:cs typeface="+mj-cs"/>
-              </a:rPr>
-              <a:t>Joel Hammond Turner on being a good technical leader</a:t>
-            </a:r>
-          </a:p>
-          <a:p>
-            <a:pPr algn="ctr">
-              <a:spcBef>
-                <a:spcPct val="0"/>
-              </a:spcBef>
-              <a:defRPr/>
-            </a:pPr>
-            <a:r>
-              <a:rPr lang="en-GB" sz="2800" b="1" dirty="0">
-                <a:solidFill>
-                  <a:schemeClr val="bg1">
-                    <a:lumMod val="95000"/>
-                  </a:schemeClr>
-                </a:solidFill>
-                <a:latin typeface="+mj-lt"/>
-                <a:ea typeface="+mj-ea"/>
-                <a:cs typeface="+mj-cs"/>
-              </a:rPr>
-              <a:t>Mark Rendle on the released </a:t>
-            </a:r>
-            <a:r>
-              <a:rPr lang="en-GB" sz="2800" b="1" dirty="0" err="1">
-                <a:solidFill>
-                  <a:schemeClr val="bg1">
-                    <a:lumMod val="95000"/>
-                  </a:schemeClr>
-                </a:solidFill>
-                <a:latin typeface="+mj-lt"/>
-                <a:ea typeface="+mj-ea"/>
-                <a:cs typeface="+mj-cs"/>
-              </a:rPr>
-              <a:t>.Net</a:t>
-            </a:r>
-            <a:r>
-              <a:rPr lang="en-GB" sz="2800" b="1" dirty="0">
-                <a:solidFill>
-                  <a:schemeClr val="bg1">
-                    <a:lumMod val="95000"/>
-                  </a:schemeClr>
-                </a:solidFill>
-                <a:latin typeface="+mj-lt"/>
-                <a:ea typeface="+mj-ea"/>
-                <a:cs typeface="+mj-cs"/>
-              </a:rPr>
-              <a:t> core 2.0 standard</a:t>
-            </a:r>
-            <a:br>
-              <a:rPr lang="en-GB" sz="4000" b="1" dirty="0">
-                <a:solidFill>
-                  <a:schemeClr val="bg1">
-                    <a:lumMod val="95000"/>
-                  </a:schemeClr>
-                </a:solidFill>
-                <a:latin typeface="+mj-lt"/>
-                <a:ea typeface="+mj-ea"/>
-                <a:cs typeface="+mj-cs"/>
-              </a:rPr>
-            </a:br>
-            <a:endParaRPr lang="en-GB" sz="4000" dirty="0">
-              <a:solidFill>
-                <a:schemeClr val="bg1"/>
               </a:solidFill>
               <a:latin typeface="+mj-lt"/>
               <a:ea typeface="+mj-ea"/>
@@ -5236,6 +5291,295 @@
           <p:nvPr/>
         </p:nvPicPr>
         <p:blipFill>
+          <a:blip r:embed="rId3" cstate="print"/>
+          <a:srcRect/>
+          <a:stretch>
+            <a:fillRect/>
+          </a:stretch>
+        </p:blipFill>
+        <p:spPr bwMode="auto">
+          <a:xfrm>
+            <a:off x="1509522" y="-27384"/>
+            <a:ext cx="9144000" cy="1428750"/>
+          </a:xfrm>
+          <a:prstGeom prst="rect">
+            <a:avLst/>
+          </a:prstGeom>
+          <a:noFill/>
+        </p:spPr>
+      </p:pic>
+      <p:sp>
+        <p:nvSpPr>
+          <p:cNvPr id="7" name="Title 1"/>
+          <p:cNvSpPr txBox="1">
+            <a:spLocks/>
+          </p:cNvSpPr>
+          <p:nvPr/>
+        </p:nvSpPr>
+        <p:spPr>
+          <a:xfrm>
+            <a:off x="2207568" y="2852936"/>
+            <a:ext cx="8136904" cy="3168352"/>
+          </a:xfrm>
+          <a:prstGeom prst="rect">
+            <a:avLst/>
+          </a:prstGeom>
+        </p:spPr>
+        <p:txBody>
+          <a:bodyPr vert="horz" lIns="91440" tIns="45720" rIns="91440" bIns="45720" rtlCol="0" anchor="ctr">
+            <a:noAutofit/>
+          </a:bodyPr>
+          <a:lstStyle/>
+          <a:p>
+            <a:pPr algn="ctr">
+              <a:spcBef>
+                <a:spcPct val="0"/>
+              </a:spcBef>
+              <a:defRPr/>
+            </a:pPr>
+            <a:r>
+              <a:rPr lang="en-GB" sz="6000" b="1" dirty="0">
+                <a:solidFill>
+                  <a:schemeClr val="bg1">
+                    <a:lumMod val="95000"/>
+                  </a:schemeClr>
+                </a:solidFill>
+                <a:latin typeface="+mj-lt"/>
+                <a:ea typeface="+mj-ea"/>
+                <a:cs typeface="+mj-cs"/>
+              </a:rPr>
+              <a:t>Coming up</a:t>
+            </a:r>
+            <a:br>
+              <a:rPr lang="en-GB" sz="6000" b="1" dirty="0">
+                <a:solidFill>
+                  <a:schemeClr val="bg1">
+                    <a:lumMod val="95000"/>
+                  </a:schemeClr>
+                </a:solidFill>
+                <a:latin typeface="+mj-lt"/>
+                <a:ea typeface="+mj-ea"/>
+                <a:cs typeface="+mj-cs"/>
+              </a:rPr>
+            </a:br>
+            <a:r>
+              <a:rPr lang="en-GB" sz="2800" b="1" dirty="0">
+                <a:solidFill>
+                  <a:schemeClr val="bg1">
+                    <a:lumMod val="95000"/>
+                  </a:schemeClr>
+                </a:solidFill>
+                <a:latin typeface="+mj-lt"/>
+                <a:ea typeface="+mj-ea"/>
+                <a:cs typeface="+mj-cs"/>
+              </a:rPr>
+              <a:t>DevOps with Matteo Emili</a:t>
+            </a:r>
+          </a:p>
+          <a:p>
+            <a:pPr algn="ctr">
+              <a:spcBef>
+                <a:spcPct val="0"/>
+              </a:spcBef>
+              <a:defRPr/>
+            </a:pPr>
+            <a:r>
+              <a:rPr lang="en-GB" sz="2800" b="1" dirty="0">
+                <a:solidFill>
+                  <a:schemeClr val="bg1">
+                    <a:lumMod val="95000"/>
+                  </a:schemeClr>
+                </a:solidFill>
+                <a:latin typeface="+mj-lt"/>
+                <a:ea typeface="+mj-ea"/>
+                <a:cs typeface="+mj-cs"/>
+              </a:rPr>
+              <a:t>Joel Hammond Turner on being a good technical leader</a:t>
+            </a:r>
+          </a:p>
+          <a:p>
+            <a:pPr algn="ctr">
+              <a:spcBef>
+                <a:spcPct val="0"/>
+              </a:spcBef>
+              <a:defRPr/>
+            </a:pPr>
+            <a:r>
+              <a:rPr lang="en-GB" sz="2800" b="1" dirty="0">
+                <a:solidFill>
+                  <a:schemeClr val="bg1">
+                    <a:lumMod val="95000"/>
+                  </a:schemeClr>
+                </a:solidFill>
+                <a:latin typeface="+mj-lt"/>
+                <a:ea typeface="+mj-ea"/>
+                <a:cs typeface="+mj-cs"/>
+              </a:rPr>
+              <a:t>Mark Rendle on the released </a:t>
+            </a:r>
+            <a:r>
+              <a:rPr lang="en-GB" sz="2800" b="1" dirty="0" err="1">
+                <a:solidFill>
+                  <a:schemeClr val="bg1">
+                    <a:lumMod val="95000"/>
+                  </a:schemeClr>
+                </a:solidFill>
+                <a:latin typeface="+mj-lt"/>
+                <a:ea typeface="+mj-ea"/>
+                <a:cs typeface="+mj-cs"/>
+              </a:rPr>
+              <a:t>.Net</a:t>
+            </a:r>
+            <a:r>
+              <a:rPr lang="en-GB" sz="2800" b="1" dirty="0">
+                <a:solidFill>
+                  <a:schemeClr val="bg1">
+                    <a:lumMod val="95000"/>
+                  </a:schemeClr>
+                </a:solidFill>
+                <a:latin typeface="+mj-lt"/>
+                <a:ea typeface="+mj-ea"/>
+                <a:cs typeface="+mj-cs"/>
+              </a:rPr>
+              <a:t> core 2.0 standard</a:t>
+            </a:r>
+            <a:br>
+              <a:rPr lang="en-GB" sz="4000" b="1" dirty="0">
+                <a:solidFill>
+                  <a:schemeClr val="bg1">
+                    <a:lumMod val="95000"/>
+                  </a:schemeClr>
+                </a:solidFill>
+                <a:latin typeface="+mj-lt"/>
+                <a:ea typeface="+mj-ea"/>
+                <a:cs typeface="+mj-cs"/>
+              </a:rPr>
+            </a:br>
+            <a:endParaRPr lang="en-GB" sz="4000" dirty="0">
+              <a:solidFill>
+                <a:schemeClr val="bg1"/>
+              </a:solidFill>
+              <a:latin typeface="+mj-lt"/>
+              <a:ea typeface="+mj-ea"/>
+              <a:cs typeface="+mj-cs"/>
+            </a:endParaRPr>
+          </a:p>
+        </p:txBody>
+      </p:sp>
+      <p:sp>
+        <p:nvSpPr>
+          <p:cNvPr id="8" name="Rectangle 7"/>
+          <p:cNvSpPr/>
+          <p:nvPr/>
+        </p:nvSpPr>
+        <p:spPr>
+          <a:xfrm>
+            <a:off x="9091186" y="6525344"/>
+            <a:ext cx="1613327" cy="369332"/>
+          </a:xfrm>
+          <a:prstGeom prst="rect">
+            <a:avLst/>
+          </a:prstGeom>
+        </p:spPr>
+        <p:txBody>
+          <a:bodyPr wrap="none">
+            <a:spAutoFit/>
+          </a:bodyPr>
+          <a:lstStyle/>
+          <a:p>
+            <a:r>
+              <a:rPr lang="en-GB" b="1" dirty="0">
+                <a:solidFill>
+                  <a:schemeClr val="bg1">
+                    <a:lumMod val="95000"/>
+                  </a:schemeClr>
+                </a:solidFill>
+              </a:rPr>
+              <a:t>@</a:t>
+            </a:r>
+            <a:r>
+              <a:rPr lang="en-GB" b="1" dirty="0" err="1">
+                <a:solidFill>
+                  <a:schemeClr val="bg1">
+                    <a:lumMod val="95000"/>
+                  </a:schemeClr>
+                </a:solidFill>
+              </a:rPr>
+              <a:t>smartdevsug</a:t>
+            </a:r>
+            <a:endParaRPr lang="en-GB" dirty="0"/>
+          </a:p>
+        </p:txBody>
+      </p:sp>
+    </p:spTree>
+    <p:extLst>
+      <p:ext uri="{BB962C8B-B14F-4D97-AF65-F5344CB8AC3E}">
+        <p14:creationId xmlns:p14="http://schemas.microsoft.com/office/powerpoint/2010/main" val="2406007851"/>
+      </p:ext>
+    </p:extLst>
+  </p:cSld>
+  <p:clrMapOvr>
+    <a:masterClrMapping/>
+  </p:clrMapOvr>
+  <p:transition advClick="0" advTm="32750">
+    <p:fade/>
+  </p:transition>
+</p:sld>
+</file>
+
+<file path=ppt/slides/slide7.xml><?xml version="1.0" encoding="utf-8"?>
+<p:sld xmlns:a="http://schemas.openxmlformats.org/drawingml/2006/main" xmlns:r="http://schemas.openxmlformats.org/officeDocument/2006/relationships" xmlns:p="http://schemas.openxmlformats.org/presentationml/2006/main">
+  <p:cSld>
+    <p:spTree>
+      <p:nvGrpSpPr>
+        <p:cNvPr id="1" name=""/>
+        <p:cNvGrpSpPr/>
+        <p:nvPr/>
+      </p:nvGrpSpPr>
+      <p:grpSpPr>
+        <a:xfrm>
+          <a:off x="0" y="0"/>
+          <a:ext cx="0" cy="0"/>
+          <a:chOff x="0" y="0"/>
+          <a:chExt cx="0" cy="0"/>
+        </a:xfrm>
+      </p:grpSpPr>
+      <p:sp>
+        <p:nvSpPr>
+          <p:cNvPr id="2" name="Title 1"/>
+          <p:cNvSpPr>
+            <a:spLocks noGrp="1"/>
+          </p:cNvSpPr>
+          <p:nvPr>
+            <p:ph type="title"/>
+          </p:nvPr>
+        </p:nvSpPr>
+        <p:spPr>
+          <a:xfrm>
+            <a:off x="2124076" y="417514"/>
+            <a:ext cx="8229600" cy="1143000"/>
+          </a:xfrm>
+        </p:spPr>
+        <p:txBody>
+          <a:bodyPr/>
+          <a:lstStyle/>
+          <a:p>
+            <a:r>
+              <a:rPr lang="en-GB" dirty="0"/>
+              <a:t>Upcoming Events..</a:t>
+            </a:r>
+          </a:p>
+        </p:txBody>
+      </p:sp>
+      <p:pic>
+        <p:nvPicPr>
+          <p:cNvPr id="6" name="Picture 2" descr="http://photos1.meetupstatic.com/photos/theme_head/b/7/b/8/full_3047032.jpeg"/>
+          <p:cNvPicPr>
+            <a:picLocks noChangeAspect="1" noChangeArrowheads="1"/>
+          </p:cNvPicPr>
+          <p:nvPr/>
+        </p:nvPicPr>
+        <p:blipFill>
           <a:blip r:embed="rId2" cstate="print"/>
           <a:srcRect/>
           <a:stretch>
@@ -5474,7 +5818,7 @@
 </p:sld>
 </file>
 
-<file path=ppt/slides/slide7.xml><?xml version="1.0" encoding="utf-8"?>
+<file path=ppt/slides/slide8.xml><?xml version="1.0" encoding="utf-8"?>
 <p:sld xmlns:a="http://schemas.openxmlformats.org/drawingml/2006/main" xmlns:r="http://schemas.openxmlformats.org/officeDocument/2006/relationships" xmlns:p="http://schemas.openxmlformats.org/presentationml/2006/main" showMasterSp="0">
   <p:cSld>
     <p:spTree>
@@ -5624,10 +5968,10 @@
                 <a:ea typeface="+mj-ea"/>
                 <a:cs typeface="+mj-cs"/>
               </a:rPr>
-              <a:t>Martin </a:t>
-            </a:r>
-            <a:r>
-              <a:rPr lang="en-GB" sz="6600" b="1" dirty="0" err="1">
+              <a:t>Mark Allan</a:t>
+            </a:r>
+            <a:br>
+              <a:rPr lang="en-GB" sz="6600" b="1" dirty="0">
                 <a:solidFill>
                   <a:schemeClr val="bg1"/>
                 </a:solidFill>
@@ -5642,9 +5986,8 @@
                 <a:ea typeface="+mj-ea"/>
                 <a:cs typeface="+mj-cs"/>
               </a:rPr>
-              <a:t>Kearn</a:t>
-            </a:r>
-            <a:br>
+            </a:br>
+            <a:r>
               <a:rPr lang="en-GB" sz="6600" b="1" dirty="0">
                 <a:solidFill>
                   <a:schemeClr val="bg1"/>
@@ -5660,8 +6003,9 @@
                 <a:ea typeface="+mj-ea"/>
                 <a:cs typeface="+mj-cs"/>
               </a:rPr>
-            </a:br>
-            <a:r>
+              <a:t>Azure Functions</a:t>
+            </a:r>
+            <a:br>
               <a:rPr lang="en-GB" sz="6600" b="1" dirty="0">
                 <a:solidFill>
                   <a:schemeClr val="bg1"/>
@@ -5677,8 +6021,40 @@
                 <a:ea typeface="+mj-ea"/>
                 <a:cs typeface="+mj-cs"/>
               </a:rPr>
-              <a:t>on ‘why we’ll be the last people to have real jobs’</a:t>
-            </a:r>
+            </a:br>
+            <a:r>
+              <a:rPr lang="en-GB" sz="6600" b="1" dirty="0" err="1">
+                <a:solidFill>
+                  <a:schemeClr val="bg1"/>
+                </a:solidFill>
+                <a:effectLst>
+                  <a:outerShdw blurRad="38100" dist="38100" dir="2700000" algn="tl">
+                    <a:srgbClr val="000000">
+                      <a:alpha val="43137"/>
+                    </a:srgbClr>
+                  </a:outerShdw>
+                </a:effectLst>
+                <a:latin typeface="+mj-lt"/>
+                <a:ea typeface="+mj-ea"/>
+                <a:cs typeface="+mj-cs"/>
+              </a:rPr>
+              <a:t>DocumentDB</a:t>
+            </a:r>
+            <a:endParaRPr lang="en-GB" sz="6600" b="1" dirty="0">
+              <a:solidFill>
+                <a:schemeClr val="bg1"/>
+              </a:solidFill>
+              <a:effectLst>
+                <a:outerShdw blurRad="38100" dist="38100" dir="2700000" algn="tl">
+                  <a:srgbClr val="000000">
+                    <a:alpha val="43137"/>
+                  </a:srgbClr>
+                </a:outerShdw>
+              </a:effectLst>
+              <a:latin typeface="+mj-lt"/>
+              <a:ea typeface="+mj-ea"/>
+              <a:cs typeface="+mj-cs"/>
+            </a:endParaRPr>
           </a:p>
         </p:txBody>
       </p:sp>

</xml_diff>

<commit_message>
Updated for Apr 2017
</commit_message>
<xml_diff>
--- a/WelcomePresentation-SmartDevs.pptx
+++ b/WelcomePresentation-SmartDevs.pptx
@@ -5,17 +5,16 @@
     <p:sldMasterId id="2147483648" r:id="rId1"/>
   </p:sldMasterIdLst>
   <p:notesMasterIdLst>
-    <p:notesMasterId r:id="rId10"/>
+    <p:notesMasterId r:id="rId9"/>
   </p:notesMasterIdLst>
   <p:sldIdLst>
     <p:sldId id="256" r:id="rId2"/>
     <p:sldId id="258" r:id="rId3"/>
     <p:sldId id="257" r:id="rId4"/>
     <p:sldId id="268" r:id="rId5"/>
-    <p:sldId id="272" r:id="rId6"/>
-    <p:sldId id="275" r:id="rId7"/>
-    <p:sldId id="274" r:id="rId8"/>
-    <p:sldId id="269" r:id="rId9"/>
+    <p:sldId id="275" r:id="rId6"/>
+    <p:sldId id="274" r:id="rId7"/>
+    <p:sldId id="269" r:id="rId8"/>
   </p:sldIdLst>
   <p:sldSz cx="12192000" cy="6858000"/>
   <p:notesSz cx="6858000" cy="9144000"/>
@@ -215,7 +214,7 @@
           <a:p>
             <a:fld id="{8D928C90-A2F3-492C-9840-8080881BD1C3}" type="datetimeFigureOut">
               <a:rPr lang="en-GB" smtClean="0"/>
-              <a:t>13/03/2017</a:t>
+              <a:t>10/04/2017</a:t>
             </a:fld>
             <a:endParaRPr lang="en-GB"/>
           </a:p>
@@ -655,7 +654,7 @@
     </p:spTree>
     <p:extLst>
       <p:ext uri="{BB962C8B-B14F-4D97-AF65-F5344CB8AC3E}">
-        <p14:creationId xmlns:p14="http://schemas.microsoft.com/office/powerpoint/2010/main" val="1971823356"/>
+        <p14:creationId xmlns:p14="http://schemas.microsoft.com/office/powerpoint/2010/main" val="1084305320"/>
       </p:ext>
     </p:extLst>
   </p:cSld>
@@ -735,96 +734,7 @@
           <a:p>
             <a:fld id="{9E596088-AF84-4048-9612-0BD6F107496A}" type="slidenum">
               <a:rPr lang="en-GB" smtClean="0"/>
-              <a:t>6</a:t>
-            </a:fld>
-            <a:endParaRPr lang="en-GB"/>
-          </a:p>
-        </p:txBody>
-      </p:sp>
-    </p:spTree>
-    <p:extLst>
-      <p:ext uri="{BB962C8B-B14F-4D97-AF65-F5344CB8AC3E}">
-        <p14:creationId xmlns:p14="http://schemas.microsoft.com/office/powerpoint/2010/main" val="1084305320"/>
-      </p:ext>
-    </p:extLst>
-  </p:cSld>
-  <p:clrMapOvr>
-    <a:masterClrMapping/>
-  </p:clrMapOvr>
-</p:notes>
-</file>
-
-<file path=ppt/notesSlides/notesSlide4.xml><?xml version="1.0" encoding="utf-8"?>
-<p:notes xmlns:a="http://schemas.openxmlformats.org/drawingml/2006/main" xmlns:r="http://schemas.openxmlformats.org/officeDocument/2006/relationships" xmlns:p="http://schemas.openxmlformats.org/presentationml/2006/main">
-  <p:cSld>
-    <p:spTree>
-      <p:nvGrpSpPr>
-        <p:cNvPr id="1" name=""/>
-        <p:cNvGrpSpPr/>
-        <p:nvPr/>
-      </p:nvGrpSpPr>
-      <p:grpSpPr>
-        <a:xfrm>
-          <a:off x="0" y="0"/>
-          <a:ext cx="0" cy="0"/>
-          <a:chOff x="0" y="0"/>
-          <a:chExt cx="0" cy="0"/>
-        </a:xfrm>
-      </p:grpSpPr>
-      <p:sp>
-        <p:nvSpPr>
-          <p:cNvPr id="2" name="Slide Image Placeholder 1"/>
-          <p:cNvSpPr>
-            <a:spLocks noGrp="1" noRot="1" noChangeAspect="1"/>
-          </p:cNvSpPr>
-          <p:nvPr>
-            <p:ph type="sldImg"/>
-          </p:nvPr>
-        </p:nvSpPr>
-        <p:spPr>
-          <a:xfrm>
-            <a:off x="381000" y="685800"/>
-            <a:ext cx="6096000" cy="3429000"/>
-          </a:xfrm>
-        </p:spPr>
-      </p:sp>
-      <p:sp>
-        <p:nvSpPr>
-          <p:cNvPr id="3" name="Notes Placeholder 2"/>
-          <p:cNvSpPr>
-            <a:spLocks noGrp="1"/>
-          </p:cNvSpPr>
-          <p:nvPr>
-            <p:ph type="body" idx="1"/>
-          </p:nvPr>
-        </p:nvSpPr>
-        <p:spPr/>
-        <p:txBody>
-          <a:bodyPr/>
-          <a:lstStyle/>
-          <a:p>
-            <a:endParaRPr lang="en-GB" dirty="0"/>
-          </a:p>
-        </p:txBody>
-      </p:sp>
-      <p:sp>
-        <p:nvSpPr>
-          <p:cNvPr id="4" name="Slide Number Placeholder 3"/>
-          <p:cNvSpPr>
-            <a:spLocks noGrp="1"/>
-          </p:cNvSpPr>
-          <p:nvPr>
-            <p:ph type="sldNum" sz="quarter" idx="10"/>
-          </p:nvPr>
-        </p:nvSpPr>
-        <p:spPr/>
-        <p:txBody>
-          <a:bodyPr/>
-          <a:lstStyle/>
-          <a:p>
-            <a:fld id="{9E596088-AF84-4048-9612-0BD6F107496A}" type="slidenum">
-              <a:rPr lang="en-GB" smtClean="0"/>
-              <a:t>8</a:t>
+              <a:t>7</a:t>
             </a:fld>
             <a:endParaRPr lang="en-GB"/>
           </a:p>
@@ -1025,7 +935,7 @@
             <a:fld id="{8050458D-74A9-43CA-B6DD-6642C7D97BC8}" type="datetimeFigureOut">
               <a:rPr lang="en-US" smtClean="0"/>
               <a:pPr/>
-              <a:t>3/13/2017</a:t>
+              <a:t>4/10/2017</a:t>
             </a:fld>
             <a:endParaRPr lang="en-GB"/>
           </a:p>
@@ -1192,7 +1102,7 @@
             <a:fld id="{8050458D-74A9-43CA-B6DD-6642C7D97BC8}" type="datetimeFigureOut">
               <a:rPr lang="en-US" smtClean="0"/>
               <a:pPr/>
-              <a:t>3/13/2017</a:t>
+              <a:t>4/10/2017</a:t>
             </a:fld>
             <a:endParaRPr lang="en-GB"/>
           </a:p>
@@ -1369,7 +1279,7 @@
             <a:fld id="{8050458D-74A9-43CA-B6DD-6642C7D97BC8}" type="datetimeFigureOut">
               <a:rPr lang="en-US" smtClean="0"/>
               <a:pPr/>
-              <a:t>3/13/2017</a:t>
+              <a:t>4/10/2017</a:t>
             </a:fld>
             <a:endParaRPr lang="en-GB"/>
           </a:p>
@@ -1536,7 +1446,7 @@
             <a:fld id="{8050458D-74A9-43CA-B6DD-6642C7D97BC8}" type="datetimeFigureOut">
               <a:rPr lang="en-US" smtClean="0"/>
               <a:pPr/>
-              <a:t>3/13/2017</a:t>
+              <a:t>4/10/2017</a:t>
             </a:fld>
             <a:endParaRPr lang="en-GB"/>
           </a:p>
@@ -1779,7 +1689,7 @@
             <a:fld id="{8050458D-74A9-43CA-B6DD-6642C7D97BC8}" type="datetimeFigureOut">
               <a:rPr lang="en-US" smtClean="0"/>
               <a:pPr/>
-              <a:t>3/13/2017</a:t>
+              <a:t>4/10/2017</a:t>
             </a:fld>
             <a:endParaRPr lang="en-GB"/>
           </a:p>
@@ -2064,7 +1974,7 @@
             <a:fld id="{8050458D-74A9-43CA-B6DD-6642C7D97BC8}" type="datetimeFigureOut">
               <a:rPr lang="en-US" smtClean="0"/>
               <a:pPr/>
-              <a:t>3/13/2017</a:t>
+              <a:t>4/10/2017</a:t>
             </a:fld>
             <a:endParaRPr lang="en-GB"/>
           </a:p>
@@ -2483,7 +2393,7 @@
             <a:fld id="{8050458D-74A9-43CA-B6DD-6642C7D97BC8}" type="datetimeFigureOut">
               <a:rPr lang="en-US" smtClean="0"/>
               <a:pPr/>
-              <a:t>3/13/2017</a:t>
+              <a:t>4/10/2017</a:t>
             </a:fld>
             <a:endParaRPr lang="en-GB"/>
           </a:p>
@@ -2598,7 +2508,7 @@
             <a:fld id="{8050458D-74A9-43CA-B6DD-6642C7D97BC8}" type="datetimeFigureOut">
               <a:rPr lang="en-US" smtClean="0"/>
               <a:pPr/>
-              <a:t>3/13/2017</a:t>
+              <a:t>4/10/2017</a:t>
             </a:fld>
             <a:endParaRPr lang="en-GB"/>
           </a:p>
@@ -2690,7 +2600,7 @@
             <a:fld id="{8050458D-74A9-43CA-B6DD-6642C7D97BC8}" type="datetimeFigureOut">
               <a:rPr lang="en-US" smtClean="0"/>
               <a:pPr/>
-              <a:t>3/13/2017</a:t>
+              <a:t>4/10/2017</a:t>
             </a:fld>
             <a:endParaRPr lang="en-GB"/>
           </a:p>
@@ -2964,7 +2874,7 @@
             <a:fld id="{8050458D-74A9-43CA-B6DD-6642C7D97BC8}" type="datetimeFigureOut">
               <a:rPr lang="en-US" smtClean="0"/>
               <a:pPr/>
-              <a:t>3/13/2017</a:t>
+              <a:t>4/10/2017</a:t>
             </a:fld>
             <a:endParaRPr lang="en-GB"/>
           </a:p>
@@ -3214,7 +3124,7 @@
             <a:fld id="{8050458D-74A9-43CA-B6DD-6642C7D97BC8}" type="datetimeFigureOut">
               <a:rPr lang="en-US" smtClean="0"/>
               <a:pPr/>
-              <a:t>3/13/2017</a:t>
+              <a:t>4/10/2017</a:t>
             </a:fld>
             <a:endParaRPr lang="en-GB"/>
           </a:p>
@@ -3427,7 +3337,7 @@
             <a:fld id="{8050458D-74A9-43CA-B6DD-6642C7D97BC8}" type="datetimeFigureOut">
               <a:rPr lang="en-US" smtClean="0"/>
               <a:pPr/>
-              <a:t>3/13/2017</a:t>
+              <a:t>4/10/2017</a:t>
             </a:fld>
             <a:endParaRPr lang="en-GB"/>
           </a:p>
@@ -5033,137 +4943,110 @@
           </a:bodyPr>
           <a:lstStyle/>
           <a:p>
-            <a:pPr>
-              <a:spcBef>
-                <a:spcPct val="0"/>
-              </a:spcBef>
-              <a:defRPr/>
-            </a:pPr>
-            <a:r>
-              <a:rPr lang="en-GB" sz="6000" b="1" dirty="0">
-                <a:solidFill>
-                  <a:schemeClr val="bg1"/>
-                </a:solidFill>
-                <a:latin typeface="+mj-lt"/>
-                <a:ea typeface="+mj-ea"/>
-                <a:cs typeface="+mj-cs"/>
-              </a:rPr>
-              <a:t>Coming up</a:t>
-            </a:r>
-            <a:br>
-              <a:rPr lang="en-GB" sz="6000" b="1" dirty="0">
-                <a:solidFill>
-                  <a:schemeClr val="bg1"/>
-                </a:solidFill>
-                <a:latin typeface="+mj-lt"/>
-                <a:ea typeface="+mj-ea"/>
-                <a:cs typeface="+mj-cs"/>
-              </a:rPr>
-            </a:br>
-            <a:r>
-              <a:rPr lang="en-GB" sz="2800" b="1" dirty="0">
-                <a:solidFill>
-                  <a:schemeClr val="bg1"/>
-                </a:solidFill>
-                <a:latin typeface="+mj-lt"/>
-                <a:ea typeface="+mj-ea"/>
-                <a:cs typeface="+mj-cs"/>
-              </a:rPr>
-              <a:t>DevOps with Matteo Emili, we need a vote…</a:t>
-            </a:r>
-          </a:p>
-          <a:p>
-            <a:pPr>
-              <a:spcBef>
-                <a:spcPct val="0"/>
-              </a:spcBef>
-              <a:defRPr/>
-            </a:pPr>
-            <a:br>
-              <a:rPr lang="en-GB" sz="2800" b="1" dirty="0">
-                <a:solidFill>
-                  <a:schemeClr val="bg1"/>
-                </a:solidFill>
-                <a:latin typeface="+mj-lt"/>
-                <a:ea typeface="+mj-ea"/>
-                <a:cs typeface="+mj-cs"/>
-              </a:rPr>
-            </a:br>
-            <a:r>
-              <a:rPr lang="en-GB" b="1" dirty="0">
-                <a:solidFill>
-                  <a:schemeClr val="bg1"/>
-                </a:solidFill>
-                <a:latin typeface="+mj-lt"/>
-                <a:ea typeface="+mj-ea"/>
-                <a:cs typeface="+mj-cs"/>
-              </a:rPr>
-              <a:t>1. </a:t>
-            </a:r>
-            <a:r>
-              <a:rPr lang="en-GB" b="1" dirty="0">
-                <a:solidFill>
-                  <a:schemeClr val="bg1"/>
-                </a:solidFill>
-              </a:rPr>
-              <a:t>Hybrid DevOps stacks in action</a:t>
-            </a:r>
-          </a:p>
-          <a:p>
-            <a:pPr>
-              <a:spcBef>
-                <a:spcPct val="0"/>
-              </a:spcBef>
-              <a:defRPr/>
-            </a:pPr>
-            <a:r>
-              <a:rPr lang="en-GB" b="1" dirty="0">
-                <a:solidFill>
-                  <a:schemeClr val="bg1"/>
-                </a:solidFill>
-              </a:rPr>
-              <a:t>2. A year of </a:t>
-            </a:r>
-            <a:r>
-              <a:rPr lang="en-GB" b="1" dirty="0" err="1">
-                <a:solidFill>
-                  <a:schemeClr val="bg1"/>
-                </a:solidFill>
-              </a:rPr>
-              <a:t>SonarQube</a:t>
-            </a:r>
-            <a:r>
-              <a:rPr lang="en-GB" b="1" dirty="0">
-                <a:solidFill>
-                  <a:schemeClr val="bg1"/>
-                </a:solidFill>
-              </a:rPr>
-              <a:t> and TFS/VSTS: ten tips from the real world</a:t>
-            </a:r>
-          </a:p>
-          <a:p>
-            <a:pPr>
-              <a:spcBef>
-                <a:spcPct val="0"/>
-              </a:spcBef>
-              <a:defRPr/>
-            </a:pPr>
-            <a:r>
-              <a:rPr lang="en-GB" b="1" dirty="0">
-                <a:solidFill>
-                  <a:schemeClr val="bg1"/>
-                </a:solidFill>
-              </a:rPr>
-              <a:t>3. Packages as the first choice when deploying: how?</a:t>
-            </a:r>
-          </a:p>
-          <a:p>
             <a:pPr algn="ctr">
               <a:spcBef>
                 <a:spcPct val="0"/>
               </a:spcBef>
               <a:defRPr/>
             </a:pPr>
+            <a:r>
+              <a:rPr lang="en-GB" sz="6000" b="1" dirty="0">
+                <a:solidFill>
+                  <a:schemeClr val="bg1">
+                    <a:lumMod val="95000"/>
+                  </a:schemeClr>
+                </a:solidFill>
+                <a:latin typeface="+mj-lt"/>
+                <a:ea typeface="+mj-ea"/>
+                <a:cs typeface="+mj-cs"/>
+              </a:rPr>
+              <a:t>Coming up</a:t>
+            </a:r>
+            <a:br>
+              <a:rPr lang="en-GB" sz="6000" b="1" dirty="0">
+                <a:solidFill>
+                  <a:schemeClr val="bg1">
+                    <a:lumMod val="95000"/>
+                  </a:schemeClr>
+                </a:solidFill>
+                <a:latin typeface="+mj-lt"/>
+                <a:ea typeface="+mj-ea"/>
+                <a:cs typeface="+mj-cs"/>
+              </a:rPr>
+            </a:br>
+            <a:r>
+              <a:rPr lang="en-GB" sz="2800" b="1" dirty="0">
+                <a:solidFill>
+                  <a:schemeClr val="bg1">
+                    <a:lumMod val="95000"/>
+                  </a:schemeClr>
+                </a:solidFill>
+                <a:latin typeface="+mj-lt"/>
+                <a:ea typeface="+mj-ea"/>
+                <a:cs typeface="+mj-cs"/>
+              </a:rPr>
+              <a:t>Joel Hammond Turner on being a good technical leader</a:t>
+            </a:r>
+          </a:p>
+          <a:p>
+            <a:pPr algn="ctr">
+              <a:spcBef>
+                <a:spcPct val="0"/>
+              </a:spcBef>
+              <a:defRPr/>
+            </a:pPr>
+            <a:r>
+              <a:rPr lang="en-GB" sz="2800" b="1" dirty="0">
+                <a:solidFill>
+                  <a:schemeClr val="bg1">
+                    <a:lumMod val="95000"/>
+                  </a:schemeClr>
+                </a:solidFill>
+                <a:latin typeface="+mj-lt"/>
+                <a:ea typeface="+mj-ea"/>
+                <a:cs typeface="+mj-cs"/>
+              </a:rPr>
+              <a:t>Ben (stand up mate) </a:t>
+            </a:r>
+            <a:r>
+              <a:rPr lang="en-GB" sz="2800" b="1" dirty="0" err="1">
+                <a:solidFill>
+                  <a:schemeClr val="bg1">
+                    <a:lumMod val="95000"/>
+                  </a:schemeClr>
+                </a:solidFill>
+                <a:latin typeface="+mj-lt"/>
+                <a:ea typeface="+mj-ea"/>
+                <a:cs typeface="+mj-cs"/>
+              </a:rPr>
+              <a:t>Serverless</a:t>
+            </a:r>
+            <a:r>
+              <a:rPr lang="en-GB" sz="2800" b="1" dirty="0">
+                <a:solidFill>
+                  <a:schemeClr val="bg1">
+                    <a:lumMod val="95000"/>
+                  </a:schemeClr>
+                </a:solidFill>
+                <a:latin typeface="+mj-lt"/>
+                <a:ea typeface="+mj-ea"/>
+                <a:cs typeface="+mj-cs"/>
+              </a:rPr>
+              <a:t> Applications </a:t>
+            </a:r>
+            <a:r>
+              <a:rPr lang="en-GB" sz="2800" b="1" dirty="0" err="1">
+                <a:solidFill>
+                  <a:schemeClr val="bg1">
+                    <a:lumMod val="95000"/>
+                  </a:schemeClr>
+                </a:solidFill>
+                <a:latin typeface="+mj-lt"/>
+                <a:ea typeface="+mj-ea"/>
+                <a:cs typeface="+mj-cs"/>
+              </a:rPr>
+              <a:t>FasS</a:t>
+            </a:r>
             <a:endParaRPr lang="en-GB" sz="2800" b="1" dirty="0">
               <a:solidFill>
                 <a:schemeClr val="bg1">
@@ -5175,6 +5058,94 @@
               <a:cs typeface="+mj-cs"/>
             </a:endParaRPr>
           </a:p>
+          <a:p>
+            <a:pPr algn="ctr">
+              <a:spcBef>
+                <a:spcPct val="0"/>
+              </a:spcBef>
+              <a:defRPr/>
+            </a:pPr>
+            <a:r>
+              <a:rPr lang="en-GB" sz="2800" b="1" dirty="0">
+                <a:solidFill>
+                  <a:schemeClr val="bg1">
+                    <a:lumMod val="95000"/>
+                  </a:schemeClr>
+                </a:solidFill>
+                <a:latin typeface="+mj-lt"/>
+                <a:ea typeface="+mj-ea"/>
+                <a:cs typeface="+mj-cs"/>
+              </a:rPr>
+              <a:t>Game development</a:t>
+            </a:r>
+          </a:p>
+          <a:p>
+            <a:pPr algn="ctr">
+              <a:spcBef>
+                <a:spcPct val="0"/>
+              </a:spcBef>
+              <a:defRPr/>
+            </a:pPr>
+            <a:r>
+              <a:rPr lang="en-GB" sz="2800" b="1" dirty="0">
+                <a:solidFill>
+                  <a:schemeClr val="bg1">
+                    <a:lumMod val="95000"/>
+                  </a:schemeClr>
+                </a:solidFill>
+                <a:latin typeface="+mj-lt"/>
+                <a:ea typeface="+mj-ea"/>
+                <a:cs typeface="+mj-cs"/>
+              </a:rPr>
+              <a:t>Mark Rendle on the released </a:t>
+            </a:r>
+            <a:r>
+              <a:rPr lang="en-GB" sz="2800" b="1" dirty="0" err="1">
+                <a:solidFill>
+                  <a:schemeClr val="bg1">
+                    <a:lumMod val="95000"/>
+                  </a:schemeClr>
+                </a:solidFill>
+                <a:latin typeface="+mj-lt"/>
+                <a:ea typeface="+mj-ea"/>
+                <a:cs typeface="+mj-cs"/>
+              </a:rPr>
+              <a:t>.Net</a:t>
+            </a:r>
+            <a:r>
+              <a:rPr lang="en-GB" sz="2800" b="1" dirty="0">
+                <a:solidFill>
+                  <a:schemeClr val="bg1">
+                    <a:lumMod val="95000"/>
+                  </a:schemeClr>
+                </a:solidFill>
+                <a:latin typeface="+mj-lt"/>
+                <a:ea typeface="+mj-ea"/>
+                <a:cs typeface="+mj-cs"/>
+              </a:rPr>
+              <a:t> core 2.0 standard</a:t>
+            </a:r>
+            <a:br>
+              <a:rPr lang="en-GB" sz="4000" b="1" dirty="0">
+                <a:solidFill>
+                  <a:schemeClr val="bg1">
+                    <a:lumMod val="95000"/>
+                  </a:schemeClr>
+                </a:solidFill>
+                <a:latin typeface="+mj-lt"/>
+                <a:ea typeface="+mj-ea"/>
+                <a:cs typeface="+mj-cs"/>
+              </a:rPr>
+            </a:br>
+            <a:endParaRPr lang="en-GB" sz="4000" dirty="0">
+              <a:solidFill>
+                <a:schemeClr val="bg1"/>
+              </a:solidFill>
+              <a:latin typeface="+mj-lt"/>
+              <a:ea typeface="+mj-ea"/>
+              <a:cs typeface="+mj-cs"/>
+            </a:endParaRPr>
+          </a:p>
         </p:txBody>
       </p:sp>
       <p:sp>
@@ -5225,7 +5196,7 @@
     </p:spTree>
     <p:extLst>
       <p:ext uri="{BB962C8B-B14F-4D97-AF65-F5344CB8AC3E}">
-        <p14:creationId xmlns:p14="http://schemas.microsoft.com/office/powerpoint/2010/main" val="855902959"/>
+        <p14:creationId xmlns:p14="http://schemas.microsoft.com/office/powerpoint/2010/main" val="2406007851"/>
       </p:ext>
     </p:extLst>
   </p:cSld>
@@ -5291,295 +5262,6 @@
           <p:nvPr/>
         </p:nvPicPr>
         <p:blipFill>
-          <a:blip r:embed="rId3" cstate="print"/>
-          <a:srcRect/>
-          <a:stretch>
-            <a:fillRect/>
-          </a:stretch>
-        </p:blipFill>
-        <p:spPr bwMode="auto">
-          <a:xfrm>
-            <a:off x="1509522" y="-27384"/>
-            <a:ext cx="9144000" cy="1428750"/>
-          </a:xfrm>
-          <a:prstGeom prst="rect">
-            <a:avLst/>
-          </a:prstGeom>
-          <a:noFill/>
-        </p:spPr>
-      </p:pic>
-      <p:sp>
-        <p:nvSpPr>
-          <p:cNvPr id="7" name="Title 1"/>
-          <p:cNvSpPr txBox="1">
-            <a:spLocks/>
-          </p:cNvSpPr>
-          <p:nvPr/>
-        </p:nvSpPr>
-        <p:spPr>
-          <a:xfrm>
-            <a:off x="2207568" y="2852936"/>
-            <a:ext cx="8136904" cy="3168352"/>
-          </a:xfrm>
-          <a:prstGeom prst="rect">
-            <a:avLst/>
-          </a:prstGeom>
-        </p:spPr>
-        <p:txBody>
-          <a:bodyPr vert="horz" lIns="91440" tIns="45720" rIns="91440" bIns="45720" rtlCol="0" anchor="ctr">
-            <a:noAutofit/>
-          </a:bodyPr>
-          <a:lstStyle/>
-          <a:p>
-            <a:pPr algn="ctr">
-              <a:spcBef>
-                <a:spcPct val="0"/>
-              </a:spcBef>
-              <a:defRPr/>
-            </a:pPr>
-            <a:r>
-              <a:rPr lang="en-GB" sz="6000" b="1" dirty="0">
-                <a:solidFill>
-                  <a:schemeClr val="bg1">
-                    <a:lumMod val="95000"/>
-                  </a:schemeClr>
-                </a:solidFill>
-                <a:latin typeface="+mj-lt"/>
-                <a:ea typeface="+mj-ea"/>
-                <a:cs typeface="+mj-cs"/>
-              </a:rPr>
-              <a:t>Coming up</a:t>
-            </a:r>
-            <a:br>
-              <a:rPr lang="en-GB" sz="6000" b="1" dirty="0">
-                <a:solidFill>
-                  <a:schemeClr val="bg1">
-                    <a:lumMod val="95000"/>
-                  </a:schemeClr>
-                </a:solidFill>
-                <a:latin typeface="+mj-lt"/>
-                <a:ea typeface="+mj-ea"/>
-                <a:cs typeface="+mj-cs"/>
-              </a:rPr>
-            </a:br>
-            <a:r>
-              <a:rPr lang="en-GB" sz="2800" b="1" dirty="0">
-                <a:solidFill>
-                  <a:schemeClr val="bg1">
-                    <a:lumMod val="95000"/>
-                  </a:schemeClr>
-                </a:solidFill>
-                <a:latin typeface="+mj-lt"/>
-                <a:ea typeface="+mj-ea"/>
-                <a:cs typeface="+mj-cs"/>
-              </a:rPr>
-              <a:t>DevOps with Matteo Emili</a:t>
-            </a:r>
-          </a:p>
-          <a:p>
-            <a:pPr algn="ctr">
-              <a:spcBef>
-                <a:spcPct val="0"/>
-              </a:spcBef>
-              <a:defRPr/>
-            </a:pPr>
-            <a:r>
-              <a:rPr lang="en-GB" sz="2800" b="1" dirty="0">
-                <a:solidFill>
-                  <a:schemeClr val="bg1">
-                    <a:lumMod val="95000"/>
-                  </a:schemeClr>
-                </a:solidFill>
-                <a:latin typeface="+mj-lt"/>
-                <a:ea typeface="+mj-ea"/>
-                <a:cs typeface="+mj-cs"/>
-              </a:rPr>
-              <a:t>Joel Hammond Turner on being a good technical leader</a:t>
-            </a:r>
-          </a:p>
-          <a:p>
-            <a:pPr algn="ctr">
-              <a:spcBef>
-                <a:spcPct val="0"/>
-              </a:spcBef>
-              <a:defRPr/>
-            </a:pPr>
-            <a:r>
-              <a:rPr lang="en-GB" sz="2800" b="1" dirty="0">
-                <a:solidFill>
-                  <a:schemeClr val="bg1">
-                    <a:lumMod val="95000"/>
-                  </a:schemeClr>
-                </a:solidFill>
-                <a:latin typeface="+mj-lt"/>
-                <a:ea typeface="+mj-ea"/>
-                <a:cs typeface="+mj-cs"/>
-              </a:rPr>
-              <a:t>Mark Rendle on the released </a:t>
-            </a:r>
-            <a:r>
-              <a:rPr lang="en-GB" sz="2800" b="1" dirty="0" err="1">
-                <a:solidFill>
-                  <a:schemeClr val="bg1">
-                    <a:lumMod val="95000"/>
-                  </a:schemeClr>
-                </a:solidFill>
-                <a:latin typeface="+mj-lt"/>
-                <a:ea typeface="+mj-ea"/>
-                <a:cs typeface="+mj-cs"/>
-              </a:rPr>
-              <a:t>.Net</a:t>
-            </a:r>
-            <a:r>
-              <a:rPr lang="en-GB" sz="2800" b="1" dirty="0">
-                <a:solidFill>
-                  <a:schemeClr val="bg1">
-                    <a:lumMod val="95000"/>
-                  </a:schemeClr>
-                </a:solidFill>
-                <a:latin typeface="+mj-lt"/>
-                <a:ea typeface="+mj-ea"/>
-                <a:cs typeface="+mj-cs"/>
-              </a:rPr>
-              <a:t> core 2.0 standard</a:t>
-            </a:r>
-            <a:br>
-              <a:rPr lang="en-GB" sz="4000" b="1" dirty="0">
-                <a:solidFill>
-                  <a:schemeClr val="bg1">
-                    <a:lumMod val="95000"/>
-                  </a:schemeClr>
-                </a:solidFill>
-                <a:latin typeface="+mj-lt"/>
-                <a:ea typeface="+mj-ea"/>
-                <a:cs typeface="+mj-cs"/>
-              </a:rPr>
-            </a:br>
-            <a:endParaRPr lang="en-GB" sz="4000" dirty="0">
-              <a:solidFill>
-                <a:schemeClr val="bg1"/>
-              </a:solidFill>
-              <a:latin typeface="+mj-lt"/>
-              <a:ea typeface="+mj-ea"/>
-              <a:cs typeface="+mj-cs"/>
-            </a:endParaRPr>
-          </a:p>
-        </p:txBody>
-      </p:sp>
-      <p:sp>
-        <p:nvSpPr>
-          <p:cNvPr id="8" name="Rectangle 7"/>
-          <p:cNvSpPr/>
-          <p:nvPr/>
-        </p:nvSpPr>
-        <p:spPr>
-          <a:xfrm>
-            <a:off x="9091186" y="6525344"/>
-            <a:ext cx="1613327" cy="369332"/>
-          </a:xfrm>
-          <a:prstGeom prst="rect">
-            <a:avLst/>
-          </a:prstGeom>
-        </p:spPr>
-        <p:txBody>
-          <a:bodyPr wrap="none">
-            <a:spAutoFit/>
-          </a:bodyPr>
-          <a:lstStyle/>
-          <a:p>
-            <a:r>
-              <a:rPr lang="en-GB" b="1" dirty="0">
-                <a:solidFill>
-                  <a:schemeClr val="bg1">
-                    <a:lumMod val="95000"/>
-                  </a:schemeClr>
-                </a:solidFill>
-              </a:rPr>
-              <a:t>@</a:t>
-            </a:r>
-            <a:r>
-              <a:rPr lang="en-GB" b="1" dirty="0" err="1">
-                <a:solidFill>
-                  <a:schemeClr val="bg1">
-                    <a:lumMod val="95000"/>
-                  </a:schemeClr>
-                </a:solidFill>
-              </a:rPr>
-              <a:t>smartdevsug</a:t>
-            </a:r>
-            <a:endParaRPr lang="en-GB" dirty="0"/>
-          </a:p>
-        </p:txBody>
-      </p:sp>
-    </p:spTree>
-    <p:extLst>
-      <p:ext uri="{BB962C8B-B14F-4D97-AF65-F5344CB8AC3E}">
-        <p14:creationId xmlns:p14="http://schemas.microsoft.com/office/powerpoint/2010/main" val="2406007851"/>
-      </p:ext>
-    </p:extLst>
-  </p:cSld>
-  <p:clrMapOvr>
-    <a:masterClrMapping/>
-  </p:clrMapOvr>
-  <p:transition advClick="0" advTm="32750">
-    <p:fade/>
-  </p:transition>
-</p:sld>
-</file>
-
-<file path=ppt/slides/slide7.xml><?xml version="1.0" encoding="utf-8"?>
-<p:sld xmlns:a="http://schemas.openxmlformats.org/drawingml/2006/main" xmlns:r="http://schemas.openxmlformats.org/officeDocument/2006/relationships" xmlns:p="http://schemas.openxmlformats.org/presentationml/2006/main">
-  <p:cSld>
-    <p:spTree>
-      <p:nvGrpSpPr>
-        <p:cNvPr id="1" name=""/>
-        <p:cNvGrpSpPr/>
-        <p:nvPr/>
-      </p:nvGrpSpPr>
-      <p:grpSpPr>
-        <a:xfrm>
-          <a:off x="0" y="0"/>
-          <a:ext cx="0" cy="0"/>
-          <a:chOff x="0" y="0"/>
-          <a:chExt cx="0" cy="0"/>
-        </a:xfrm>
-      </p:grpSpPr>
-      <p:sp>
-        <p:nvSpPr>
-          <p:cNvPr id="2" name="Title 1"/>
-          <p:cNvSpPr>
-            <a:spLocks noGrp="1"/>
-          </p:cNvSpPr>
-          <p:nvPr>
-            <p:ph type="title"/>
-          </p:nvPr>
-        </p:nvSpPr>
-        <p:spPr>
-          <a:xfrm>
-            <a:off x="2124076" y="417514"/>
-            <a:ext cx="8229600" cy="1143000"/>
-          </a:xfrm>
-        </p:spPr>
-        <p:txBody>
-          <a:bodyPr/>
-          <a:lstStyle/>
-          <a:p>
-            <a:r>
-              <a:rPr lang="en-GB" dirty="0"/>
-              <a:t>Upcoming Events..</a:t>
-            </a:r>
-          </a:p>
-        </p:txBody>
-      </p:sp>
-      <p:pic>
-        <p:nvPicPr>
-          <p:cNvPr id="6" name="Picture 2" descr="http://photos1.meetupstatic.com/photos/theme_head/b/7/b/8/full_3047032.jpeg"/>
-          <p:cNvPicPr>
-            <a:picLocks noChangeAspect="1" noChangeArrowheads="1"/>
-          </p:cNvPicPr>
-          <p:nvPr/>
-        </p:nvPicPr>
-        <p:blipFill>
           <a:blip r:embed="rId2" cstate="print"/>
           <a:srcRect/>
           <a:stretch>
@@ -5818,7 +5500,7 @@
 </p:sld>
 </file>
 
-<file path=ppt/slides/slide8.xml><?xml version="1.0" encoding="utf-8"?>
+<file path=ppt/slides/slide7.xml><?xml version="1.0" encoding="utf-8"?>
 <p:sld xmlns:a="http://schemas.openxmlformats.org/drawingml/2006/main" xmlns:r="http://schemas.openxmlformats.org/officeDocument/2006/relationships" xmlns:p="http://schemas.openxmlformats.org/presentationml/2006/main" showMasterSp="0">
   <p:cSld>
     <p:spTree>
@@ -5968,10 +5650,10 @@
                 <a:ea typeface="+mj-ea"/>
                 <a:cs typeface="+mj-cs"/>
               </a:rPr>
-              <a:t>Mark Allan</a:t>
+              <a:t>Matteo Emili</a:t>
             </a:r>
             <a:br>
-              <a:rPr lang="en-GB" sz="6600" b="1" dirty="0">
+              <a:rPr lang="en-GB" sz="6600" b="1">
                 <a:solidFill>
                   <a:schemeClr val="bg1"/>
                 </a:solidFill>
@@ -5988,7 +5670,7 @@
               </a:rPr>
             </a:br>
             <a:r>
-              <a:rPr lang="en-GB" sz="6600" b="1" dirty="0">
+              <a:rPr lang="en-GB" sz="6600" b="1">
                 <a:solidFill>
                   <a:schemeClr val="bg1"/>
                 </a:solidFill>
@@ -6003,42 +5685,7 @@
                 <a:ea typeface="+mj-ea"/>
                 <a:cs typeface="+mj-cs"/>
               </a:rPr>
-              <a:t>Azure Functions</a:t>
-            </a:r>
-            <a:br>
-              <a:rPr lang="en-GB" sz="6600" b="1" dirty="0">
-                <a:solidFill>
-                  <a:schemeClr val="bg1"/>
-                </a:solidFill>
-                <a:effectLst>
-                  <a:outerShdw blurRad="38100" dist="38100" dir="2700000" algn="tl">
-                    <a:srgbClr val="000000">
-                      <a:alpha val="43137"/>
-                    </a:srgbClr>
-                  </a:outerShdw>
-                </a:effectLst>
-                <a:latin typeface="+mj-lt"/>
-                <a:ea typeface="+mj-ea"/>
-                <a:cs typeface="+mj-cs"/>
-              </a:rPr>
-            </a:br>
-            <a:r>
-              <a:rPr lang="en-GB" sz="6600" b="1" dirty="0" err="1">
-                <a:solidFill>
-                  <a:schemeClr val="bg1"/>
-                </a:solidFill>
-                <a:effectLst>
-                  <a:outerShdw blurRad="38100" dist="38100" dir="2700000" algn="tl">
-                    <a:srgbClr val="000000">
-                      <a:alpha val="43137"/>
-                    </a:srgbClr>
-                  </a:outerShdw>
-                </a:effectLst>
-                <a:latin typeface="+mj-lt"/>
-                <a:ea typeface="+mj-ea"/>
-                <a:cs typeface="+mj-cs"/>
-              </a:rPr>
-              <a:t>DocumentDB</a:t>
+              <a:t>Packages…</a:t>
             </a:r>
             <a:endParaRPr lang="en-GB" sz="6600" b="1" dirty="0">
               <a:solidFill>

</xml_diff>

<commit_message>
Added progressive .net conf to Aug
</commit_message>
<xml_diff>
--- a/WelcomePresentation-SmartDevs.pptx
+++ b/WelcomePresentation-SmartDevs.pptx
@@ -5,7 +5,7 @@
     <p:sldMasterId id="2147483648" r:id="rId1"/>
   </p:sldMasterIdLst>
   <p:notesMasterIdLst>
-    <p:notesMasterId r:id="rId10"/>
+    <p:notesMasterId r:id="rId11"/>
   </p:notesMasterIdLst>
   <p:sldIdLst>
     <p:sldId id="256" r:id="rId2"/>
@@ -13,9 +13,10 @@
     <p:sldId id="257" r:id="rId4"/>
     <p:sldId id="268" r:id="rId5"/>
     <p:sldId id="275" r:id="rId6"/>
-    <p:sldId id="274" r:id="rId7"/>
-    <p:sldId id="276" r:id="rId8"/>
-    <p:sldId id="269" r:id="rId9"/>
+    <p:sldId id="277" r:id="rId7"/>
+    <p:sldId id="274" r:id="rId8"/>
+    <p:sldId id="276" r:id="rId9"/>
+    <p:sldId id="269" r:id="rId10"/>
   </p:sldIdLst>
   <p:sldSz cx="12192000" cy="6858000"/>
   <p:notesSz cx="6858000" cy="9144000"/>
@@ -739,7 +740,96 @@
           <a:p>
             <a:fld id="{9E596088-AF84-4048-9612-0BD6F107496A}" type="slidenum">
               <a:rPr lang="en-GB" smtClean="0"/>
-              <a:t>8</a:t>
+              <a:t>6</a:t>
+            </a:fld>
+            <a:endParaRPr lang="en-GB"/>
+          </a:p>
+        </p:txBody>
+      </p:sp>
+    </p:spTree>
+    <p:extLst>
+      <p:ext uri="{BB962C8B-B14F-4D97-AF65-F5344CB8AC3E}">
+        <p14:creationId xmlns:p14="http://schemas.microsoft.com/office/powerpoint/2010/main" val="3326086265"/>
+      </p:ext>
+    </p:extLst>
+  </p:cSld>
+  <p:clrMapOvr>
+    <a:masterClrMapping/>
+  </p:clrMapOvr>
+</p:notes>
+</file>
+
+<file path=ppt/notesSlides/notesSlide4.xml><?xml version="1.0" encoding="utf-8"?>
+<p:notes xmlns:a="http://schemas.openxmlformats.org/drawingml/2006/main" xmlns:r="http://schemas.openxmlformats.org/officeDocument/2006/relationships" xmlns:p="http://schemas.openxmlformats.org/presentationml/2006/main">
+  <p:cSld>
+    <p:spTree>
+      <p:nvGrpSpPr>
+        <p:cNvPr id="1" name=""/>
+        <p:cNvGrpSpPr/>
+        <p:nvPr/>
+      </p:nvGrpSpPr>
+      <p:grpSpPr>
+        <a:xfrm>
+          <a:off x="0" y="0"/>
+          <a:ext cx="0" cy="0"/>
+          <a:chOff x="0" y="0"/>
+          <a:chExt cx="0" cy="0"/>
+        </a:xfrm>
+      </p:grpSpPr>
+      <p:sp>
+        <p:nvSpPr>
+          <p:cNvPr id="2" name="Slide Image Placeholder 1"/>
+          <p:cNvSpPr>
+            <a:spLocks noGrp="1" noRot="1" noChangeAspect="1"/>
+          </p:cNvSpPr>
+          <p:nvPr>
+            <p:ph type="sldImg"/>
+          </p:nvPr>
+        </p:nvSpPr>
+        <p:spPr>
+          <a:xfrm>
+            <a:off x="381000" y="685800"/>
+            <a:ext cx="6096000" cy="3429000"/>
+          </a:xfrm>
+        </p:spPr>
+      </p:sp>
+      <p:sp>
+        <p:nvSpPr>
+          <p:cNvPr id="3" name="Notes Placeholder 2"/>
+          <p:cNvSpPr>
+            <a:spLocks noGrp="1"/>
+          </p:cNvSpPr>
+          <p:nvPr>
+            <p:ph type="body" idx="1"/>
+          </p:nvPr>
+        </p:nvSpPr>
+        <p:spPr/>
+        <p:txBody>
+          <a:bodyPr/>
+          <a:lstStyle/>
+          <a:p>
+            <a:endParaRPr lang="en-GB" dirty="0"/>
+          </a:p>
+        </p:txBody>
+      </p:sp>
+      <p:sp>
+        <p:nvSpPr>
+          <p:cNvPr id="4" name="Slide Number Placeholder 3"/>
+          <p:cNvSpPr>
+            <a:spLocks noGrp="1"/>
+          </p:cNvSpPr>
+          <p:nvPr>
+            <p:ph type="sldNum" sz="quarter" idx="10"/>
+          </p:nvPr>
+        </p:nvSpPr>
+        <p:spPr/>
+        <p:txBody>
+          <a:bodyPr/>
+          <a:lstStyle/>
+          <a:p>
+            <a:fld id="{9E596088-AF84-4048-9612-0BD6F107496A}" type="slidenum">
+              <a:rPr lang="en-GB" smtClean="0"/>
+              <a:t>9</a:t>
             </a:fld>
             <a:endParaRPr lang="en-GB"/>
           </a:p>
@@ -4606,39 +4696,6 @@
                 <a:cs typeface="+mj-cs"/>
               </a:rPr>
             </a:br>
-            <a:endParaRPr lang="en-GB" sz="6000" b="1" dirty="0">
-              <a:solidFill>
-                <a:schemeClr val="bg1">
-                  <a:lumMod val="95000"/>
-                </a:schemeClr>
-              </a:solidFill>
-              <a:latin typeface="+mj-lt"/>
-              <a:ea typeface="+mj-ea"/>
-              <a:cs typeface="+mj-cs"/>
-            </a:endParaRPr>
-          </a:p>
-          <a:p>
-            <a:pPr marL="857250" indent="-857250">
-              <a:spcBef>
-                <a:spcPct val="0"/>
-              </a:spcBef>
-              <a:buFont typeface="Arial" panose="020B0604020202020204" pitchFamily="34" charset="0"/>
-              <a:buChar char="•"/>
-              <a:defRPr/>
-            </a:pPr>
-            <a:r>
-              <a:rPr lang="en-GB" sz="3200" b="1" dirty="0" err="1">
-                <a:solidFill>
-                  <a:schemeClr val="bg1">
-                    <a:lumMod val="95000"/>
-                  </a:schemeClr>
-                </a:solidFill>
-                <a:latin typeface="+mj-lt"/>
-                <a:ea typeface="+mj-ea"/>
-                <a:cs typeface="+mj-cs"/>
-              </a:rPr>
-              <a:t>OzCode</a:t>
-            </a:r>
             <a:endParaRPr lang="en-GB" sz="3200" b="1" dirty="0">
               <a:solidFill>
                 <a:schemeClr val="bg1">
@@ -4651,14 +4708,38 @@
             </a:endParaRPr>
           </a:p>
           <a:p>
-            <a:pPr marL="857250" indent="-857250">
+            <a:pPr>
               <a:spcBef>
                 <a:spcPct val="0"/>
               </a:spcBef>
-              <a:buFont typeface="Arial" panose="020B0604020202020204" pitchFamily="34" charset="0"/>
-              <a:buChar char="•"/>
               <a:defRPr/>
             </a:pPr>
+            <a:r>
+              <a:rPr lang="en-GB" sz="3200" b="1" dirty="0">
+                <a:solidFill>
+                  <a:schemeClr val="bg1">
+                    <a:lumMod val="95000"/>
+                  </a:schemeClr>
+                </a:solidFill>
+                <a:latin typeface="+mj-lt"/>
+                <a:ea typeface="+mj-ea"/>
+                <a:cs typeface="+mj-cs"/>
+              </a:rPr>
+              <a:t> - </a:t>
+            </a:r>
+            <a:r>
+              <a:rPr lang="en-GB" sz="3200" b="1" dirty="0" err="1">
+                <a:solidFill>
+                  <a:schemeClr val="bg1">
+                    <a:lumMod val="95000"/>
+                  </a:schemeClr>
+                </a:solidFill>
+                <a:latin typeface="+mj-lt"/>
+                <a:ea typeface="+mj-ea"/>
+                <a:cs typeface="+mj-cs"/>
+              </a:rPr>
+              <a:t>OzCode</a:t>
+            </a:r>
             <a:endParaRPr lang="en-GB" sz="3200" b="1" dirty="0">
               <a:solidFill>
                 <a:schemeClr val="bg1">
@@ -4671,14 +4752,25 @@
             </a:endParaRPr>
           </a:p>
           <a:p>
-            <a:pPr marL="857250" indent="-857250">
+            <a:pPr>
               <a:spcBef>
                 <a:spcPct val="0"/>
               </a:spcBef>
-              <a:buFont typeface="Arial" panose="020B0604020202020204" pitchFamily="34" charset="0"/>
-              <a:buChar char="•"/>
               <a:defRPr/>
             </a:pPr>
+            <a:r>
+              <a:rPr lang="en-GB" sz="3200" b="1" dirty="0">
+                <a:solidFill>
+                  <a:schemeClr val="bg1">
+                    <a:lumMod val="95000"/>
+                  </a:schemeClr>
+                </a:solidFill>
+                <a:latin typeface="+mj-lt"/>
+                <a:ea typeface="+mj-ea"/>
+                <a:cs typeface="+mj-cs"/>
+              </a:rPr>
+              <a:t> - </a:t>
+            </a:r>
             <a:r>
               <a:rPr lang="en-GB" sz="3200" b="1" dirty="0" err="1">
                 <a:solidFill>
@@ -4710,6 +4802,57 @@
               </a:spcBef>
               <a:defRPr/>
             </a:pPr>
+            <a:r>
+              <a:rPr lang="en-GB" sz="3200" b="1" dirty="0">
+                <a:solidFill>
+                  <a:schemeClr val="bg1">
+                    <a:lumMod val="95000"/>
+                  </a:schemeClr>
+                </a:solidFill>
+                <a:latin typeface="+mj-lt"/>
+                <a:ea typeface="+mj-ea"/>
+                <a:cs typeface="+mj-cs"/>
+              </a:rPr>
+              <a:t> - </a:t>
+            </a:r>
+            <a:r>
+              <a:rPr lang="en-GB" sz="3200" b="1" dirty="0" err="1">
+                <a:solidFill>
+                  <a:schemeClr val="bg1">
+                    <a:lumMod val="95000"/>
+                  </a:schemeClr>
+                </a:solidFill>
+                <a:latin typeface="+mj-lt"/>
+                <a:ea typeface="+mj-ea"/>
+                <a:cs typeface="+mj-cs"/>
+              </a:rPr>
+              <a:t>Rippo</a:t>
+            </a:r>
+            <a:r>
+              <a:rPr lang="en-GB" sz="3200" b="1" dirty="0">
+                <a:solidFill>
+                  <a:schemeClr val="bg1">
+                    <a:lumMod val="95000"/>
+                  </a:schemeClr>
+                </a:solidFill>
+                <a:latin typeface="+mj-lt"/>
+                <a:ea typeface="+mj-ea"/>
+                <a:cs typeface="+mj-cs"/>
+              </a:rPr>
+              <a:t>/Ryan – Pizza + Venue</a:t>
+            </a:r>
+            <a:br>
+              <a:rPr lang="en-GB" sz="3200" b="1" dirty="0">
+                <a:solidFill>
+                  <a:schemeClr val="bg1">
+                    <a:lumMod val="95000"/>
+                  </a:schemeClr>
+                </a:solidFill>
+                <a:latin typeface="+mj-lt"/>
+                <a:ea typeface="+mj-ea"/>
+                <a:cs typeface="+mj-cs"/>
+              </a:rPr>
+            </a:br>
             <a:endParaRPr lang="en-GB" sz="3200" b="1" dirty="0">
               <a:solidFill>
                 <a:schemeClr val="bg1">
@@ -4722,12 +4865,10 @@
             </a:endParaRPr>
           </a:p>
           <a:p>
-            <a:pPr marL="857250" indent="-857250">
+            <a:pPr>
               <a:spcBef>
                 <a:spcPct val="0"/>
               </a:spcBef>
-              <a:buFont typeface="Arial" panose="020B0604020202020204" pitchFamily="34" charset="0"/>
-              <a:buChar char="•"/>
               <a:defRPr/>
             </a:pPr>
             <a:r>
@@ -4741,32 +4882,7 @@
                 <a:ea typeface="+mj-ea"/>
                 <a:cs typeface="+mj-cs"/>
               </a:rPr>
-              <a:t>Rippo/Ryan – Pizza + Venue</a:t>
-            </a:r>
-            <a:br>
-              <a:rPr lang="en-GB" sz="3200" b="1" dirty="0">
-                <a:solidFill>
-                  <a:schemeClr val="bg1">
-                    <a:lumMod val="95000"/>
-                  </a:schemeClr>
-                </a:solidFill>
-                <a:latin typeface="+mj-lt"/>
-                <a:ea typeface="+mj-ea"/>
-                <a:cs typeface="+mj-cs"/>
-              </a:rPr>
-            </a:br>
-            <a:r>
-              <a:rPr lang="en-GB" sz="3200" b="1" dirty="0">
-                <a:solidFill>
-                  <a:schemeClr val="bg1">
-                    <a:lumMod val="95000"/>
-                  </a:schemeClr>
-                </a:solidFill>
-                <a:latin typeface="+mj-lt"/>
-                <a:ea typeface="+mj-ea"/>
-                <a:cs typeface="+mj-cs"/>
-              </a:rPr>
-              <a:t>Donations gladly accepted</a:t>
+              <a:t>	Donations gladly accepted!</a:t>
             </a:r>
             <a:br>
               <a:rPr lang="en-GB" sz="6000" b="1" dirty="0">
@@ -4935,8 +5051,8 @@
         </p:nvSpPr>
         <p:spPr>
           <a:xfrm>
-            <a:off x="2207568" y="2852936"/>
-            <a:ext cx="8136904" cy="3168352"/>
+            <a:off x="407368" y="1560514"/>
+            <a:ext cx="11377264" cy="4460774"/>
           </a:xfrm>
           <a:prstGeom prst="rect">
             <a:avLst/>
@@ -4965,10 +5081,10 @@
                 <a:ea typeface="+mj-ea"/>
                 <a:cs typeface="+mj-cs"/>
               </a:rPr>
-              <a:t>Coming up</a:t>
+              <a:t>Progressive .NET 2017</a:t>
             </a:r>
             <a:br>
-              <a:rPr lang="en-GB" sz="2800" b="1" dirty="0">
+              <a:rPr lang="en-GB" sz="2800" b="1">
                 <a:solidFill>
                   <a:schemeClr val="bg1">
                     <a:lumMod val="95000"/>
@@ -4979,8 +5095,8 @@
                 <a:cs typeface="+mj-cs"/>
               </a:rPr>
             </a:br>
-            <a:r>
-              <a:rPr lang="en-GB" sz="2800" b="1" dirty="0">
+            <a:br>
+              <a:rPr lang="en-GB" sz="2800" b="1">
                 <a:solidFill>
                   <a:schemeClr val="bg1">
                     <a:lumMod val="95000"/>
@@ -4990,10 +5106,9 @@
                 <a:ea typeface="+mj-ea"/>
                 <a:cs typeface="+mj-cs"/>
               </a:rPr>
-              <a:t>SEP - The Secrets of </a:t>
-            </a:r>
-            <a:r>
-              <a:rPr lang="en-GB" sz="2800" b="1" dirty="0" err="1">
+            </a:br>
+            <a:r>
+              <a:rPr lang="en-GB" sz="2800" b="1">
                 <a:solidFill>
                   <a:schemeClr val="bg1">
                     <a:lumMod val="95000"/>
@@ -5003,7 +5118,7 @@
                 <a:ea typeface="+mj-ea"/>
                 <a:cs typeface="+mj-cs"/>
               </a:rPr>
-              <a:t>MonoGame</a:t>
+              <a:t>Discount </a:t>
             </a:r>
             <a:r>
               <a:rPr lang="en-GB" sz="2800" b="1" dirty="0">
@@ -5016,7 +5131,33 @@
                 <a:ea typeface="+mj-ea"/>
                 <a:cs typeface="+mj-cs"/>
               </a:rPr>
-              <a:t> Trump wants banned! – Andy Clarke</a:t>
+              <a:t>for </a:t>
+            </a:r>
+            <a:r>
+              <a:rPr lang="en-GB" sz="2800" b="1" dirty="0" err="1">
+                <a:solidFill>
+                  <a:schemeClr val="bg1">
+                    <a:lumMod val="95000"/>
+                  </a:schemeClr>
+                </a:solidFill>
+                <a:latin typeface="+mj-lt"/>
+                <a:ea typeface="+mj-ea"/>
+                <a:cs typeface="+mj-cs"/>
+              </a:rPr>
+              <a:t>Smartdev</a:t>
+            </a:r>
+            <a:r>
+              <a:rPr lang="en-GB" sz="2800" b="1" dirty="0">
+                <a:solidFill>
+                  <a:schemeClr val="bg1">
+                    <a:lumMod val="95000"/>
+                  </a:schemeClr>
+                </a:solidFill>
+                <a:latin typeface="+mj-lt"/>
+                <a:ea typeface="+mj-ea"/>
+                <a:cs typeface="+mj-cs"/>
+              </a:rPr>
+              <a:t> members, use</a:t>
             </a:r>
           </a:p>
           <a:p>
@@ -5027,17 +5168,15 @@
               <a:defRPr/>
             </a:pPr>
             <a:r>
-              <a:rPr lang="en-GB" sz="2800" b="1" dirty="0">
-                <a:solidFill>
-                  <a:schemeClr val="bg1">
-                    <a:lumMod val="95000"/>
-                  </a:schemeClr>
+              <a:rPr lang="en-GB" sz="4000" dirty="0">
+                <a:solidFill>
+                  <a:schemeClr val="bg1"/>
                 </a:solidFill>
                 <a:latin typeface="+mj-lt"/>
                 <a:ea typeface="+mj-ea"/>
                 <a:cs typeface="+mj-cs"/>
               </a:rPr>
-              <a:t>OCT - Elastic Search and Kibana – Neil Barnwell</a:t>
+              <a:t>SMARTDEVS_PROGNET20 to get 20% off ticket price</a:t>
             </a:r>
           </a:p>
           <a:p>
@@ -5047,44 +5186,6 @@
               </a:spcBef>
               <a:defRPr/>
             </a:pPr>
-            <a:r>
-              <a:rPr lang="en-GB" sz="2800" b="1" dirty="0">
-                <a:solidFill>
-                  <a:schemeClr val="bg1">
-                    <a:lumMod val="95000"/>
-                  </a:schemeClr>
-                </a:solidFill>
-                <a:latin typeface="+mj-lt"/>
-                <a:ea typeface="+mj-ea"/>
-                <a:cs typeface="+mj-cs"/>
-              </a:rPr>
-              <a:t>NOV - YOU CHOOSE! – Thom </a:t>
-            </a:r>
-            <a:r>
-              <a:rPr lang="en-GB" sz="2800" b="1" dirty="0" err="1">
-                <a:solidFill>
-                  <a:schemeClr val="bg1">
-                    <a:lumMod val="95000"/>
-                  </a:schemeClr>
-                </a:solidFill>
-                <a:latin typeface="+mj-lt"/>
-                <a:ea typeface="+mj-ea"/>
-                <a:cs typeface="+mj-cs"/>
-              </a:rPr>
-              <a:t>Legget</a:t>
-            </a:r>
-            <a:br>
-              <a:rPr lang="en-GB" sz="4000" b="1" dirty="0">
-                <a:solidFill>
-                  <a:schemeClr val="bg1">
-                    <a:lumMod val="95000"/>
-                  </a:schemeClr>
-                </a:solidFill>
-                <a:latin typeface="+mj-lt"/>
-                <a:ea typeface="+mj-ea"/>
-                <a:cs typeface="+mj-cs"/>
-              </a:rPr>
-            </a:br>
             <a:endParaRPr lang="en-GB" sz="4000" dirty="0">
               <a:solidFill>
                 <a:schemeClr val="bg1"/>
@@ -5093,6 +5194,37 @@
               <a:ea typeface="+mj-ea"/>
               <a:cs typeface="+mj-cs"/>
             </a:endParaRPr>
+          </a:p>
+          <a:p>
+            <a:pPr algn="ctr">
+              <a:spcBef>
+                <a:spcPct val="0"/>
+              </a:spcBef>
+              <a:defRPr/>
+            </a:pPr>
+            <a:r>
+              <a:rPr lang="en-GB" sz="4000" dirty="0">
+                <a:solidFill>
+                  <a:schemeClr val="bg1"/>
+                </a:solidFill>
+                <a:latin typeface="+mj-lt"/>
+                <a:ea typeface="+mj-ea"/>
+                <a:cs typeface="+mj-cs"/>
+                <a:hlinkClick r:id="rId4"/>
+              </a:rPr>
+              <a:t>https://skillsmatter.com/conferences/8268-progressive-dot-net-2017</a:t>
+            </a:r>
+            <a:r>
+              <a:rPr lang="en-GB" sz="4000" dirty="0">
+                <a:solidFill>
+                  <a:schemeClr val="bg1"/>
+                </a:solidFill>
+                <a:latin typeface="+mj-lt"/>
+                <a:ea typeface="+mj-ea"/>
+                <a:cs typeface="+mj-cs"/>
+              </a:rPr>
+              <a:t> </a:t>
+            </a:r>
           </a:p>
         </p:txBody>
       </p:sp>
@@ -5210,7 +5342,7 @@
           <p:nvPr/>
         </p:nvPicPr>
         <p:blipFill>
-          <a:blip r:embed="rId2" cstate="print"/>
+          <a:blip r:embed="rId3" cstate="print"/>
           <a:srcRect/>
           <a:stretch>
             <a:fillRect/>
@@ -5237,8 +5369,8 @@
         </p:nvSpPr>
         <p:spPr>
           <a:xfrm>
-            <a:off x="407368" y="2636912"/>
-            <a:ext cx="11521280" cy="3384376"/>
+            <a:off x="407368" y="1560514"/>
+            <a:ext cx="11377264" cy="4460774"/>
           </a:xfrm>
           <a:prstGeom prst="rect">
             <a:avLst/>
@@ -5257,24 +5389,68 @@
               <a:defRPr/>
             </a:pPr>
             <a:r>
-              <a:rPr lang="en-GB" sz="4800" b="1" dirty="0">
-                <a:solidFill>
-                  <a:schemeClr val="bg1">
-                    <a:lumMod val="95000"/>
-                  </a:schemeClr>
-                </a:solidFill>
-                <a:effectLst>
-                  <a:outerShdw blurRad="38100" dist="38100" dir="2700000" algn="tl">
-                    <a:srgbClr val="000000">
-                      <a:alpha val="43137"/>
-                    </a:srgbClr>
-                  </a:outerShdw>
-                </a:effectLst>
+              <a:rPr lang="en-GB" sz="6000" b="1" dirty="0">
+                <a:solidFill>
+                  <a:schemeClr val="bg1">
+                    <a:lumMod val="95000"/>
+                  </a:schemeClr>
+                </a:solidFill>
                 <a:latin typeface="+mj-lt"/>
                 <a:ea typeface="+mj-ea"/>
                 <a:cs typeface="+mj-cs"/>
               </a:rPr>
-              <a:t>VOTE for 2</a:t>
+              <a:t>Coming up</a:t>
+            </a:r>
+            <a:br>
+              <a:rPr lang="en-GB" sz="2800" b="1" dirty="0">
+                <a:solidFill>
+                  <a:schemeClr val="bg1">
+                    <a:lumMod val="95000"/>
+                  </a:schemeClr>
+                </a:solidFill>
+                <a:latin typeface="+mj-lt"/>
+                <a:ea typeface="+mj-ea"/>
+                <a:cs typeface="+mj-cs"/>
+              </a:rPr>
+            </a:br>
+            <a:r>
+              <a:rPr lang="en-GB" sz="2800" b="1" dirty="0">
+                <a:solidFill>
+                  <a:schemeClr val="bg1">
+                    <a:lumMod val="95000"/>
+                  </a:schemeClr>
+                </a:solidFill>
+                <a:latin typeface="+mj-lt"/>
+                <a:ea typeface="+mj-ea"/>
+                <a:cs typeface="+mj-cs"/>
+              </a:rPr>
+              <a:t>SEP - The Secrets of </a:t>
+            </a:r>
+            <a:r>
+              <a:rPr lang="en-GB" sz="2800" b="1" dirty="0" err="1">
+                <a:solidFill>
+                  <a:schemeClr val="bg1">
+                    <a:lumMod val="95000"/>
+                  </a:schemeClr>
+                </a:solidFill>
+                <a:latin typeface="+mj-lt"/>
+                <a:ea typeface="+mj-ea"/>
+                <a:cs typeface="+mj-cs"/>
+              </a:rPr>
+              <a:t>MonoGame</a:t>
+            </a:r>
+            <a:r>
+              <a:rPr lang="en-GB" sz="2800" b="1" dirty="0">
+                <a:solidFill>
+                  <a:schemeClr val="bg1">
+                    <a:lumMod val="95000"/>
+                  </a:schemeClr>
+                </a:solidFill>
+                <a:latin typeface="+mj-lt"/>
+                <a:ea typeface="+mj-ea"/>
+                <a:cs typeface="+mj-cs"/>
+              </a:rPr>
+              <a:t> Trump wants banned! – Andy Clarke</a:t>
             </a:r>
           </a:p>
           <a:p>
@@ -5284,44 +5460,18 @@
               </a:spcBef>
               <a:defRPr/>
             </a:pPr>
-            <a:br>
-              <a:rPr lang="en-GB" sz="4800" dirty="0">
-                <a:solidFill>
-                  <a:schemeClr val="bg1">
-                    <a:lumMod val="95000"/>
-                  </a:schemeClr>
-                </a:solidFill>
-                <a:effectLst>
-                  <a:outerShdw blurRad="38100" dist="38100" dir="2700000" algn="tl">
-                    <a:srgbClr val="000000">
-                      <a:alpha val="43137"/>
-                    </a:srgbClr>
-                  </a:outerShdw>
-                </a:effectLst>
+            <a:r>
+              <a:rPr lang="en-GB" sz="2800" b="1" dirty="0">
+                <a:solidFill>
+                  <a:schemeClr val="bg1">
+                    <a:lumMod val="95000"/>
+                  </a:schemeClr>
+                </a:solidFill>
                 <a:latin typeface="+mj-lt"/>
                 <a:ea typeface="+mj-ea"/>
                 <a:cs typeface="+mj-cs"/>
               </a:rPr>
-            </a:br>
-            <a:r>
-              <a:rPr lang="en-GB" sz="4800" dirty="0">
-                <a:solidFill>
-                  <a:schemeClr val="bg1">
-                    <a:lumMod val="95000"/>
-                  </a:schemeClr>
-                </a:solidFill>
-                <a:effectLst>
-                  <a:outerShdw blurRad="38100" dist="38100" dir="2700000" algn="tl">
-                    <a:srgbClr val="000000">
-                      <a:alpha val="43137"/>
-                    </a:srgbClr>
-                  </a:outerShdw>
-                </a:effectLst>
-                <a:latin typeface="+mj-lt"/>
-                <a:ea typeface="+mj-ea"/>
-                <a:cs typeface="+mj-cs"/>
-              </a:rPr>
-              <a:t>1. Kubernetes 101</a:t>
+              <a:t>OCT - Elastic Search and Kibana – Neil Barnwell</a:t>
             </a:r>
           </a:p>
           <a:p>
@@ -5332,228 +5482,51 @@
               <a:defRPr/>
             </a:pPr>
             <a:r>
-              <a:rPr lang="en-GB" sz="4800" dirty="0">
-                <a:solidFill>
-                  <a:schemeClr val="bg1">
-                    <a:lumMod val="95000"/>
-                  </a:schemeClr>
-                </a:solidFill>
-                <a:effectLst>
-                  <a:outerShdw blurRad="38100" dist="38100" dir="2700000" algn="tl">
-                    <a:srgbClr val="000000">
-                      <a:alpha val="43137"/>
-                    </a:srgbClr>
-                  </a:outerShdw>
-                </a:effectLst>
+              <a:rPr lang="en-GB" sz="2800" b="1" dirty="0">
+                <a:solidFill>
+                  <a:schemeClr val="bg1">
+                    <a:lumMod val="95000"/>
+                  </a:schemeClr>
+                </a:solidFill>
                 <a:latin typeface="+mj-lt"/>
                 <a:ea typeface="+mj-ea"/>
                 <a:cs typeface="+mj-cs"/>
               </a:rPr>
-              <a:t>2. Developing a new cloud provider for </a:t>
-            </a:r>
-            <a:r>
-              <a:rPr lang="en-GB" sz="4800" dirty="0" err="1">
-                <a:solidFill>
-                  <a:schemeClr val="bg1">
-                    <a:lumMod val="95000"/>
-                  </a:schemeClr>
-                </a:solidFill>
-                <a:effectLst>
-                  <a:outerShdw blurRad="38100" dist="38100" dir="2700000" algn="tl">
-                    <a:srgbClr val="000000">
-                      <a:alpha val="43137"/>
-                    </a:srgbClr>
-                  </a:outerShdw>
-                </a:effectLst>
+              <a:t>NOV - YOU CHOOSE! – Thom </a:t>
+            </a:r>
+            <a:r>
+              <a:rPr lang="en-GB" sz="2800" b="1" dirty="0" err="1">
+                <a:solidFill>
+                  <a:schemeClr val="bg1">
+                    <a:lumMod val="95000"/>
+                  </a:schemeClr>
+                </a:solidFill>
                 <a:latin typeface="+mj-lt"/>
                 <a:ea typeface="+mj-ea"/>
                 <a:cs typeface="+mj-cs"/>
               </a:rPr>
-              <a:t>Kube</a:t>
-            </a:r>
-            <a:endParaRPr lang="en-GB" sz="4800" dirty="0">
+              <a:t>Legget</a:t>
+            </a:r>
+            <a:br>
+              <a:rPr lang="en-GB" sz="4000" b="1" dirty="0">
+                <a:solidFill>
+                  <a:schemeClr val="bg1">
+                    <a:lumMod val="95000"/>
+                  </a:schemeClr>
+                </a:solidFill>
+                <a:latin typeface="+mj-lt"/>
+                <a:ea typeface="+mj-ea"/>
+                <a:cs typeface="+mj-cs"/>
+              </a:rPr>
+            </a:br>
+            <a:endParaRPr lang="en-GB" sz="4000" dirty="0">
               <a:solidFill>
-                <a:schemeClr val="bg1">
-                  <a:lumMod val="95000"/>
-                </a:schemeClr>
+                <a:schemeClr val="bg1"/>
               </a:solidFill>
-              <a:effectLst>
-                <a:outerShdw blurRad="38100" dist="38100" dir="2700000" algn="tl">
-                  <a:srgbClr val="000000">
-                    <a:alpha val="43137"/>
-                  </a:srgbClr>
-                </a:outerShdw>
-              </a:effectLst>
               <a:latin typeface="+mj-lt"/>
               <a:ea typeface="+mj-ea"/>
               <a:cs typeface="+mj-cs"/>
             </a:endParaRPr>
-          </a:p>
-          <a:p>
-            <a:pPr algn="ctr">
-              <a:spcBef>
-                <a:spcPct val="0"/>
-              </a:spcBef>
-              <a:defRPr/>
-            </a:pPr>
-            <a:r>
-              <a:rPr lang="en-GB" sz="4800" dirty="0">
-                <a:solidFill>
-                  <a:schemeClr val="bg1">
-                    <a:lumMod val="95000"/>
-                  </a:schemeClr>
-                </a:solidFill>
-                <a:effectLst>
-                  <a:outerShdw blurRad="38100" dist="38100" dir="2700000" algn="tl">
-                    <a:srgbClr val="000000">
-                      <a:alpha val="43137"/>
-                    </a:srgbClr>
-                  </a:outerShdw>
-                </a:effectLst>
-                <a:latin typeface="+mj-lt"/>
-                <a:ea typeface="+mj-ea"/>
-                <a:cs typeface="+mj-cs"/>
-              </a:rPr>
-              <a:t>3. </a:t>
-            </a:r>
-            <a:r>
-              <a:rPr lang="en-GB" sz="4800" dirty="0" err="1">
-                <a:solidFill>
-                  <a:schemeClr val="bg1">
-                    <a:lumMod val="95000"/>
-                  </a:schemeClr>
-                </a:solidFill>
-                <a:effectLst>
-                  <a:outerShdw blurRad="38100" dist="38100" dir="2700000" algn="tl">
-                    <a:srgbClr val="000000">
-                      <a:alpha val="43137"/>
-                    </a:srgbClr>
-                  </a:outerShdw>
-                </a:effectLst>
-                <a:latin typeface="+mj-lt"/>
-                <a:ea typeface="+mj-ea"/>
-                <a:cs typeface="+mj-cs"/>
-              </a:rPr>
-              <a:t>Serverless</a:t>
-            </a:r>
-            <a:r>
-              <a:rPr lang="en-GB" sz="4800" dirty="0">
-                <a:solidFill>
-                  <a:schemeClr val="bg1">
-                    <a:lumMod val="95000"/>
-                  </a:schemeClr>
-                </a:solidFill>
-                <a:effectLst>
-                  <a:outerShdw blurRad="38100" dist="38100" dir="2700000" algn="tl">
-                    <a:srgbClr val="000000">
-                      <a:alpha val="43137"/>
-                    </a:srgbClr>
-                  </a:outerShdw>
-                </a:effectLst>
-                <a:latin typeface="+mj-lt"/>
-                <a:ea typeface="+mj-ea"/>
-                <a:cs typeface="+mj-cs"/>
-              </a:rPr>
-              <a:t> with docker</a:t>
-            </a:r>
-          </a:p>
-          <a:p>
-            <a:pPr algn="ctr">
-              <a:spcBef>
-                <a:spcPct val="0"/>
-              </a:spcBef>
-              <a:defRPr/>
-            </a:pPr>
-            <a:r>
-              <a:rPr lang="en-GB" sz="4800" dirty="0">
-                <a:solidFill>
-                  <a:schemeClr val="bg1">
-                    <a:lumMod val="95000"/>
-                  </a:schemeClr>
-                </a:solidFill>
-                <a:effectLst>
-                  <a:outerShdw blurRad="38100" dist="38100" dir="2700000" algn="tl">
-                    <a:srgbClr val="000000">
-                      <a:alpha val="43137"/>
-                    </a:srgbClr>
-                  </a:outerShdw>
-                </a:effectLst>
-                <a:latin typeface="+mj-lt"/>
-                <a:ea typeface="+mj-ea"/>
-                <a:cs typeface="+mj-cs"/>
-              </a:rPr>
-              <a:t>4. ci/cd for containers</a:t>
-            </a:r>
-          </a:p>
-          <a:p>
-            <a:pPr algn="ctr">
-              <a:spcBef>
-                <a:spcPct val="0"/>
-              </a:spcBef>
-              <a:defRPr/>
-            </a:pPr>
-            <a:r>
-              <a:rPr lang="en-GB" sz="4800" dirty="0">
-                <a:solidFill>
-                  <a:schemeClr val="bg1">
-                    <a:lumMod val="95000"/>
-                  </a:schemeClr>
-                </a:solidFill>
-                <a:effectLst>
-                  <a:outerShdw blurRad="38100" dist="38100" dir="2700000" algn="tl">
-                    <a:srgbClr val="000000">
-                      <a:alpha val="43137"/>
-                    </a:srgbClr>
-                  </a:outerShdw>
-                </a:effectLst>
-                <a:latin typeface="+mj-lt"/>
-                <a:ea typeface="+mj-ea"/>
-                <a:cs typeface="+mj-cs"/>
-              </a:rPr>
-              <a:t>5. Microcontainers</a:t>
-            </a:r>
-            <a:endParaRPr lang="en-GB" sz="4800" b="1" dirty="0">
-              <a:solidFill>
-                <a:schemeClr val="bg1">
-                  <a:lumMod val="95000"/>
-                </a:schemeClr>
-              </a:solidFill>
-              <a:effectLst>
-                <a:outerShdw blurRad="38100" dist="38100" dir="2700000" algn="tl">
-                  <a:srgbClr val="000000">
-                    <a:alpha val="43137"/>
-                  </a:srgbClr>
-                </a:outerShdw>
-              </a:effectLst>
-              <a:latin typeface="+mj-lt"/>
-              <a:ea typeface="+mj-ea"/>
-              <a:cs typeface="+mj-cs"/>
-            </a:endParaRPr>
-          </a:p>
-          <a:p>
-            <a:pPr algn="ctr">
-              <a:spcBef>
-                <a:spcPct val="0"/>
-              </a:spcBef>
-            </a:pPr>
-            <a:r>
-              <a:rPr lang="en-GB" sz="3600" dirty="0">
-                <a:solidFill>
-                  <a:schemeClr val="bg1"/>
-                </a:solidFill>
-                <a:effectLst>
-                  <a:outerShdw blurRad="38100" dist="38100" dir="2700000" algn="tl">
-                    <a:srgbClr val="000000">
-                      <a:alpha val="43137"/>
-                    </a:srgbClr>
-                  </a:outerShdw>
-                </a:effectLst>
-                <a:latin typeface="+mj-lt"/>
-                <a:ea typeface="+mj-ea"/>
-                <a:cs typeface="+mj-cs"/>
-              </a:rPr>
-              <a:t>...</a:t>
-            </a:r>
           </a:p>
         </p:txBody>
       </p:sp>
@@ -5605,7 +5578,7 @@
     </p:spTree>
     <p:extLst>
       <p:ext uri="{BB962C8B-B14F-4D97-AF65-F5344CB8AC3E}">
-        <p14:creationId xmlns:p14="http://schemas.microsoft.com/office/powerpoint/2010/main" val="1939819282"/>
+        <p14:creationId xmlns:p14="http://schemas.microsoft.com/office/powerpoint/2010/main" val="3391533141"/>
       </p:ext>
     </p:extLst>
   </p:cSld>
@@ -5698,6 +5671,467 @@
         </p:nvSpPr>
         <p:spPr>
           <a:xfrm>
+            <a:off x="407368" y="2636912"/>
+            <a:ext cx="11521280" cy="3384376"/>
+          </a:xfrm>
+          <a:prstGeom prst="rect">
+            <a:avLst/>
+          </a:prstGeom>
+        </p:spPr>
+        <p:txBody>
+          <a:bodyPr vert="horz" lIns="91440" tIns="45720" rIns="91440" bIns="45720" rtlCol="0" anchor="ctr">
+            <a:noAutofit/>
+          </a:bodyPr>
+          <a:lstStyle/>
+          <a:p>
+            <a:pPr algn="ctr">
+              <a:spcBef>
+                <a:spcPct val="0"/>
+              </a:spcBef>
+              <a:defRPr/>
+            </a:pPr>
+            <a:r>
+              <a:rPr lang="en-GB" sz="4800" b="1" dirty="0">
+                <a:solidFill>
+                  <a:schemeClr val="bg1">
+                    <a:lumMod val="95000"/>
+                  </a:schemeClr>
+                </a:solidFill>
+                <a:effectLst>
+                  <a:outerShdw blurRad="38100" dist="38100" dir="2700000" algn="tl">
+                    <a:srgbClr val="000000">
+                      <a:alpha val="43137"/>
+                    </a:srgbClr>
+                  </a:outerShdw>
+                </a:effectLst>
+                <a:latin typeface="+mj-lt"/>
+                <a:ea typeface="+mj-ea"/>
+                <a:cs typeface="+mj-cs"/>
+              </a:rPr>
+              <a:t>VOTE for 2</a:t>
+            </a:r>
+          </a:p>
+          <a:p>
+            <a:pPr algn="ctr">
+              <a:spcBef>
+                <a:spcPct val="0"/>
+              </a:spcBef>
+              <a:defRPr/>
+            </a:pPr>
+            <a:br>
+              <a:rPr lang="en-GB" sz="4800" dirty="0">
+                <a:solidFill>
+                  <a:schemeClr val="bg1">
+                    <a:lumMod val="95000"/>
+                  </a:schemeClr>
+                </a:solidFill>
+                <a:effectLst>
+                  <a:outerShdw blurRad="38100" dist="38100" dir="2700000" algn="tl">
+                    <a:srgbClr val="000000">
+                      <a:alpha val="43137"/>
+                    </a:srgbClr>
+                  </a:outerShdw>
+                </a:effectLst>
+                <a:latin typeface="+mj-lt"/>
+                <a:ea typeface="+mj-ea"/>
+                <a:cs typeface="+mj-cs"/>
+              </a:rPr>
+            </a:br>
+            <a:r>
+              <a:rPr lang="en-GB" sz="4800" dirty="0">
+                <a:solidFill>
+                  <a:schemeClr val="bg1">
+                    <a:lumMod val="95000"/>
+                  </a:schemeClr>
+                </a:solidFill>
+                <a:effectLst>
+                  <a:outerShdw blurRad="38100" dist="38100" dir="2700000" algn="tl">
+                    <a:srgbClr val="000000">
+                      <a:alpha val="43137"/>
+                    </a:srgbClr>
+                  </a:outerShdw>
+                </a:effectLst>
+                <a:latin typeface="+mj-lt"/>
+                <a:ea typeface="+mj-ea"/>
+                <a:cs typeface="+mj-cs"/>
+              </a:rPr>
+              <a:t>1. Kubernetes 101</a:t>
+            </a:r>
+          </a:p>
+          <a:p>
+            <a:pPr algn="ctr">
+              <a:spcBef>
+                <a:spcPct val="0"/>
+              </a:spcBef>
+              <a:defRPr/>
+            </a:pPr>
+            <a:r>
+              <a:rPr lang="en-GB" sz="4800" dirty="0">
+                <a:solidFill>
+                  <a:schemeClr val="bg1">
+                    <a:lumMod val="95000"/>
+                  </a:schemeClr>
+                </a:solidFill>
+                <a:effectLst>
+                  <a:outerShdw blurRad="38100" dist="38100" dir="2700000" algn="tl">
+                    <a:srgbClr val="000000">
+                      <a:alpha val="43137"/>
+                    </a:srgbClr>
+                  </a:outerShdw>
+                </a:effectLst>
+                <a:latin typeface="+mj-lt"/>
+                <a:ea typeface="+mj-ea"/>
+                <a:cs typeface="+mj-cs"/>
+              </a:rPr>
+              <a:t>2. Developing a new cloud provider for </a:t>
+            </a:r>
+            <a:r>
+              <a:rPr lang="en-GB" sz="4800" dirty="0" err="1">
+                <a:solidFill>
+                  <a:schemeClr val="bg1">
+                    <a:lumMod val="95000"/>
+                  </a:schemeClr>
+                </a:solidFill>
+                <a:effectLst>
+                  <a:outerShdw blurRad="38100" dist="38100" dir="2700000" algn="tl">
+                    <a:srgbClr val="000000">
+                      <a:alpha val="43137"/>
+                    </a:srgbClr>
+                  </a:outerShdw>
+                </a:effectLst>
+                <a:latin typeface="+mj-lt"/>
+                <a:ea typeface="+mj-ea"/>
+                <a:cs typeface="+mj-cs"/>
+              </a:rPr>
+              <a:t>Kube</a:t>
+            </a:r>
+            <a:endParaRPr lang="en-GB" sz="4800" dirty="0">
+              <a:solidFill>
+                <a:schemeClr val="bg1">
+                  <a:lumMod val="95000"/>
+                </a:schemeClr>
+              </a:solidFill>
+              <a:effectLst>
+                <a:outerShdw blurRad="38100" dist="38100" dir="2700000" algn="tl">
+                  <a:srgbClr val="000000">
+                    <a:alpha val="43137"/>
+                  </a:srgbClr>
+                </a:outerShdw>
+              </a:effectLst>
+              <a:latin typeface="+mj-lt"/>
+              <a:ea typeface="+mj-ea"/>
+              <a:cs typeface="+mj-cs"/>
+            </a:endParaRPr>
+          </a:p>
+          <a:p>
+            <a:pPr algn="ctr">
+              <a:spcBef>
+                <a:spcPct val="0"/>
+              </a:spcBef>
+              <a:defRPr/>
+            </a:pPr>
+            <a:r>
+              <a:rPr lang="en-GB" sz="4800" dirty="0">
+                <a:solidFill>
+                  <a:schemeClr val="bg1">
+                    <a:lumMod val="95000"/>
+                  </a:schemeClr>
+                </a:solidFill>
+                <a:effectLst>
+                  <a:outerShdw blurRad="38100" dist="38100" dir="2700000" algn="tl">
+                    <a:srgbClr val="000000">
+                      <a:alpha val="43137"/>
+                    </a:srgbClr>
+                  </a:outerShdw>
+                </a:effectLst>
+                <a:latin typeface="+mj-lt"/>
+                <a:ea typeface="+mj-ea"/>
+                <a:cs typeface="+mj-cs"/>
+              </a:rPr>
+              <a:t>3. </a:t>
+            </a:r>
+            <a:r>
+              <a:rPr lang="en-GB" sz="4800" dirty="0" err="1">
+                <a:solidFill>
+                  <a:schemeClr val="bg1">
+                    <a:lumMod val="95000"/>
+                  </a:schemeClr>
+                </a:solidFill>
+                <a:effectLst>
+                  <a:outerShdw blurRad="38100" dist="38100" dir="2700000" algn="tl">
+                    <a:srgbClr val="000000">
+                      <a:alpha val="43137"/>
+                    </a:srgbClr>
+                  </a:outerShdw>
+                </a:effectLst>
+                <a:latin typeface="+mj-lt"/>
+                <a:ea typeface="+mj-ea"/>
+                <a:cs typeface="+mj-cs"/>
+              </a:rPr>
+              <a:t>Serverless</a:t>
+            </a:r>
+            <a:r>
+              <a:rPr lang="en-GB" sz="4800" dirty="0">
+                <a:solidFill>
+                  <a:schemeClr val="bg1">
+                    <a:lumMod val="95000"/>
+                  </a:schemeClr>
+                </a:solidFill>
+                <a:effectLst>
+                  <a:outerShdw blurRad="38100" dist="38100" dir="2700000" algn="tl">
+                    <a:srgbClr val="000000">
+                      <a:alpha val="43137"/>
+                    </a:srgbClr>
+                  </a:outerShdw>
+                </a:effectLst>
+                <a:latin typeface="+mj-lt"/>
+                <a:ea typeface="+mj-ea"/>
+                <a:cs typeface="+mj-cs"/>
+              </a:rPr>
+              <a:t> with docker</a:t>
+            </a:r>
+          </a:p>
+          <a:p>
+            <a:pPr algn="ctr">
+              <a:spcBef>
+                <a:spcPct val="0"/>
+              </a:spcBef>
+              <a:defRPr/>
+            </a:pPr>
+            <a:r>
+              <a:rPr lang="en-GB" sz="4800" dirty="0">
+                <a:solidFill>
+                  <a:schemeClr val="bg1">
+                    <a:lumMod val="95000"/>
+                  </a:schemeClr>
+                </a:solidFill>
+                <a:effectLst>
+                  <a:outerShdw blurRad="38100" dist="38100" dir="2700000" algn="tl">
+                    <a:srgbClr val="000000">
+                      <a:alpha val="43137"/>
+                    </a:srgbClr>
+                  </a:outerShdw>
+                </a:effectLst>
+                <a:latin typeface="+mj-lt"/>
+                <a:ea typeface="+mj-ea"/>
+                <a:cs typeface="+mj-cs"/>
+              </a:rPr>
+              <a:t>4. ci/cd for containers</a:t>
+            </a:r>
+          </a:p>
+          <a:p>
+            <a:pPr algn="ctr">
+              <a:spcBef>
+                <a:spcPct val="0"/>
+              </a:spcBef>
+              <a:defRPr/>
+            </a:pPr>
+            <a:r>
+              <a:rPr lang="en-GB" sz="4800" dirty="0">
+                <a:solidFill>
+                  <a:schemeClr val="bg1">
+                    <a:lumMod val="95000"/>
+                  </a:schemeClr>
+                </a:solidFill>
+                <a:effectLst>
+                  <a:outerShdw blurRad="38100" dist="38100" dir="2700000" algn="tl">
+                    <a:srgbClr val="000000">
+                      <a:alpha val="43137"/>
+                    </a:srgbClr>
+                  </a:outerShdw>
+                </a:effectLst>
+                <a:latin typeface="+mj-lt"/>
+                <a:ea typeface="+mj-ea"/>
+                <a:cs typeface="+mj-cs"/>
+              </a:rPr>
+              <a:t>5. Microcontainers</a:t>
+            </a:r>
+            <a:endParaRPr lang="en-GB" sz="4800" b="1" dirty="0">
+              <a:solidFill>
+                <a:schemeClr val="bg1">
+                  <a:lumMod val="95000"/>
+                </a:schemeClr>
+              </a:solidFill>
+              <a:effectLst>
+                <a:outerShdw blurRad="38100" dist="38100" dir="2700000" algn="tl">
+                  <a:srgbClr val="000000">
+                    <a:alpha val="43137"/>
+                  </a:srgbClr>
+                </a:outerShdw>
+              </a:effectLst>
+              <a:latin typeface="+mj-lt"/>
+              <a:ea typeface="+mj-ea"/>
+              <a:cs typeface="+mj-cs"/>
+            </a:endParaRPr>
+          </a:p>
+          <a:p>
+            <a:pPr algn="ctr">
+              <a:spcBef>
+                <a:spcPct val="0"/>
+              </a:spcBef>
+            </a:pPr>
+            <a:r>
+              <a:rPr lang="en-GB" sz="3600" dirty="0">
+                <a:solidFill>
+                  <a:schemeClr val="bg1"/>
+                </a:solidFill>
+                <a:effectLst>
+                  <a:outerShdw blurRad="38100" dist="38100" dir="2700000" algn="tl">
+                    <a:srgbClr val="000000">
+                      <a:alpha val="43137"/>
+                    </a:srgbClr>
+                  </a:outerShdw>
+                </a:effectLst>
+                <a:latin typeface="+mj-lt"/>
+                <a:ea typeface="+mj-ea"/>
+                <a:cs typeface="+mj-cs"/>
+              </a:rPr>
+              <a:t>...</a:t>
+            </a:r>
+          </a:p>
+        </p:txBody>
+      </p:sp>
+      <p:sp>
+        <p:nvSpPr>
+          <p:cNvPr id="8" name="Rectangle 7"/>
+          <p:cNvSpPr/>
+          <p:nvPr/>
+        </p:nvSpPr>
+        <p:spPr>
+          <a:xfrm>
+            <a:off x="9091186" y="6525344"/>
+            <a:ext cx="1613327" cy="369332"/>
+          </a:xfrm>
+          <a:prstGeom prst="rect">
+            <a:avLst/>
+          </a:prstGeom>
+        </p:spPr>
+        <p:txBody>
+          <a:bodyPr wrap="none">
+            <a:spAutoFit/>
+          </a:bodyPr>
+          <a:lstStyle/>
+          <a:p>
+            <a:r>
+              <a:rPr lang="en-GB" b="1" dirty="0">
+                <a:solidFill>
+                  <a:schemeClr val="bg1">
+                    <a:lumMod val="95000"/>
+                  </a:schemeClr>
+                </a:solidFill>
+              </a:rPr>
+              <a:t>@</a:t>
+            </a:r>
+            <a:r>
+              <a:rPr lang="en-GB" b="1" dirty="0" err="1">
+                <a:solidFill>
+                  <a:schemeClr val="bg1">
+                    <a:lumMod val="95000"/>
+                  </a:schemeClr>
+                </a:solidFill>
+              </a:rPr>
+              <a:t>smartdevsug</a:t>
+            </a:r>
+            <a:endParaRPr lang="en-GB" dirty="0"/>
+          </a:p>
+        </p:txBody>
+      </p:sp>
+    </p:spTree>
+    <p:extLst>
+      <p:ext uri="{BB962C8B-B14F-4D97-AF65-F5344CB8AC3E}">
+        <p14:creationId xmlns:p14="http://schemas.microsoft.com/office/powerpoint/2010/main" val="1939819282"/>
+      </p:ext>
+    </p:extLst>
+  </p:cSld>
+  <p:clrMapOvr>
+    <a:masterClrMapping/>
+  </p:clrMapOvr>
+  <p:transition advClick="0" advTm="32750">
+    <p:fade/>
+  </p:transition>
+</p:sld>
+</file>
+
+<file path=ppt/slides/slide8.xml><?xml version="1.0" encoding="utf-8"?>
+<p:sld xmlns:a="http://schemas.openxmlformats.org/drawingml/2006/main" xmlns:r="http://schemas.openxmlformats.org/officeDocument/2006/relationships" xmlns:p="http://schemas.openxmlformats.org/presentationml/2006/main">
+  <p:cSld>
+    <p:spTree>
+      <p:nvGrpSpPr>
+        <p:cNvPr id="1" name=""/>
+        <p:cNvGrpSpPr/>
+        <p:nvPr/>
+      </p:nvGrpSpPr>
+      <p:grpSpPr>
+        <a:xfrm>
+          <a:off x="0" y="0"/>
+          <a:ext cx="0" cy="0"/>
+          <a:chOff x="0" y="0"/>
+          <a:chExt cx="0" cy="0"/>
+        </a:xfrm>
+      </p:grpSpPr>
+      <p:sp>
+        <p:nvSpPr>
+          <p:cNvPr id="2" name="Title 1"/>
+          <p:cNvSpPr>
+            <a:spLocks noGrp="1"/>
+          </p:cNvSpPr>
+          <p:nvPr>
+            <p:ph type="title"/>
+          </p:nvPr>
+        </p:nvSpPr>
+        <p:spPr>
+          <a:xfrm>
+            <a:off x="2124076" y="417514"/>
+            <a:ext cx="8229600" cy="1143000"/>
+          </a:xfrm>
+        </p:spPr>
+        <p:txBody>
+          <a:bodyPr/>
+          <a:lstStyle/>
+          <a:p>
+            <a:r>
+              <a:rPr lang="en-GB" dirty="0"/>
+              <a:t>Upcoming Events..</a:t>
+            </a:r>
+          </a:p>
+        </p:txBody>
+      </p:sp>
+      <p:pic>
+        <p:nvPicPr>
+          <p:cNvPr id="6" name="Picture 2" descr="http://photos1.meetupstatic.com/photos/theme_head/b/7/b/8/full_3047032.jpeg"/>
+          <p:cNvPicPr>
+            <a:picLocks noChangeAspect="1" noChangeArrowheads="1"/>
+          </p:cNvPicPr>
+          <p:nvPr/>
+        </p:nvPicPr>
+        <p:blipFill>
+          <a:blip r:embed="rId2" cstate="print"/>
+          <a:srcRect/>
+          <a:stretch>
+            <a:fillRect/>
+          </a:stretch>
+        </p:blipFill>
+        <p:spPr bwMode="auto">
+          <a:xfrm>
+            <a:off x="1509522" y="-27384"/>
+            <a:ext cx="9144000" cy="1428750"/>
+          </a:xfrm>
+          <a:prstGeom prst="rect">
+            <a:avLst/>
+          </a:prstGeom>
+          <a:noFill/>
+        </p:spPr>
+      </p:pic>
+      <p:sp>
+        <p:nvSpPr>
+          <p:cNvPr id="7" name="Title 1"/>
+          <p:cNvSpPr txBox="1">
+            <a:spLocks/>
+          </p:cNvSpPr>
+          <p:nvPr/>
+        </p:nvSpPr>
+        <p:spPr>
+          <a:xfrm>
             <a:off x="2207568" y="3212976"/>
             <a:ext cx="8136904" cy="2808312"/>
           </a:xfrm>
@@ -5884,7 +6318,7 @@
 </p:sld>
 </file>
 
-<file path=ppt/slides/slide8.xml><?xml version="1.0" encoding="utf-8"?>
+<file path=ppt/slides/slide9.xml><?xml version="1.0" encoding="utf-8"?>
 <p:sld xmlns:a="http://schemas.openxmlformats.org/drawingml/2006/main" xmlns:r="http://schemas.openxmlformats.org/officeDocument/2006/relationships" xmlns:p="http://schemas.openxmlformats.org/presentationml/2006/main" showMasterSp="0">
   <p:cSld>
     <p:spTree>

</xml_diff>

<commit_message>
Updated for Sept 2017
</commit_message>
<xml_diff>
--- a/WelcomePresentation-SmartDevs.pptx
+++ b/WelcomePresentation-SmartDevs.pptx
@@ -5,18 +5,16 @@
     <p:sldMasterId id="2147483648" r:id="rId1"/>
   </p:sldMasterIdLst>
   <p:notesMasterIdLst>
-    <p:notesMasterId r:id="rId11"/>
+    <p:notesMasterId r:id="rId9"/>
   </p:notesMasterIdLst>
   <p:sldIdLst>
     <p:sldId id="256" r:id="rId2"/>
     <p:sldId id="258" r:id="rId3"/>
     <p:sldId id="257" r:id="rId4"/>
     <p:sldId id="268" r:id="rId5"/>
-    <p:sldId id="275" r:id="rId6"/>
-    <p:sldId id="277" r:id="rId7"/>
-    <p:sldId id="274" r:id="rId8"/>
-    <p:sldId id="276" r:id="rId9"/>
-    <p:sldId id="269" r:id="rId10"/>
+    <p:sldId id="277" r:id="rId6"/>
+    <p:sldId id="276" r:id="rId7"/>
+    <p:sldId id="269" r:id="rId8"/>
   </p:sldIdLst>
   <p:sldSz cx="12192000" cy="6858000"/>
   <p:notesSz cx="6858000" cy="9144000"/>
@@ -220,7 +218,7 @@
           <a:p>
             <a:fld id="{8D928C90-A2F3-492C-9840-8080881BD1C3}" type="datetimeFigureOut">
               <a:rPr lang="en-GB" smtClean="0"/>
-              <a:t>14/08/2017</a:t>
+              <a:t>11/09/2017</a:t>
             </a:fld>
             <a:endParaRPr lang="en-GB"/>
           </a:p>
@@ -660,7 +658,7 @@
     </p:spTree>
     <p:extLst>
       <p:ext uri="{BB962C8B-B14F-4D97-AF65-F5344CB8AC3E}">
-        <p14:creationId xmlns:p14="http://schemas.microsoft.com/office/powerpoint/2010/main" val="1084305320"/>
+        <p14:creationId xmlns:p14="http://schemas.microsoft.com/office/powerpoint/2010/main" val="3326086265"/>
       </p:ext>
     </p:extLst>
   </p:cSld>
@@ -740,96 +738,7 @@
           <a:p>
             <a:fld id="{9E596088-AF84-4048-9612-0BD6F107496A}" type="slidenum">
               <a:rPr lang="en-GB" smtClean="0"/>
-              <a:t>6</a:t>
-            </a:fld>
-            <a:endParaRPr lang="en-GB"/>
-          </a:p>
-        </p:txBody>
-      </p:sp>
-    </p:spTree>
-    <p:extLst>
-      <p:ext uri="{BB962C8B-B14F-4D97-AF65-F5344CB8AC3E}">
-        <p14:creationId xmlns:p14="http://schemas.microsoft.com/office/powerpoint/2010/main" val="3326086265"/>
-      </p:ext>
-    </p:extLst>
-  </p:cSld>
-  <p:clrMapOvr>
-    <a:masterClrMapping/>
-  </p:clrMapOvr>
-</p:notes>
-</file>
-
-<file path=ppt/notesSlides/notesSlide4.xml><?xml version="1.0" encoding="utf-8"?>
-<p:notes xmlns:a="http://schemas.openxmlformats.org/drawingml/2006/main" xmlns:r="http://schemas.openxmlformats.org/officeDocument/2006/relationships" xmlns:p="http://schemas.openxmlformats.org/presentationml/2006/main">
-  <p:cSld>
-    <p:spTree>
-      <p:nvGrpSpPr>
-        <p:cNvPr id="1" name=""/>
-        <p:cNvGrpSpPr/>
-        <p:nvPr/>
-      </p:nvGrpSpPr>
-      <p:grpSpPr>
-        <a:xfrm>
-          <a:off x="0" y="0"/>
-          <a:ext cx="0" cy="0"/>
-          <a:chOff x="0" y="0"/>
-          <a:chExt cx="0" cy="0"/>
-        </a:xfrm>
-      </p:grpSpPr>
-      <p:sp>
-        <p:nvSpPr>
-          <p:cNvPr id="2" name="Slide Image Placeholder 1"/>
-          <p:cNvSpPr>
-            <a:spLocks noGrp="1" noRot="1" noChangeAspect="1"/>
-          </p:cNvSpPr>
-          <p:nvPr>
-            <p:ph type="sldImg"/>
-          </p:nvPr>
-        </p:nvSpPr>
-        <p:spPr>
-          <a:xfrm>
-            <a:off x="381000" y="685800"/>
-            <a:ext cx="6096000" cy="3429000"/>
-          </a:xfrm>
-        </p:spPr>
-      </p:sp>
-      <p:sp>
-        <p:nvSpPr>
-          <p:cNvPr id="3" name="Notes Placeholder 2"/>
-          <p:cNvSpPr>
-            <a:spLocks noGrp="1"/>
-          </p:cNvSpPr>
-          <p:nvPr>
-            <p:ph type="body" idx="1"/>
-          </p:nvPr>
-        </p:nvSpPr>
-        <p:spPr/>
-        <p:txBody>
-          <a:bodyPr/>
-          <a:lstStyle/>
-          <a:p>
-            <a:endParaRPr lang="en-GB" dirty="0"/>
-          </a:p>
-        </p:txBody>
-      </p:sp>
-      <p:sp>
-        <p:nvSpPr>
-          <p:cNvPr id="4" name="Slide Number Placeholder 3"/>
-          <p:cNvSpPr>
-            <a:spLocks noGrp="1"/>
-          </p:cNvSpPr>
-          <p:nvPr>
-            <p:ph type="sldNum" sz="quarter" idx="10"/>
-          </p:nvPr>
-        </p:nvSpPr>
-        <p:spPr/>
-        <p:txBody>
-          <a:bodyPr/>
-          <a:lstStyle/>
-          <a:p>
-            <a:fld id="{9E596088-AF84-4048-9612-0BD6F107496A}" type="slidenum">
-              <a:rPr lang="en-GB" smtClean="0"/>
-              <a:t>9</a:t>
+              <a:t>7</a:t>
             </a:fld>
             <a:endParaRPr lang="en-GB"/>
           </a:p>
@@ -1030,7 +939,7 @@
             <a:fld id="{8050458D-74A9-43CA-B6DD-6642C7D97BC8}" type="datetimeFigureOut">
               <a:rPr lang="en-US" smtClean="0"/>
               <a:pPr/>
-              <a:t>8/14/2017</a:t>
+              <a:t>9/11/2017</a:t>
             </a:fld>
             <a:endParaRPr lang="en-GB"/>
           </a:p>
@@ -1197,7 +1106,7 @@
             <a:fld id="{8050458D-74A9-43CA-B6DD-6642C7D97BC8}" type="datetimeFigureOut">
               <a:rPr lang="en-US" smtClean="0"/>
               <a:pPr/>
-              <a:t>8/14/2017</a:t>
+              <a:t>9/11/2017</a:t>
             </a:fld>
             <a:endParaRPr lang="en-GB"/>
           </a:p>
@@ -1374,7 +1283,7 @@
             <a:fld id="{8050458D-74A9-43CA-B6DD-6642C7D97BC8}" type="datetimeFigureOut">
               <a:rPr lang="en-US" smtClean="0"/>
               <a:pPr/>
-              <a:t>8/14/2017</a:t>
+              <a:t>9/11/2017</a:t>
             </a:fld>
             <a:endParaRPr lang="en-GB"/>
           </a:p>
@@ -1541,7 +1450,7 @@
             <a:fld id="{8050458D-74A9-43CA-B6DD-6642C7D97BC8}" type="datetimeFigureOut">
               <a:rPr lang="en-US" smtClean="0"/>
               <a:pPr/>
-              <a:t>8/14/2017</a:t>
+              <a:t>9/11/2017</a:t>
             </a:fld>
             <a:endParaRPr lang="en-GB"/>
           </a:p>
@@ -1784,7 +1693,7 @@
             <a:fld id="{8050458D-74A9-43CA-B6DD-6642C7D97BC8}" type="datetimeFigureOut">
               <a:rPr lang="en-US" smtClean="0"/>
               <a:pPr/>
-              <a:t>8/14/2017</a:t>
+              <a:t>9/11/2017</a:t>
             </a:fld>
             <a:endParaRPr lang="en-GB"/>
           </a:p>
@@ -2069,7 +1978,7 @@
             <a:fld id="{8050458D-74A9-43CA-B6DD-6642C7D97BC8}" type="datetimeFigureOut">
               <a:rPr lang="en-US" smtClean="0"/>
               <a:pPr/>
-              <a:t>8/14/2017</a:t>
+              <a:t>9/11/2017</a:t>
             </a:fld>
             <a:endParaRPr lang="en-GB"/>
           </a:p>
@@ -2488,7 +2397,7 @@
             <a:fld id="{8050458D-74A9-43CA-B6DD-6642C7D97BC8}" type="datetimeFigureOut">
               <a:rPr lang="en-US" smtClean="0"/>
               <a:pPr/>
-              <a:t>8/14/2017</a:t>
+              <a:t>9/11/2017</a:t>
             </a:fld>
             <a:endParaRPr lang="en-GB"/>
           </a:p>
@@ -2603,7 +2512,7 @@
             <a:fld id="{8050458D-74A9-43CA-B6DD-6642C7D97BC8}" type="datetimeFigureOut">
               <a:rPr lang="en-US" smtClean="0"/>
               <a:pPr/>
-              <a:t>8/14/2017</a:t>
+              <a:t>9/11/2017</a:t>
             </a:fld>
             <a:endParaRPr lang="en-GB"/>
           </a:p>
@@ -2695,7 +2604,7 @@
             <a:fld id="{8050458D-74A9-43CA-B6DD-6642C7D97BC8}" type="datetimeFigureOut">
               <a:rPr lang="en-US" smtClean="0"/>
               <a:pPr/>
-              <a:t>8/14/2017</a:t>
+              <a:t>9/11/2017</a:t>
             </a:fld>
             <a:endParaRPr lang="en-GB"/>
           </a:p>
@@ -2969,7 +2878,7 @@
             <a:fld id="{8050458D-74A9-43CA-B6DD-6642C7D97BC8}" type="datetimeFigureOut">
               <a:rPr lang="en-US" smtClean="0"/>
               <a:pPr/>
-              <a:t>8/14/2017</a:t>
+              <a:t>9/11/2017</a:t>
             </a:fld>
             <a:endParaRPr lang="en-GB"/>
           </a:p>
@@ -3219,7 +3128,7 @@
             <a:fld id="{8050458D-74A9-43CA-B6DD-6642C7D97BC8}" type="datetimeFigureOut">
               <a:rPr lang="en-US" smtClean="0"/>
               <a:pPr/>
-              <a:t>8/14/2017</a:t>
+              <a:t>9/11/2017</a:t>
             </a:fld>
             <a:endParaRPr lang="en-GB"/>
           </a:p>
@@ -3432,7 +3341,7 @@
             <a:fld id="{8050458D-74A9-43CA-B6DD-6642C7D97BC8}" type="datetimeFigureOut">
               <a:rPr lang="en-US" smtClean="0"/>
               <a:pPr/>
-              <a:t>8/14/2017</a:t>
+              <a:t>9/11/2017</a:t>
             </a:fld>
             <a:endParaRPr lang="en-GB"/>
           </a:p>
@@ -5081,10 +4990,10 @@
                 <a:ea typeface="+mj-ea"/>
                 <a:cs typeface="+mj-cs"/>
               </a:rPr>
-              <a:t>Progressive .NET 2017</a:t>
+              <a:t>Coming up</a:t>
             </a:r>
             <a:br>
-              <a:rPr lang="en-GB" sz="2800" b="1">
+              <a:rPr lang="en-GB" sz="2800" b="1" dirty="0">
                 <a:solidFill>
                   <a:schemeClr val="bg1">
                     <a:lumMod val="95000"/>
@@ -5095,8 +5004,8 @@
                 <a:cs typeface="+mj-cs"/>
               </a:rPr>
             </a:br>
-            <a:br>
-              <a:rPr lang="en-GB" sz="2800" b="1">
+            <a:r>
+              <a:rPr lang="en-GB" sz="2800" b="1" dirty="0">
                 <a:solidFill>
                   <a:schemeClr val="bg1">
                     <a:lumMod val="95000"/>
@@ -5106,58 +5015,7 @@
                 <a:ea typeface="+mj-ea"/>
                 <a:cs typeface="+mj-cs"/>
               </a:rPr>
-            </a:br>
-            <a:r>
-              <a:rPr lang="en-GB" sz="2800" b="1">
-                <a:solidFill>
-                  <a:schemeClr val="bg1">
-                    <a:lumMod val="95000"/>
-                  </a:schemeClr>
-                </a:solidFill>
-                <a:latin typeface="+mj-lt"/>
-                <a:ea typeface="+mj-ea"/>
-                <a:cs typeface="+mj-cs"/>
-              </a:rPr>
-              <a:t>Discount </a:t>
-            </a:r>
-            <a:r>
-              <a:rPr lang="en-GB" sz="2800" b="1" dirty="0">
-                <a:solidFill>
-                  <a:schemeClr val="bg1">
-                    <a:lumMod val="95000"/>
-                  </a:schemeClr>
-                </a:solidFill>
-                <a:latin typeface="+mj-lt"/>
-                <a:ea typeface="+mj-ea"/>
-                <a:cs typeface="+mj-cs"/>
-              </a:rPr>
-              <a:t>for </a:t>
-            </a:r>
-            <a:r>
-              <a:rPr lang="en-GB" sz="2800" b="1" dirty="0" err="1">
-                <a:solidFill>
-                  <a:schemeClr val="bg1">
-                    <a:lumMod val="95000"/>
-                  </a:schemeClr>
-                </a:solidFill>
-                <a:latin typeface="+mj-lt"/>
-                <a:ea typeface="+mj-ea"/>
-                <a:cs typeface="+mj-cs"/>
-              </a:rPr>
-              <a:t>Smartdev</a:t>
-            </a:r>
-            <a:r>
-              <a:rPr lang="en-GB" sz="2800" b="1" dirty="0">
-                <a:solidFill>
-                  <a:schemeClr val="bg1">
-                    <a:lumMod val="95000"/>
-                  </a:schemeClr>
-                </a:solidFill>
-                <a:latin typeface="+mj-lt"/>
-                <a:ea typeface="+mj-ea"/>
-                <a:cs typeface="+mj-cs"/>
-              </a:rPr>
-              <a:t> members, use</a:t>
+              <a:t>OCT - Elastic Search and Kibana – Neil Barnwell</a:t>
             </a:r>
           </a:p>
           <a:p>
@@ -5168,16 +5026,41 @@
               <a:defRPr/>
             </a:pPr>
             <a:r>
-              <a:rPr lang="en-GB" sz="4000" dirty="0">
-                <a:solidFill>
-                  <a:schemeClr val="bg1"/>
+              <a:rPr lang="en-GB" sz="2800" b="1" dirty="0">
+                <a:solidFill>
+                  <a:schemeClr val="bg1">
+                    <a:lumMod val="95000"/>
+                  </a:schemeClr>
                 </a:solidFill>
                 <a:latin typeface="+mj-lt"/>
                 <a:ea typeface="+mj-ea"/>
                 <a:cs typeface="+mj-cs"/>
               </a:rPr>
-              <a:t>SMARTDEVS_PROGNET20 to get 20% off ticket price</a:t>
-            </a:r>
+              <a:t>NOV – CI/CD for Containers and Microcontainers – Thom </a:t>
+            </a:r>
+            <a:r>
+              <a:rPr lang="en-GB" sz="2800" b="1" dirty="0" err="1">
+                <a:solidFill>
+                  <a:schemeClr val="bg1">
+                    <a:lumMod val="95000"/>
+                  </a:schemeClr>
+                </a:solidFill>
+                <a:latin typeface="+mj-lt"/>
+                <a:ea typeface="+mj-ea"/>
+                <a:cs typeface="+mj-cs"/>
+              </a:rPr>
+              <a:t>Legget</a:t>
+            </a:r>
+            <a:endParaRPr lang="en-GB" sz="2800" b="1" dirty="0">
+              <a:solidFill>
+                <a:schemeClr val="bg1">
+                  <a:lumMod val="95000"/>
+                </a:schemeClr>
+              </a:solidFill>
+              <a:latin typeface="+mj-lt"/>
+              <a:ea typeface="+mj-ea"/>
+              <a:cs typeface="+mj-cs"/>
+            </a:endParaRPr>
           </a:p>
           <a:p>
             <a:pPr algn="ctr">
@@ -5186,6 +5069,78 @@
               </a:spcBef>
               <a:defRPr/>
             </a:pPr>
+            <a:r>
+              <a:rPr lang="en-GB" sz="2800" b="1" dirty="0">
+                <a:solidFill>
+                  <a:schemeClr val="bg1">
+                    <a:lumMod val="95000"/>
+                  </a:schemeClr>
+                </a:solidFill>
+                <a:latin typeface="+mj-lt"/>
+                <a:ea typeface="+mj-ea"/>
+                <a:cs typeface="+mj-cs"/>
+              </a:rPr>
+              <a:t>DEC – </a:t>
+            </a:r>
+            <a:r>
+              <a:rPr lang="en-GB" sz="2800" b="1" dirty="0" err="1">
+                <a:solidFill>
+                  <a:schemeClr val="bg1">
+                    <a:lumMod val="95000"/>
+                  </a:schemeClr>
+                </a:solidFill>
+                <a:latin typeface="+mj-lt"/>
+                <a:ea typeface="+mj-ea"/>
+                <a:cs typeface="+mj-cs"/>
+              </a:rPr>
+              <a:t>Azurey</a:t>
+            </a:r>
+            <a:r>
+              <a:rPr lang="en-GB" sz="2800" b="1" dirty="0">
+                <a:solidFill>
+                  <a:schemeClr val="bg1">
+                    <a:lumMod val="95000"/>
+                  </a:schemeClr>
+                </a:solidFill>
+                <a:latin typeface="+mj-lt"/>
+                <a:ea typeface="+mj-ea"/>
+                <a:cs typeface="+mj-cs"/>
+              </a:rPr>
+              <a:t> stuff – Shahid Iqbal</a:t>
+            </a:r>
+          </a:p>
+          <a:p>
+            <a:pPr algn="ctr">
+              <a:spcBef>
+                <a:spcPct val="0"/>
+              </a:spcBef>
+              <a:defRPr/>
+            </a:pPr>
+            <a:r>
+              <a:rPr lang="en-GB" sz="2800" b="1" dirty="0">
+                <a:solidFill>
+                  <a:schemeClr val="bg1">
+                    <a:lumMod val="95000"/>
+                  </a:schemeClr>
+                </a:solidFill>
+                <a:latin typeface="+mj-lt"/>
+                <a:ea typeface="+mj-ea"/>
+                <a:cs typeface="+mj-cs"/>
+              </a:rPr>
+              <a:t>JAN – Resilient and scalable ML – Steve Spencer</a:t>
+            </a:r>
+            <a:br>
+              <a:rPr lang="en-GB" sz="4000" b="1" dirty="0">
+                <a:solidFill>
+                  <a:schemeClr val="bg1">
+                    <a:lumMod val="95000"/>
+                  </a:schemeClr>
+                </a:solidFill>
+                <a:latin typeface="+mj-lt"/>
+                <a:ea typeface="+mj-ea"/>
+                <a:cs typeface="+mj-cs"/>
+              </a:rPr>
+            </a:br>
             <a:endParaRPr lang="en-GB" sz="4000" dirty="0">
               <a:solidFill>
                 <a:schemeClr val="bg1"/>
@@ -5194,37 +5149,6 @@
               <a:ea typeface="+mj-ea"/>
               <a:cs typeface="+mj-cs"/>
             </a:endParaRPr>
-          </a:p>
-          <a:p>
-            <a:pPr algn="ctr">
-              <a:spcBef>
-                <a:spcPct val="0"/>
-              </a:spcBef>
-              <a:defRPr/>
-            </a:pPr>
-            <a:r>
-              <a:rPr lang="en-GB" sz="4000" dirty="0">
-                <a:solidFill>
-                  <a:schemeClr val="bg1"/>
-                </a:solidFill>
-                <a:latin typeface="+mj-lt"/>
-                <a:ea typeface="+mj-ea"/>
-                <a:cs typeface="+mj-cs"/>
-                <a:hlinkClick r:id="rId4"/>
-              </a:rPr>
-              <a:t>https://skillsmatter.com/conferences/8268-progressive-dot-net-2017</a:t>
-            </a:r>
-            <a:r>
-              <a:rPr lang="en-GB" sz="4000" dirty="0">
-                <a:solidFill>
-                  <a:schemeClr val="bg1"/>
-                </a:solidFill>
-                <a:latin typeface="+mj-lt"/>
-                <a:ea typeface="+mj-ea"/>
-                <a:cs typeface="+mj-cs"/>
-              </a:rPr>
-              <a:t> </a:t>
-            </a:r>
           </a:p>
         </p:txBody>
       </p:sp>
@@ -5276,7 +5200,7 @@
     </p:spTree>
     <p:extLst>
       <p:ext uri="{BB962C8B-B14F-4D97-AF65-F5344CB8AC3E}">
-        <p14:creationId xmlns:p14="http://schemas.microsoft.com/office/powerpoint/2010/main" val="2406007851"/>
+        <p14:creationId xmlns:p14="http://schemas.microsoft.com/office/powerpoint/2010/main" val="3391533141"/>
       </p:ext>
     </p:extLst>
   </p:cSld>
@@ -5342,769 +5266,6 @@
           <p:nvPr/>
         </p:nvPicPr>
         <p:blipFill>
-          <a:blip r:embed="rId3" cstate="print"/>
-          <a:srcRect/>
-          <a:stretch>
-            <a:fillRect/>
-          </a:stretch>
-        </p:blipFill>
-        <p:spPr bwMode="auto">
-          <a:xfrm>
-            <a:off x="1509522" y="-27384"/>
-            <a:ext cx="9144000" cy="1428750"/>
-          </a:xfrm>
-          <a:prstGeom prst="rect">
-            <a:avLst/>
-          </a:prstGeom>
-          <a:noFill/>
-        </p:spPr>
-      </p:pic>
-      <p:sp>
-        <p:nvSpPr>
-          <p:cNvPr id="7" name="Title 1"/>
-          <p:cNvSpPr txBox="1">
-            <a:spLocks/>
-          </p:cNvSpPr>
-          <p:nvPr/>
-        </p:nvSpPr>
-        <p:spPr>
-          <a:xfrm>
-            <a:off x="407368" y="1560514"/>
-            <a:ext cx="11377264" cy="4460774"/>
-          </a:xfrm>
-          <a:prstGeom prst="rect">
-            <a:avLst/>
-          </a:prstGeom>
-        </p:spPr>
-        <p:txBody>
-          <a:bodyPr vert="horz" lIns="91440" tIns="45720" rIns="91440" bIns="45720" rtlCol="0" anchor="ctr">
-            <a:noAutofit/>
-          </a:bodyPr>
-          <a:lstStyle/>
-          <a:p>
-            <a:pPr algn="ctr">
-              <a:spcBef>
-                <a:spcPct val="0"/>
-              </a:spcBef>
-              <a:defRPr/>
-            </a:pPr>
-            <a:r>
-              <a:rPr lang="en-GB" sz="6000" b="1" dirty="0">
-                <a:solidFill>
-                  <a:schemeClr val="bg1">
-                    <a:lumMod val="95000"/>
-                  </a:schemeClr>
-                </a:solidFill>
-                <a:latin typeface="+mj-lt"/>
-                <a:ea typeface="+mj-ea"/>
-                <a:cs typeface="+mj-cs"/>
-              </a:rPr>
-              <a:t>Coming up</a:t>
-            </a:r>
-            <a:br>
-              <a:rPr lang="en-GB" sz="2800" b="1" dirty="0">
-                <a:solidFill>
-                  <a:schemeClr val="bg1">
-                    <a:lumMod val="95000"/>
-                  </a:schemeClr>
-                </a:solidFill>
-                <a:latin typeface="+mj-lt"/>
-                <a:ea typeface="+mj-ea"/>
-                <a:cs typeface="+mj-cs"/>
-              </a:rPr>
-            </a:br>
-            <a:r>
-              <a:rPr lang="en-GB" sz="2800" b="1" dirty="0">
-                <a:solidFill>
-                  <a:schemeClr val="bg1">
-                    <a:lumMod val="95000"/>
-                  </a:schemeClr>
-                </a:solidFill>
-                <a:latin typeface="+mj-lt"/>
-                <a:ea typeface="+mj-ea"/>
-                <a:cs typeface="+mj-cs"/>
-              </a:rPr>
-              <a:t>SEP - The Secrets of </a:t>
-            </a:r>
-            <a:r>
-              <a:rPr lang="en-GB" sz="2800" b="1" dirty="0" err="1">
-                <a:solidFill>
-                  <a:schemeClr val="bg1">
-                    <a:lumMod val="95000"/>
-                  </a:schemeClr>
-                </a:solidFill>
-                <a:latin typeface="+mj-lt"/>
-                <a:ea typeface="+mj-ea"/>
-                <a:cs typeface="+mj-cs"/>
-              </a:rPr>
-              <a:t>MonoGame</a:t>
-            </a:r>
-            <a:r>
-              <a:rPr lang="en-GB" sz="2800" b="1" dirty="0">
-                <a:solidFill>
-                  <a:schemeClr val="bg1">
-                    <a:lumMod val="95000"/>
-                  </a:schemeClr>
-                </a:solidFill>
-                <a:latin typeface="+mj-lt"/>
-                <a:ea typeface="+mj-ea"/>
-                <a:cs typeface="+mj-cs"/>
-              </a:rPr>
-              <a:t> Trump wants banned! – Andy Clarke</a:t>
-            </a:r>
-          </a:p>
-          <a:p>
-            <a:pPr algn="ctr">
-              <a:spcBef>
-                <a:spcPct val="0"/>
-              </a:spcBef>
-              <a:defRPr/>
-            </a:pPr>
-            <a:r>
-              <a:rPr lang="en-GB" sz="2800" b="1" dirty="0">
-                <a:solidFill>
-                  <a:schemeClr val="bg1">
-                    <a:lumMod val="95000"/>
-                  </a:schemeClr>
-                </a:solidFill>
-                <a:latin typeface="+mj-lt"/>
-                <a:ea typeface="+mj-ea"/>
-                <a:cs typeface="+mj-cs"/>
-              </a:rPr>
-              <a:t>OCT - Elastic Search and Kibana – Neil Barnwell</a:t>
-            </a:r>
-          </a:p>
-          <a:p>
-            <a:pPr algn="ctr">
-              <a:spcBef>
-                <a:spcPct val="0"/>
-              </a:spcBef>
-              <a:defRPr/>
-            </a:pPr>
-            <a:r>
-              <a:rPr lang="en-GB" sz="2800" b="1" dirty="0">
-                <a:solidFill>
-                  <a:schemeClr val="bg1">
-                    <a:lumMod val="95000"/>
-                  </a:schemeClr>
-                </a:solidFill>
-                <a:latin typeface="+mj-lt"/>
-                <a:ea typeface="+mj-ea"/>
-                <a:cs typeface="+mj-cs"/>
-              </a:rPr>
-              <a:t>NOV - YOU CHOOSE! – Thom </a:t>
-            </a:r>
-            <a:r>
-              <a:rPr lang="en-GB" sz="2800" b="1" dirty="0" err="1">
-                <a:solidFill>
-                  <a:schemeClr val="bg1">
-                    <a:lumMod val="95000"/>
-                  </a:schemeClr>
-                </a:solidFill>
-                <a:latin typeface="+mj-lt"/>
-                <a:ea typeface="+mj-ea"/>
-                <a:cs typeface="+mj-cs"/>
-              </a:rPr>
-              <a:t>Legget</a:t>
-            </a:r>
-            <a:br>
-              <a:rPr lang="en-GB" sz="4000" b="1" dirty="0">
-                <a:solidFill>
-                  <a:schemeClr val="bg1">
-                    <a:lumMod val="95000"/>
-                  </a:schemeClr>
-                </a:solidFill>
-                <a:latin typeface="+mj-lt"/>
-                <a:ea typeface="+mj-ea"/>
-                <a:cs typeface="+mj-cs"/>
-              </a:rPr>
-            </a:br>
-            <a:endParaRPr lang="en-GB" sz="4000" dirty="0">
-              <a:solidFill>
-                <a:schemeClr val="bg1"/>
-              </a:solidFill>
-              <a:latin typeface="+mj-lt"/>
-              <a:ea typeface="+mj-ea"/>
-              <a:cs typeface="+mj-cs"/>
-            </a:endParaRPr>
-          </a:p>
-        </p:txBody>
-      </p:sp>
-      <p:sp>
-        <p:nvSpPr>
-          <p:cNvPr id="8" name="Rectangle 7"/>
-          <p:cNvSpPr/>
-          <p:nvPr/>
-        </p:nvSpPr>
-        <p:spPr>
-          <a:xfrm>
-            <a:off x="9091186" y="6525344"/>
-            <a:ext cx="1613327" cy="369332"/>
-          </a:xfrm>
-          <a:prstGeom prst="rect">
-            <a:avLst/>
-          </a:prstGeom>
-        </p:spPr>
-        <p:txBody>
-          <a:bodyPr wrap="none">
-            <a:spAutoFit/>
-          </a:bodyPr>
-          <a:lstStyle/>
-          <a:p>
-            <a:r>
-              <a:rPr lang="en-GB" b="1" dirty="0">
-                <a:solidFill>
-                  <a:schemeClr val="bg1">
-                    <a:lumMod val="95000"/>
-                  </a:schemeClr>
-                </a:solidFill>
-              </a:rPr>
-              <a:t>@</a:t>
-            </a:r>
-            <a:r>
-              <a:rPr lang="en-GB" b="1" dirty="0" err="1">
-                <a:solidFill>
-                  <a:schemeClr val="bg1">
-                    <a:lumMod val="95000"/>
-                  </a:schemeClr>
-                </a:solidFill>
-              </a:rPr>
-              <a:t>smartdevsug</a:t>
-            </a:r>
-            <a:endParaRPr lang="en-GB" dirty="0"/>
-          </a:p>
-        </p:txBody>
-      </p:sp>
-    </p:spTree>
-    <p:extLst>
-      <p:ext uri="{BB962C8B-B14F-4D97-AF65-F5344CB8AC3E}">
-        <p14:creationId xmlns:p14="http://schemas.microsoft.com/office/powerpoint/2010/main" val="3391533141"/>
-      </p:ext>
-    </p:extLst>
-  </p:cSld>
-  <p:clrMapOvr>
-    <a:masterClrMapping/>
-  </p:clrMapOvr>
-  <p:transition advClick="0" advTm="32750">
-    <p:fade/>
-  </p:transition>
-</p:sld>
-</file>
-
-<file path=ppt/slides/slide7.xml><?xml version="1.0" encoding="utf-8"?>
-<p:sld xmlns:a="http://schemas.openxmlformats.org/drawingml/2006/main" xmlns:r="http://schemas.openxmlformats.org/officeDocument/2006/relationships" xmlns:p="http://schemas.openxmlformats.org/presentationml/2006/main">
-  <p:cSld>
-    <p:spTree>
-      <p:nvGrpSpPr>
-        <p:cNvPr id="1" name=""/>
-        <p:cNvGrpSpPr/>
-        <p:nvPr/>
-      </p:nvGrpSpPr>
-      <p:grpSpPr>
-        <a:xfrm>
-          <a:off x="0" y="0"/>
-          <a:ext cx="0" cy="0"/>
-          <a:chOff x="0" y="0"/>
-          <a:chExt cx="0" cy="0"/>
-        </a:xfrm>
-      </p:grpSpPr>
-      <p:sp>
-        <p:nvSpPr>
-          <p:cNvPr id="2" name="Title 1"/>
-          <p:cNvSpPr>
-            <a:spLocks noGrp="1"/>
-          </p:cNvSpPr>
-          <p:nvPr>
-            <p:ph type="title"/>
-          </p:nvPr>
-        </p:nvSpPr>
-        <p:spPr>
-          <a:xfrm>
-            <a:off x="2124076" y="417514"/>
-            <a:ext cx="8229600" cy="1143000"/>
-          </a:xfrm>
-        </p:spPr>
-        <p:txBody>
-          <a:bodyPr/>
-          <a:lstStyle/>
-          <a:p>
-            <a:r>
-              <a:rPr lang="en-GB" dirty="0"/>
-              <a:t>Upcoming Events..</a:t>
-            </a:r>
-          </a:p>
-        </p:txBody>
-      </p:sp>
-      <p:pic>
-        <p:nvPicPr>
-          <p:cNvPr id="6" name="Picture 2" descr="http://photos1.meetupstatic.com/photos/theme_head/b/7/b/8/full_3047032.jpeg"/>
-          <p:cNvPicPr>
-            <a:picLocks noChangeAspect="1" noChangeArrowheads="1"/>
-          </p:cNvPicPr>
-          <p:nvPr/>
-        </p:nvPicPr>
-        <p:blipFill>
-          <a:blip r:embed="rId2" cstate="print"/>
-          <a:srcRect/>
-          <a:stretch>
-            <a:fillRect/>
-          </a:stretch>
-        </p:blipFill>
-        <p:spPr bwMode="auto">
-          <a:xfrm>
-            <a:off x="1509522" y="-27384"/>
-            <a:ext cx="9144000" cy="1428750"/>
-          </a:xfrm>
-          <a:prstGeom prst="rect">
-            <a:avLst/>
-          </a:prstGeom>
-          <a:noFill/>
-        </p:spPr>
-      </p:pic>
-      <p:sp>
-        <p:nvSpPr>
-          <p:cNvPr id="7" name="Title 1"/>
-          <p:cNvSpPr txBox="1">
-            <a:spLocks/>
-          </p:cNvSpPr>
-          <p:nvPr/>
-        </p:nvSpPr>
-        <p:spPr>
-          <a:xfrm>
-            <a:off x="407368" y="2636912"/>
-            <a:ext cx="11521280" cy="3384376"/>
-          </a:xfrm>
-          <a:prstGeom prst="rect">
-            <a:avLst/>
-          </a:prstGeom>
-        </p:spPr>
-        <p:txBody>
-          <a:bodyPr vert="horz" lIns="91440" tIns="45720" rIns="91440" bIns="45720" rtlCol="0" anchor="ctr">
-            <a:noAutofit/>
-          </a:bodyPr>
-          <a:lstStyle/>
-          <a:p>
-            <a:pPr algn="ctr">
-              <a:spcBef>
-                <a:spcPct val="0"/>
-              </a:spcBef>
-              <a:defRPr/>
-            </a:pPr>
-            <a:r>
-              <a:rPr lang="en-GB" sz="4800" b="1" dirty="0">
-                <a:solidFill>
-                  <a:schemeClr val="bg1">
-                    <a:lumMod val="95000"/>
-                  </a:schemeClr>
-                </a:solidFill>
-                <a:effectLst>
-                  <a:outerShdw blurRad="38100" dist="38100" dir="2700000" algn="tl">
-                    <a:srgbClr val="000000">
-                      <a:alpha val="43137"/>
-                    </a:srgbClr>
-                  </a:outerShdw>
-                </a:effectLst>
-                <a:latin typeface="+mj-lt"/>
-                <a:ea typeface="+mj-ea"/>
-                <a:cs typeface="+mj-cs"/>
-              </a:rPr>
-              <a:t>VOTE for 2</a:t>
-            </a:r>
-          </a:p>
-          <a:p>
-            <a:pPr algn="ctr">
-              <a:spcBef>
-                <a:spcPct val="0"/>
-              </a:spcBef>
-              <a:defRPr/>
-            </a:pPr>
-            <a:br>
-              <a:rPr lang="en-GB" sz="4800" dirty="0">
-                <a:solidFill>
-                  <a:schemeClr val="bg1">
-                    <a:lumMod val="95000"/>
-                  </a:schemeClr>
-                </a:solidFill>
-                <a:effectLst>
-                  <a:outerShdw blurRad="38100" dist="38100" dir="2700000" algn="tl">
-                    <a:srgbClr val="000000">
-                      <a:alpha val="43137"/>
-                    </a:srgbClr>
-                  </a:outerShdw>
-                </a:effectLst>
-                <a:latin typeface="+mj-lt"/>
-                <a:ea typeface="+mj-ea"/>
-                <a:cs typeface="+mj-cs"/>
-              </a:rPr>
-            </a:br>
-            <a:r>
-              <a:rPr lang="en-GB" sz="4800" dirty="0">
-                <a:solidFill>
-                  <a:schemeClr val="bg1">
-                    <a:lumMod val="95000"/>
-                  </a:schemeClr>
-                </a:solidFill>
-                <a:effectLst>
-                  <a:outerShdw blurRad="38100" dist="38100" dir="2700000" algn="tl">
-                    <a:srgbClr val="000000">
-                      <a:alpha val="43137"/>
-                    </a:srgbClr>
-                  </a:outerShdw>
-                </a:effectLst>
-                <a:latin typeface="+mj-lt"/>
-                <a:ea typeface="+mj-ea"/>
-                <a:cs typeface="+mj-cs"/>
-              </a:rPr>
-              <a:t>1. Kubernetes 101</a:t>
-            </a:r>
-          </a:p>
-          <a:p>
-            <a:pPr algn="ctr">
-              <a:spcBef>
-                <a:spcPct val="0"/>
-              </a:spcBef>
-              <a:defRPr/>
-            </a:pPr>
-            <a:r>
-              <a:rPr lang="en-GB" sz="4800" dirty="0">
-                <a:solidFill>
-                  <a:schemeClr val="bg1">
-                    <a:lumMod val="95000"/>
-                  </a:schemeClr>
-                </a:solidFill>
-                <a:effectLst>
-                  <a:outerShdw blurRad="38100" dist="38100" dir="2700000" algn="tl">
-                    <a:srgbClr val="000000">
-                      <a:alpha val="43137"/>
-                    </a:srgbClr>
-                  </a:outerShdw>
-                </a:effectLst>
-                <a:latin typeface="+mj-lt"/>
-                <a:ea typeface="+mj-ea"/>
-                <a:cs typeface="+mj-cs"/>
-              </a:rPr>
-              <a:t>2. Developing a new cloud provider for </a:t>
-            </a:r>
-            <a:r>
-              <a:rPr lang="en-GB" sz="4800" dirty="0" err="1">
-                <a:solidFill>
-                  <a:schemeClr val="bg1">
-                    <a:lumMod val="95000"/>
-                  </a:schemeClr>
-                </a:solidFill>
-                <a:effectLst>
-                  <a:outerShdw blurRad="38100" dist="38100" dir="2700000" algn="tl">
-                    <a:srgbClr val="000000">
-                      <a:alpha val="43137"/>
-                    </a:srgbClr>
-                  </a:outerShdw>
-                </a:effectLst>
-                <a:latin typeface="+mj-lt"/>
-                <a:ea typeface="+mj-ea"/>
-                <a:cs typeface="+mj-cs"/>
-              </a:rPr>
-              <a:t>Kube</a:t>
-            </a:r>
-            <a:endParaRPr lang="en-GB" sz="4800" dirty="0">
-              <a:solidFill>
-                <a:schemeClr val="bg1">
-                  <a:lumMod val="95000"/>
-                </a:schemeClr>
-              </a:solidFill>
-              <a:effectLst>
-                <a:outerShdw blurRad="38100" dist="38100" dir="2700000" algn="tl">
-                  <a:srgbClr val="000000">
-                    <a:alpha val="43137"/>
-                  </a:srgbClr>
-                </a:outerShdw>
-              </a:effectLst>
-              <a:latin typeface="+mj-lt"/>
-              <a:ea typeface="+mj-ea"/>
-              <a:cs typeface="+mj-cs"/>
-            </a:endParaRPr>
-          </a:p>
-          <a:p>
-            <a:pPr algn="ctr">
-              <a:spcBef>
-                <a:spcPct val="0"/>
-              </a:spcBef>
-              <a:defRPr/>
-            </a:pPr>
-            <a:r>
-              <a:rPr lang="en-GB" sz="4800" dirty="0">
-                <a:solidFill>
-                  <a:schemeClr val="bg1">
-                    <a:lumMod val="95000"/>
-                  </a:schemeClr>
-                </a:solidFill>
-                <a:effectLst>
-                  <a:outerShdw blurRad="38100" dist="38100" dir="2700000" algn="tl">
-                    <a:srgbClr val="000000">
-                      <a:alpha val="43137"/>
-                    </a:srgbClr>
-                  </a:outerShdw>
-                </a:effectLst>
-                <a:latin typeface="+mj-lt"/>
-                <a:ea typeface="+mj-ea"/>
-                <a:cs typeface="+mj-cs"/>
-              </a:rPr>
-              <a:t>3. </a:t>
-            </a:r>
-            <a:r>
-              <a:rPr lang="en-GB" sz="4800" dirty="0" err="1">
-                <a:solidFill>
-                  <a:schemeClr val="bg1">
-                    <a:lumMod val="95000"/>
-                  </a:schemeClr>
-                </a:solidFill>
-                <a:effectLst>
-                  <a:outerShdw blurRad="38100" dist="38100" dir="2700000" algn="tl">
-                    <a:srgbClr val="000000">
-                      <a:alpha val="43137"/>
-                    </a:srgbClr>
-                  </a:outerShdw>
-                </a:effectLst>
-                <a:latin typeface="+mj-lt"/>
-                <a:ea typeface="+mj-ea"/>
-                <a:cs typeface="+mj-cs"/>
-              </a:rPr>
-              <a:t>Serverless</a:t>
-            </a:r>
-            <a:r>
-              <a:rPr lang="en-GB" sz="4800" dirty="0">
-                <a:solidFill>
-                  <a:schemeClr val="bg1">
-                    <a:lumMod val="95000"/>
-                  </a:schemeClr>
-                </a:solidFill>
-                <a:effectLst>
-                  <a:outerShdw blurRad="38100" dist="38100" dir="2700000" algn="tl">
-                    <a:srgbClr val="000000">
-                      <a:alpha val="43137"/>
-                    </a:srgbClr>
-                  </a:outerShdw>
-                </a:effectLst>
-                <a:latin typeface="+mj-lt"/>
-                <a:ea typeface="+mj-ea"/>
-                <a:cs typeface="+mj-cs"/>
-              </a:rPr>
-              <a:t> with docker</a:t>
-            </a:r>
-          </a:p>
-          <a:p>
-            <a:pPr algn="ctr">
-              <a:spcBef>
-                <a:spcPct val="0"/>
-              </a:spcBef>
-              <a:defRPr/>
-            </a:pPr>
-            <a:r>
-              <a:rPr lang="en-GB" sz="4800" dirty="0">
-                <a:solidFill>
-                  <a:schemeClr val="bg1">
-                    <a:lumMod val="95000"/>
-                  </a:schemeClr>
-                </a:solidFill>
-                <a:effectLst>
-                  <a:outerShdw blurRad="38100" dist="38100" dir="2700000" algn="tl">
-                    <a:srgbClr val="000000">
-                      <a:alpha val="43137"/>
-                    </a:srgbClr>
-                  </a:outerShdw>
-                </a:effectLst>
-                <a:latin typeface="+mj-lt"/>
-                <a:ea typeface="+mj-ea"/>
-                <a:cs typeface="+mj-cs"/>
-              </a:rPr>
-              <a:t>4. ci/cd for containers</a:t>
-            </a:r>
-          </a:p>
-          <a:p>
-            <a:pPr algn="ctr">
-              <a:spcBef>
-                <a:spcPct val="0"/>
-              </a:spcBef>
-              <a:defRPr/>
-            </a:pPr>
-            <a:r>
-              <a:rPr lang="en-GB" sz="4800" dirty="0">
-                <a:solidFill>
-                  <a:schemeClr val="bg1">
-                    <a:lumMod val="95000"/>
-                  </a:schemeClr>
-                </a:solidFill>
-                <a:effectLst>
-                  <a:outerShdw blurRad="38100" dist="38100" dir="2700000" algn="tl">
-                    <a:srgbClr val="000000">
-                      <a:alpha val="43137"/>
-                    </a:srgbClr>
-                  </a:outerShdw>
-                </a:effectLst>
-                <a:latin typeface="+mj-lt"/>
-                <a:ea typeface="+mj-ea"/>
-                <a:cs typeface="+mj-cs"/>
-              </a:rPr>
-              <a:t>5. Microcontainers</a:t>
-            </a:r>
-            <a:endParaRPr lang="en-GB" sz="4800" b="1" dirty="0">
-              <a:solidFill>
-                <a:schemeClr val="bg1">
-                  <a:lumMod val="95000"/>
-                </a:schemeClr>
-              </a:solidFill>
-              <a:effectLst>
-                <a:outerShdw blurRad="38100" dist="38100" dir="2700000" algn="tl">
-                  <a:srgbClr val="000000">
-                    <a:alpha val="43137"/>
-                  </a:srgbClr>
-                </a:outerShdw>
-              </a:effectLst>
-              <a:latin typeface="+mj-lt"/>
-              <a:ea typeface="+mj-ea"/>
-              <a:cs typeface="+mj-cs"/>
-            </a:endParaRPr>
-          </a:p>
-          <a:p>
-            <a:pPr algn="ctr">
-              <a:spcBef>
-                <a:spcPct val="0"/>
-              </a:spcBef>
-            </a:pPr>
-            <a:r>
-              <a:rPr lang="en-GB" sz="3600" dirty="0">
-                <a:solidFill>
-                  <a:schemeClr val="bg1"/>
-                </a:solidFill>
-                <a:effectLst>
-                  <a:outerShdw blurRad="38100" dist="38100" dir="2700000" algn="tl">
-                    <a:srgbClr val="000000">
-                      <a:alpha val="43137"/>
-                    </a:srgbClr>
-                  </a:outerShdw>
-                </a:effectLst>
-                <a:latin typeface="+mj-lt"/>
-                <a:ea typeface="+mj-ea"/>
-                <a:cs typeface="+mj-cs"/>
-              </a:rPr>
-              <a:t>...</a:t>
-            </a:r>
-          </a:p>
-        </p:txBody>
-      </p:sp>
-      <p:sp>
-        <p:nvSpPr>
-          <p:cNvPr id="8" name="Rectangle 7"/>
-          <p:cNvSpPr/>
-          <p:nvPr/>
-        </p:nvSpPr>
-        <p:spPr>
-          <a:xfrm>
-            <a:off x="9091186" y="6525344"/>
-            <a:ext cx="1613327" cy="369332"/>
-          </a:xfrm>
-          <a:prstGeom prst="rect">
-            <a:avLst/>
-          </a:prstGeom>
-        </p:spPr>
-        <p:txBody>
-          <a:bodyPr wrap="none">
-            <a:spAutoFit/>
-          </a:bodyPr>
-          <a:lstStyle/>
-          <a:p>
-            <a:r>
-              <a:rPr lang="en-GB" b="1" dirty="0">
-                <a:solidFill>
-                  <a:schemeClr val="bg1">
-                    <a:lumMod val="95000"/>
-                  </a:schemeClr>
-                </a:solidFill>
-              </a:rPr>
-              <a:t>@</a:t>
-            </a:r>
-            <a:r>
-              <a:rPr lang="en-GB" b="1" dirty="0" err="1">
-                <a:solidFill>
-                  <a:schemeClr val="bg1">
-                    <a:lumMod val="95000"/>
-                  </a:schemeClr>
-                </a:solidFill>
-              </a:rPr>
-              <a:t>smartdevsug</a:t>
-            </a:r>
-            <a:endParaRPr lang="en-GB" dirty="0"/>
-          </a:p>
-        </p:txBody>
-      </p:sp>
-    </p:spTree>
-    <p:extLst>
-      <p:ext uri="{BB962C8B-B14F-4D97-AF65-F5344CB8AC3E}">
-        <p14:creationId xmlns:p14="http://schemas.microsoft.com/office/powerpoint/2010/main" val="1939819282"/>
-      </p:ext>
-    </p:extLst>
-  </p:cSld>
-  <p:clrMapOvr>
-    <a:masterClrMapping/>
-  </p:clrMapOvr>
-  <p:transition advClick="0" advTm="32750">
-    <p:fade/>
-  </p:transition>
-</p:sld>
-</file>
-
-<file path=ppt/slides/slide8.xml><?xml version="1.0" encoding="utf-8"?>
-<p:sld xmlns:a="http://schemas.openxmlformats.org/drawingml/2006/main" xmlns:r="http://schemas.openxmlformats.org/officeDocument/2006/relationships" xmlns:p="http://schemas.openxmlformats.org/presentationml/2006/main">
-  <p:cSld>
-    <p:spTree>
-      <p:nvGrpSpPr>
-        <p:cNvPr id="1" name=""/>
-        <p:cNvGrpSpPr/>
-        <p:nvPr/>
-      </p:nvGrpSpPr>
-      <p:grpSpPr>
-        <a:xfrm>
-          <a:off x="0" y="0"/>
-          <a:ext cx="0" cy="0"/>
-          <a:chOff x="0" y="0"/>
-          <a:chExt cx="0" cy="0"/>
-        </a:xfrm>
-      </p:grpSpPr>
-      <p:sp>
-        <p:nvSpPr>
-          <p:cNvPr id="2" name="Title 1"/>
-          <p:cNvSpPr>
-            <a:spLocks noGrp="1"/>
-          </p:cNvSpPr>
-          <p:nvPr>
-            <p:ph type="title"/>
-          </p:nvPr>
-        </p:nvSpPr>
-        <p:spPr>
-          <a:xfrm>
-            <a:off x="2124076" y="417514"/>
-            <a:ext cx="8229600" cy="1143000"/>
-          </a:xfrm>
-        </p:spPr>
-        <p:txBody>
-          <a:bodyPr/>
-          <a:lstStyle/>
-          <a:p>
-            <a:r>
-              <a:rPr lang="en-GB" dirty="0"/>
-              <a:t>Upcoming Events..</a:t>
-            </a:r>
-          </a:p>
-        </p:txBody>
-      </p:sp>
-      <p:pic>
-        <p:nvPicPr>
-          <p:cNvPr id="6" name="Picture 2" descr="http://photos1.meetupstatic.com/photos/theme_head/b/7/b/8/full_3047032.jpeg"/>
-          <p:cNvPicPr>
-            <a:picLocks noChangeAspect="1" noChangeArrowheads="1"/>
-          </p:cNvPicPr>
-          <p:nvPr/>
-        </p:nvPicPr>
-        <p:blipFill>
           <a:blip r:embed="rId2" cstate="print"/>
           <a:srcRect/>
           <a:stretch>
@@ -6318,7 +5479,7 @@
 </p:sld>
 </file>
 
-<file path=ppt/slides/slide9.xml><?xml version="1.0" encoding="utf-8"?>
+<file path=ppt/slides/slide7.xml><?xml version="1.0" encoding="utf-8"?>
 <p:sld xmlns:a="http://schemas.openxmlformats.org/drawingml/2006/main" xmlns:r="http://schemas.openxmlformats.org/officeDocument/2006/relationships" xmlns:p="http://schemas.openxmlformats.org/presentationml/2006/main" showMasterSp="0">
   <p:cSld>
     <p:spTree>
@@ -6453,7 +5614,7 @@
               </a:rPr>
             </a:br>
             <a:r>
-              <a:rPr lang="nl-NL" sz="6600" b="1" dirty="0">
+              <a:rPr lang="en-GB" sz="6600" b="1" dirty="0">
                 <a:solidFill>
                   <a:schemeClr val="bg1"/>
                 </a:solidFill>
@@ -6468,7 +5629,69 @@
                 <a:ea typeface="+mj-ea"/>
                 <a:cs typeface="+mj-cs"/>
               </a:rPr>
-              <a:t>A beginner’s overview of Docker – Ashley Poole</a:t>
+              <a:t>The Secrets of </a:t>
+            </a:r>
+            <a:r>
+              <a:rPr lang="en-GB" sz="6600" b="1" dirty="0" err="1">
+                <a:solidFill>
+                  <a:schemeClr val="bg1"/>
+                </a:solidFill>
+                <a:effectLst>
+                  <a:outerShdw blurRad="38100" dist="38100" dir="2700000" algn="tl">
+                    <a:srgbClr val="000000">
+                      <a:alpha val="43137"/>
+                    </a:srgbClr>
+                  </a:outerShdw>
+                </a:effectLst>
+                <a:latin typeface="+mj-lt"/>
+                <a:ea typeface="+mj-ea"/>
+                <a:cs typeface="+mj-cs"/>
+              </a:rPr>
+              <a:t>MonoGame</a:t>
+            </a:r>
+            <a:r>
+              <a:rPr lang="en-GB" sz="6600" b="1" dirty="0">
+                <a:solidFill>
+                  <a:schemeClr val="bg1"/>
+                </a:solidFill>
+                <a:effectLst>
+                  <a:outerShdw blurRad="38100" dist="38100" dir="2700000" algn="tl">
+                    <a:srgbClr val="000000">
+                      <a:alpha val="43137"/>
+                    </a:srgbClr>
+                  </a:outerShdw>
+                </a:effectLst>
+                <a:latin typeface="+mj-lt"/>
+                <a:ea typeface="+mj-ea"/>
+                <a:cs typeface="+mj-cs"/>
+              </a:rPr>
+              <a:t> Trump wants banned</a:t>
+            </a:r>
+          </a:p>
+          <a:p>
+            <a:pPr algn="ctr">
+              <a:spcBef>
+                <a:spcPct val="0"/>
+              </a:spcBef>
+              <a:defRPr/>
+            </a:pPr>
+            <a:r>
+              <a:rPr lang="en-GB" sz="6600" b="1">
+                <a:solidFill>
+                  <a:schemeClr val="bg1"/>
+                </a:solidFill>
+                <a:effectLst>
+                  <a:outerShdw blurRad="38100" dist="38100" dir="2700000" algn="tl">
+                    <a:srgbClr val="000000">
+                      <a:alpha val="43137"/>
+                    </a:srgbClr>
+                  </a:outerShdw>
+                </a:effectLst>
+                <a:latin typeface="+mj-lt"/>
+                <a:ea typeface="+mj-ea"/>
+                <a:cs typeface="+mj-cs"/>
+              </a:rPr>
+              <a:t>-Andy Clarke</a:t>
             </a:r>
             <a:endParaRPr lang="en-GB" sz="4400" b="1" dirty="0">
               <a:solidFill>

</xml_diff>

<commit_message>
Updated for Oct 2017
</commit_message>
<xml_diff>
--- a/WelcomePresentation-SmartDevs.pptx
+++ b/WelcomePresentation-SmartDevs.pptx
@@ -218,7 +218,7 @@
           <a:p>
             <a:fld id="{8D928C90-A2F3-492C-9840-8080881BD1C3}" type="datetimeFigureOut">
               <a:rPr lang="en-GB" smtClean="0"/>
-              <a:t>11/09/2017</a:t>
+              <a:t>09/10/2017</a:t>
             </a:fld>
             <a:endParaRPr lang="en-GB"/>
           </a:p>
@@ -939,7 +939,7 @@
             <a:fld id="{8050458D-74A9-43CA-B6DD-6642C7D97BC8}" type="datetimeFigureOut">
               <a:rPr lang="en-US" smtClean="0"/>
               <a:pPr/>
-              <a:t>9/11/2017</a:t>
+              <a:t>10/9/2017</a:t>
             </a:fld>
             <a:endParaRPr lang="en-GB"/>
           </a:p>
@@ -1106,7 +1106,7 @@
             <a:fld id="{8050458D-74A9-43CA-B6DD-6642C7D97BC8}" type="datetimeFigureOut">
               <a:rPr lang="en-US" smtClean="0"/>
               <a:pPr/>
-              <a:t>9/11/2017</a:t>
+              <a:t>10/9/2017</a:t>
             </a:fld>
             <a:endParaRPr lang="en-GB"/>
           </a:p>
@@ -1283,7 +1283,7 @@
             <a:fld id="{8050458D-74A9-43CA-B6DD-6642C7D97BC8}" type="datetimeFigureOut">
               <a:rPr lang="en-US" smtClean="0"/>
               <a:pPr/>
-              <a:t>9/11/2017</a:t>
+              <a:t>10/9/2017</a:t>
             </a:fld>
             <a:endParaRPr lang="en-GB"/>
           </a:p>
@@ -1450,7 +1450,7 @@
             <a:fld id="{8050458D-74A9-43CA-B6DD-6642C7D97BC8}" type="datetimeFigureOut">
               <a:rPr lang="en-US" smtClean="0"/>
               <a:pPr/>
-              <a:t>9/11/2017</a:t>
+              <a:t>10/9/2017</a:t>
             </a:fld>
             <a:endParaRPr lang="en-GB"/>
           </a:p>
@@ -1693,7 +1693,7 @@
             <a:fld id="{8050458D-74A9-43CA-B6DD-6642C7D97BC8}" type="datetimeFigureOut">
               <a:rPr lang="en-US" smtClean="0"/>
               <a:pPr/>
-              <a:t>9/11/2017</a:t>
+              <a:t>10/9/2017</a:t>
             </a:fld>
             <a:endParaRPr lang="en-GB"/>
           </a:p>
@@ -1978,7 +1978,7 @@
             <a:fld id="{8050458D-74A9-43CA-B6DD-6642C7D97BC8}" type="datetimeFigureOut">
               <a:rPr lang="en-US" smtClean="0"/>
               <a:pPr/>
-              <a:t>9/11/2017</a:t>
+              <a:t>10/9/2017</a:t>
             </a:fld>
             <a:endParaRPr lang="en-GB"/>
           </a:p>
@@ -2397,7 +2397,7 @@
             <a:fld id="{8050458D-74A9-43CA-B6DD-6642C7D97BC8}" type="datetimeFigureOut">
               <a:rPr lang="en-US" smtClean="0"/>
               <a:pPr/>
-              <a:t>9/11/2017</a:t>
+              <a:t>10/9/2017</a:t>
             </a:fld>
             <a:endParaRPr lang="en-GB"/>
           </a:p>
@@ -2512,7 +2512,7 @@
             <a:fld id="{8050458D-74A9-43CA-B6DD-6642C7D97BC8}" type="datetimeFigureOut">
               <a:rPr lang="en-US" smtClean="0"/>
               <a:pPr/>
-              <a:t>9/11/2017</a:t>
+              <a:t>10/9/2017</a:t>
             </a:fld>
             <a:endParaRPr lang="en-GB"/>
           </a:p>
@@ -2604,7 +2604,7 @@
             <a:fld id="{8050458D-74A9-43CA-B6DD-6642C7D97BC8}" type="datetimeFigureOut">
               <a:rPr lang="en-US" smtClean="0"/>
               <a:pPr/>
-              <a:t>9/11/2017</a:t>
+              <a:t>10/9/2017</a:t>
             </a:fld>
             <a:endParaRPr lang="en-GB"/>
           </a:p>
@@ -2878,7 +2878,7 @@
             <a:fld id="{8050458D-74A9-43CA-B6DD-6642C7D97BC8}" type="datetimeFigureOut">
               <a:rPr lang="en-US" smtClean="0"/>
               <a:pPr/>
-              <a:t>9/11/2017</a:t>
+              <a:t>10/9/2017</a:t>
             </a:fld>
             <a:endParaRPr lang="en-GB"/>
           </a:p>
@@ -3128,7 +3128,7 @@
             <a:fld id="{8050458D-74A9-43CA-B6DD-6642C7D97BC8}" type="datetimeFigureOut">
               <a:rPr lang="en-US" smtClean="0"/>
               <a:pPr/>
-              <a:t>9/11/2017</a:t>
+              <a:t>10/9/2017</a:t>
             </a:fld>
             <a:endParaRPr lang="en-GB"/>
           </a:p>
@@ -3341,7 +3341,7 @@
             <a:fld id="{8050458D-74A9-43CA-B6DD-6642C7D97BC8}" type="datetimeFigureOut">
               <a:rPr lang="en-US" smtClean="0"/>
               <a:pPr/>
-              <a:t>9/11/2017</a:t>
+              <a:t>10/9/2017</a:t>
             </a:fld>
             <a:endParaRPr lang="en-GB"/>
           </a:p>
@@ -5015,27 +5015,6 @@
                 <a:ea typeface="+mj-ea"/>
                 <a:cs typeface="+mj-cs"/>
               </a:rPr>
-              <a:t>OCT - Elastic Search and Kibana – Neil Barnwell</a:t>
-            </a:r>
-          </a:p>
-          <a:p>
-            <a:pPr algn="ctr">
-              <a:spcBef>
-                <a:spcPct val="0"/>
-              </a:spcBef>
-              <a:defRPr/>
-            </a:pPr>
-            <a:r>
-              <a:rPr lang="en-GB" sz="2800" b="1" dirty="0">
-                <a:solidFill>
-                  <a:schemeClr val="bg1">
-                    <a:lumMod val="95000"/>
-                  </a:schemeClr>
-                </a:solidFill>
-                <a:latin typeface="+mj-lt"/>
-                <a:ea typeface="+mj-ea"/>
-                <a:cs typeface="+mj-cs"/>
-              </a:rPr>
               <a:t>NOV – CI/CD for Containers and Microcontainers – Thom </a:t>
             </a:r>
             <a:r>
@@ -5128,6 +5107,97 @@
                 <a:cs typeface="+mj-cs"/>
               </a:rPr>
               <a:t>JAN – Resilient and scalable ML – Steve Spencer</a:t>
+            </a:r>
+          </a:p>
+          <a:p>
+            <a:pPr algn="ctr">
+              <a:spcBef>
+                <a:spcPct val="0"/>
+              </a:spcBef>
+              <a:defRPr/>
+            </a:pPr>
+            <a:r>
+              <a:rPr lang="en-GB" sz="2800" b="1" dirty="0">
+                <a:solidFill>
+                  <a:schemeClr val="bg1">
+                    <a:lumMod val="95000"/>
+                  </a:schemeClr>
+                </a:solidFill>
+                <a:latin typeface="+mj-lt"/>
+                <a:ea typeface="+mj-ea"/>
+                <a:cs typeface="+mj-cs"/>
+              </a:rPr>
+              <a:t>FEB – UI Testing with </a:t>
+            </a:r>
+            <a:r>
+              <a:rPr lang="en-GB" sz="2800" b="1" dirty="0" err="1">
+                <a:solidFill>
+                  <a:schemeClr val="bg1">
+                    <a:lumMod val="95000"/>
+                  </a:schemeClr>
+                </a:solidFill>
+                <a:latin typeface="+mj-lt"/>
+                <a:ea typeface="+mj-ea"/>
+                <a:cs typeface="+mj-cs"/>
+              </a:rPr>
+              <a:t>Chromeless</a:t>
+            </a:r>
+            <a:r>
+              <a:rPr lang="en-GB" sz="2800" b="1" dirty="0">
+                <a:solidFill>
+                  <a:schemeClr val="bg1">
+                    <a:lumMod val="95000"/>
+                  </a:schemeClr>
+                </a:solidFill>
+                <a:latin typeface="+mj-lt"/>
+                <a:ea typeface="+mj-ea"/>
+                <a:cs typeface="+mj-cs"/>
+              </a:rPr>
+              <a:t> – </a:t>
+            </a:r>
+            <a:r>
+              <a:rPr lang="en-GB" sz="2800" b="1" dirty="0" err="1">
+                <a:solidFill>
+                  <a:schemeClr val="bg1">
+                    <a:lumMod val="95000"/>
+                  </a:schemeClr>
+                </a:solidFill>
+                <a:latin typeface="+mj-lt"/>
+                <a:ea typeface="+mj-ea"/>
+                <a:cs typeface="+mj-cs"/>
+              </a:rPr>
+              <a:t>Rippo</a:t>
+            </a:r>
+            <a:endParaRPr lang="en-GB" sz="2800" b="1" dirty="0">
+              <a:solidFill>
+                <a:schemeClr val="bg1">
+                  <a:lumMod val="95000"/>
+                </a:schemeClr>
+              </a:solidFill>
+              <a:latin typeface="+mj-lt"/>
+              <a:ea typeface="+mj-ea"/>
+              <a:cs typeface="+mj-cs"/>
+            </a:endParaRPr>
+          </a:p>
+          <a:p>
+            <a:pPr algn="ctr">
+              <a:spcBef>
+                <a:spcPct val="0"/>
+              </a:spcBef>
+              <a:defRPr/>
+            </a:pPr>
+            <a:r>
+              <a:rPr lang="en-GB" sz="2800" b="1" dirty="0">
+                <a:solidFill>
+                  <a:schemeClr val="bg1">
+                    <a:lumMod val="95000"/>
+                  </a:schemeClr>
+                </a:solidFill>
+                <a:latin typeface="+mj-lt"/>
+                <a:ea typeface="+mj-ea"/>
+                <a:cs typeface="+mj-cs"/>
+              </a:rPr>
+              <a:t>APR - Building an End to End IoT Solution Using Pi Sensors &amp; Azure – Paul Andrew</a:t>
             </a:r>
             <a:br>
               <a:rPr lang="en-GB" sz="4000" b="1" dirty="0">
@@ -5629,10 +5699,10 @@
                 <a:ea typeface="+mj-ea"/>
                 <a:cs typeface="+mj-cs"/>
               </a:rPr>
-              <a:t>The Secrets of </a:t>
-            </a:r>
-            <a:r>
-              <a:rPr lang="en-GB" sz="6600" b="1" dirty="0" err="1">
+              <a:t>Elastic Search and Kibana</a:t>
+            </a:r>
+            <a:br>
+              <a:rPr lang="en-GB" sz="6600" b="1" dirty="0">
                 <a:solidFill>
                   <a:schemeClr val="bg1"/>
                 </a:solidFill>
@@ -5647,10 +5717,9 @@
                 <a:ea typeface="+mj-ea"/>
                 <a:cs typeface="+mj-cs"/>
               </a:rPr>
-              <a:t>MonoGame</a:t>
-            </a:r>
-            <a:r>
-              <a:rPr lang="en-GB" sz="6600" b="1" dirty="0">
+            </a:br>
+            <a:r>
+              <a:rPr lang="en-GB" sz="6600" b="1">
                 <a:solidFill>
                   <a:schemeClr val="bg1"/>
                 </a:solidFill>
@@ -5665,33 +5734,7 @@
                 <a:ea typeface="+mj-ea"/>
                 <a:cs typeface="+mj-cs"/>
               </a:rPr>
-              <a:t> Trump wants banned</a:t>
-            </a:r>
-          </a:p>
-          <a:p>
-            <a:pPr algn="ctr">
-              <a:spcBef>
-                <a:spcPct val="0"/>
-              </a:spcBef>
-              <a:defRPr/>
-            </a:pPr>
-            <a:r>
-              <a:rPr lang="en-GB" sz="6600" b="1">
-                <a:solidFill>
-                  <a:schemeClr val="bg1"/>
-                </a:solidFill>
-                <a:effectLst>
-                  <a:outerShdw blurRad="38100" dist="38100" dir="2700000" algn="tl">
-                    <a:srgbClr val="000000">
-                      <a:alpha val="43137"/>
-                    </a:srgbClr>
-                  </a:outerShdw>
-                </a:effectLst>
-                <a:latin typeface="+mj-lt"/>
-                <a:ea typeface="+mj-ea"/>
-                <a:cs typeface="+mj-cs"/>
-              </a:rPr>
-              <a:t>-Andy Clarke</a:t>
+              <a:t>Neil Barnwell</a:t>
             </a:r>
             <a:endParaRPr lang="en-GB" sz="4400" b="1" dirty="0">
               <a:solidFill>

</xml_diff>

<commit_message>
Prepared for Oct 2017 meeting
</commit_message>
<xml_diff>
--- a/WelcomePresentation-SmartDevs.pptx
+++ b/WelcomePresentation-SmartDevs.pptx
@@ -218,7 +218,7 @@
           <a:p>
             <a:fld id="{8D928C90-A2F3-492C-9840-8080881BD1C3}" type="datetimeFigureOut">
               <a:rPr lang="en-GB" smtClean="0"/>
-              <a:t>11/09/2017</a:t>
+              <a:t>13/11/2017</a:t>
             </a:fld>
             <a:endParaRPr lang="en-GB"/>
           </a:p>
@@ -939,7 +939,7 @@
             <a:fld id="{8050458D-74A9-43CA-B6DD-6642C7D97BC8}" type="datetimeFigureOut">
               <a:rPr lang="en-US" smtClean="0"/>
               <a:pPr/>
-              <a:t>9/11/2017</a:t>
+              <a:t>11/13/2017</a:t>
             </a:fld>
             <a:endParaRPr lang="en-GB"/>
           </a:p>
@@ -1106,7 +1106,7 @@
             <a:fld id="{8050458D-74A9-43CA-B6DD-6642C7D97BC8}" type="datetimeFigureOut">
               <a:rPr lang="en-US" smtClean="0"/>
               <a:pPr/>
-              <a:t>9/11/2017</a:t>
+              <a:t>11/13/2017</a:t>
             </a:fld>
             <a:endParaRPr lang="en-GB"/>
           </a:p>
@@ -1283,7 +1283,7 @@
             <a:fld id="{8050458D-74A9-43CA-B6DD-6642C7D97BC8}" type="datetimeFigureOut">
               <a:rPr lang="en-US" smtClean="0"/>
               <a:pPr/>
-              <a:t>9/11/2017</a:t>
+              <a:t>11/13/2017</a:t>
             </a:fld>
             <a:endParaRPr lang="en-GB"/>
           </a:p>
@@ -1450,7 +1450,7 @@
             <a:fld id="{8050458D-74A9-43CA-B6DD-6642C7D97BC8}" type="datetimeFigureOut">
               <a:rPr lang="en-US" smtClean="0"/>
               <a:pPr/>
-              <a:t>9/11/2017</a:t>
+              <a:t>11/13/2017</a:t>
             </a:fld>
             <a:endParaRPr lang="en-GB"/>
           </a:p>
@@ -1693,7 +1693,7 @@
             <a:fld id="{8050458D-74A9-43CA-B6DD-6642C7D97BC8}" type="datetimeFigureOut">
               <a:rPr lang="en-US" smtClean="0"/>
               <a:pPr/>
-              <a:t>9/11/2017</a:t>
+              <a:t>11/13/2017</a:t>
             </a:fld>
             <a:endParaRPr lang="en-GB"/>
           </a:p>
@@ -1978,7 +1978,7 @@
             <a:fld id="{8050458D-74A9-43CA-B6DD-6642C7D97BC8}" type="datetimeFigureOut">
               <a:rPr lang="en-US" smtClean="0"/>
               <a:pPr/>
-              <a:t>9/11/2017</a:t>
+              <a:t>11/13/2017</a:t>
             </a:fld>
             <a:endParaRPr lang="en-GB"/>
           </a:p>
@@ -2397,7 +2397,7 @@
             <a:fld id="{8050458D-74A9-43CA-B6DD-6642C7D97BC8}" type="datetimeFigureOut">
               <a:rPr lang="en-US" smtClean="0"/>
               <a:pPr/>
-              <a:t>9/11/2017</a:t>
+              <a:t>11/13/2017</a:t>
             </a:fld>
             <a:endParaRPr lang="en-GB"/>
           </a:p>
@@ -2512,7 +2512,7 @@
             <a:fld id="{8050458D-74A9-43CA-B6DD-6642C7D97BC8}" type="datetimeFigureOut">
               <a:rPr lang="en-US" smtClean="0"/>
               <a:pPr/>
-              <a:t>9/11/2017</a:t>
+              <a:t>11/13/2017</a:t>
             </a:fld>
             <a:endParaRPr lang="en-GB"/>
           </a:p>
@@ -2604,7 +2604,7 @@
             <a:fld id="{8050458D-74A9-43CA-B6DD-6642C7D97BC8}" type="datetimeFigureOut">
               <a:rPr lang="en-US" smtClean="0"/>
               <a:pPr/>
-              <a:t>9/11/2017</a:t>
+              <a:t>11/13/2017</a:t>
             </a:fld>
             <a:endParaRPr lang="en-GB"/>
           </a:p>
@@ -2878,7 +2878,7 @@
             <a:fld id="{8050458D-74A9-43CA-B6DD-6642C7D97BC8}" type="datetimeFigureOut">
               <a:rPr lang="en-US" smtClean="0"/>
               <a:pPr/>
-              <a:t>9/11/2017</a:t>
+              <a:t>11/13/2017</a:t>
             </a:fld>
             <a:endParaRPr lang="en-GB"/>
           </a:p>
@@ -3128,7 +3128,7 @@
             <a:fld id="{8050458D-74A9-43CA-B6DD-6642C7D97BC8}" type="datetimeFigureOut">
               <a:rPr lang="en-US" smtClean="0"/>
               <a:pPr/>
-              <a:t>9/11/2017</a:t>
+              <a:t>11/13/2017</a:t>
             </a:fld>
             <a:endParaRPr lang="en-GB"/>
           </a:p>
@@ -3341,7 +3341,7 @@
             <a:fld id="{8050458D-74A9-43CA-B6DD-6642C7D97BC8}" type="datetimeFigureOut">
               <a:rPr lang="en-US" smtClean="0"/>
               <a:pPr/>
-              <a:t>9/11/2017</a:t>
+              <a:t>11/13/2017</a:t>
             </a:fld>
             <a:endParaRPr lang="en-GB"/>
           </a:p>
@@ -4722,6 +4722,50 @@
                 <a:ea typeface="+mj-ea"/>
                 <a:cs typeface="+mj-cs"/>
               </a:rPr>
+              <a:t>- </a:t>
+            </a:r>
+            <a:r>
+              <a:rPr lang="en-GB" sz="3200" b="1" dirty="0" err="1">
+                <a:solidFill>
+                  <a:schemeClr val="bg1">
+                    <a:lumMod val="95000"/>
+                  </a:schemeClr>
+                </a:solidFill>
+                <a:latin typeface="+mj-lt"/>
+                <a:ea typeface="+mj-ea"/>
+                <a:cs typeface="+mj-cs"/>
+              </a:rPr>
+              <a:t>Cloudflare</a:t>
+            </a:r>
+            <a:endParaRPr lang="en-GB" sz="3200" b="1" dirty="0">
+              <a:solidFill>
+                <a:schemeClr val="bg1">
+                  <a:lumMod val="95000"/>
+                </a:schemeClr>
+              </a:solidFill>
+              <a:latin typeface="+mj-lt"/>
+              <a:ea typeface="+mj-ea"/>
+              <a:cs typeface="+mj-cs"/>
+            </a:endParaRPr>
+          </a:p>
+          <a:p>
+            <a:pPr>
+              <a:spcBef>
+                <a:spcPct val="0"/>
+              </a:spcBef>
+              <a:defRPr/>
+            </a:pPr>
+            <a:r>
+              <a:rPr lang="en-GB" sz="3200" b="1" dirty="0">
+                <a:solidFill>
+                  <a:schemeClr val="bg1">
+                    <a:lumMod val="95000"/>
+                  </a:schemeClr>
+                </a:solidFill>
+                <a:latin typeface="+mj-lt"/>
+                <a:ea typeface="+mj-ea"/>
+                <a:cs typeface="+mj-cs"/>
+              </a:rPr>
               <a:t> - </a:t>
             </a:r>
             <a:r>
@@ -5015,7 +5059,33 @@
                 <a:ea typeface="+mj-ea"/>
                 <a:cs typeface="+mj-cs"/>
               </a:rPr>
-              <a:t>OCT - Elastic Search and Kibana – Neil Barnwell</a:t>
+              <a:t>DEC – Kubernetes for </a:t>
+            </a:r>
+            <a:r>
+              <a:rPr lang="en-GB" sz="2800" b="1" dirty="0" err="1">
+                <a:solidFill>
+                  <a:schemeClr val="bg1">
+                    <a:lumMod val="95000"/>
+                  </a:schemeClr>
+                </a:solidFill>
+                <a:latin typeface="+mj-lt"/>
+                <a:ea typeface="+mj-ea"/>
+                <a:cs typeface="+mj-cs"/>
+              </a:rPr>
+              <a:t>.net</a:t>
+            </a:r>
+            <a:r>
+              <a:rPr lang="en-GB" sz="2800" b="1" dirty="0">
+                <a:solidFill>
+                  <a:schemeClr val="bg1">
+                    <a:lumMod val="95000"/>
+                  </a:schemeClr>
+                </a:solidFill>
+                <a:latin typeface="+mj-lt"/>
+                <a:ea typeface="+mj-ea"/>
+                <a:cs typeface="+mj-cs"/>
+              </a:rPr>
+              <a:t> developer – Shahid Iqbal</a:t>
             </a:r>
           </a:p>
           <a:p>
@@ -5036,10 +5106,18 @@
                 <a:ea typeface="+mj-ea"/>
                 <a:cs typeface="+mj-cs"/>
               </a:rPr>
-              <a:t>NOV – CI/CD for Containers and Microcontainers – Thom </a:t>
-            </a:r>
-            <a:r>
-              <a:rPr lang="en-GB" sz="2800" b="1" dirty="0" err="1">
+              <a:t>JAN – Resilient and scalable ML – Steve Spencer</a:t>
+            </a:r>
+          </a:p>
+          <a:p>
+            <a:pPr algn="ctr">
+              <a:spcBef>
+                <a:spcPct val="0"/>
+              </a:spcBef>
+              <a:defRPr/>
+            </a:pPr>
+            <a:r>
+              <a:rPr lang="en-GB" sz="2800" b="1" dirty="0">
                 <a:solidFill>
                   <a:schemeClr val="bg1">
                     <a:lumMod val="95000"/>
@@ -5049,7 +5127,47 @@
                 <a:ea typeface="+mj-ea"/>
                 <a:cs typeface="+mj-cs"/>
               </a:rPr>
-              <a:t>Legget</a:t>
+              <a:t>FEB – </a:t>
+            </a:r>
+            <a:r>
+              <a:rPr lang="en-GB" sz="2800" b="1" dirty="0" err="1">
+                <a:solidFill>
+                  <a:schemeClr val="bg1">
+                    <a:lumMod val="95000"/>
+                  </a:schemeClr>
+                </a:solidFill>
+                <a:latin typeface="+mj-lt"/>
+                <a:ea typeface="+mj-ea"/>
+                <a:cs typeface="+mj-cs"/>
+              </a:rPr>
+              <a:t>Ui</a:t>
+            </a:r>
+            <a:r>
+              <a:rPr lang="en-GB" sz="2800" b="1" dirty="0">
+                <a:solidFill>
+                  <a:schemeClr val="bg1">
+                    <a:lumMod val="95000"/>
+                  </a:schemeClr>
+                </a:solidFill>
+                <a:latin typeface="+mj-lt"/>
+                <a:ea typeface="+mj-ea"/>
+                <a:cs typeface="+mj-cs"/>
+              </a:rPr>
+              <a:t> Testing with Headless Chrome – ME </a:t>
+            </a:r>
+            <a:r>
+              <a:rPr lang="en-GB" sz="2800" b="1" dirty="0">
+                <a:solidFill>
+                  <a:schemeClr val="bg1">
+                    <a:lumMod val="95000"/>
+                  </a:schemeClr>
+                </a:solidFill>
+                <a:latin typeface="+mj-lt"/>
+                <a:ea typeface="+mj-ea"/>
+                <a:cs typeface="+mj-cs"/>
+                <a:sym typeface="Wingdings" panose="05000000000000000000" pitchFamily="2" charset="2"/>
+              </a:rPr>
+              <a:t></a:t>
             </a:r>
             <a:endParaRPr lang="en-GB" sz="2800" b="1" dirty="0">
               <a:solidFill>
@@ -5080,33 +5198,7 @@
                 <a:ea typeface="+mj-ea"/>
                 <a:cs typeface="+mj-cs"/>
               </a:rPr>
-              <a:t>DEC – </a:t>
-            </a:r>
-            <a:r>
-              <a:rPr lang="en-GB" sz="2800" b="1" dirty="0" err="1">
-                <a:solidFill>
-                  <a:schemeClr val="bg1">
-                    <a:lumMod val="95000"/>
-                  </a:schemeClr>
-                </a:solidFill>
-                <a:latin typeface="+mj-lt"/>
-                <a:ea typeface="+mj-ea"/>
-                <a:cs typeface="+mj-cs"/>
-              </a:rPr>
-              <a:t>Azurey</a:t>
-            </a:r>
-            <a:r>
-              <a:rPr lang="en-GB" sz="2800" b="1" dirty="0">
-                <a:solidFill>
-                  <a:schemeClr val="bg1">
-                    <a:lumMod val="95000"/>
-                  </a:schemeClr>
-                </a:solidFill>
-                <a:latin typeface="+mj-lt"/>
-                <a:ea typeface="+mj-ea"/>
-                <a:cs typeface="+mj-cs"/>
-              </a:rPr>
-              <a:t> stuff – Shahid Iqbal</a:t>
+              <a:t>Mar – d3.js – Tess Barnes</a:t>
             </a:r>
           </a:p>
           <a:p>
@@ -5127,21 +5219,9 @@
                 <a:ea typeface="+mj-ea"/>
                 <a:cs typeface="+mj-cs"/>
               </a:rPr>
-              <a:t>JAN – Resilient and scalable ML – Steve Spencer</a:t>
-            </a:r>
-            <a:br>
-              <a:rPr lang="en-GB" sz="4000" b="1" dirty="0">
-                <a:solidFill>
-                  <a:schemeClr val="bg1">
-                    <a:lumMod val="95000"/>
-                  </a:schemeClr>
-                </a:solidFill>
-                <a:latin typeface="+mj-lt"/>
-                <a:ea typeface="+mj-ea"/>
-                <a:cs typeface="+mj-cs"/>
-              </a:rPr>
-            </a:br>
-            <a:endParaRPr lang="en-GB" sz="4000" dirty="0">
+              <a:t>Apr – Building IOT end to end using Pi</a:t>
+            </a:r>
+            <a:endParaRPr lang="en-GB" sz="2800" dirty="0">
               <a:solidFill>
                 <a:schemeClr val="bg1"/>
               </a:solidFill>
@@ -5340,8 +5420,8 @@
               </a:spcBef>
               <a:defRPr/>
             </a:pPr>
-            <a:br>
-              <a:rPr lang="en-GB" sz="4800" dirty="0">
+            <a:r>
+              <a:rPr lang="en-GB" sz="4800" b="1" dirty="0">
                 <a:solidFill>
                   <a:schemeClr val="bg1">
                     <a:lumMod val="95000"/>
@@ -5358,9 +5438,10 @@
                 <a:ea typeface="+mj-ea"/>
                 <a:cs typeface="+mj-cs"/>
               </a:rPr>
-            </a:br>
-            <a:r>
-              <a:rPr lang="en-GB" sz="4800" dirty="0">
+              <a:t>Do you want to present &lt;INSERT TALK HERE&gt;?</a:t>
+            </a:r>
+            <a:br>
+              <a:rPr lang="en-GB" sz="4800" b="1" dirty="0">
                 <a:solidFill>
                   <a:schemeClr val="bg1">
                     <a:lumMod val="95000"/>
@@ -5377,7 +5458,45 @@
                 <a:ea typeface="+mj-ea"/>
                 <a:cs typeface="+mj-cs"/>
               </a:rPr>
-              <a:t>Email us. Send us a tweet</a:t>
+            </a:br>
+            <a:br>
+              <a:rPr lang="en-GB" sz="4800" dirty="0">
+                <a:solidFill>
+                  <a:schemeClr val="bg1">
+                    <a:lumMod val="95000"/>
+                  </a:schemeClr>
+                </a:solidFill>
+                <a:effectLst>
+                  <a:outerShdw blurRad="38100" dist="38100" dir="2700000" algn="tl">
+                    <a:srgbClr val="000000">
+                      <a:alpha val="43137"/>
+                    </a:srgbClr>
+                  </a:outerShdw>
+                </a:effectLst>
+                <a:latin typeface="+mj-lt"/>
+                <a:ea typeface="+mj-ea"/>
+                <a:cs typeface="+mj-cs"/>
+              </a:rPr>
+            </a:br>
+            <a:r>
+              <a:rPr lang="en-GB" sz="4800" dirty="0">
+                <a:solidFill>
+                  <a:schemeClr val="bg1">
+                    <a:lumMod val="95000"/>
+                  </a:schemeClr>
+                </a:solidFill>
+                <a:effectLst>
+                  <a:outerShdw blurRad="38100" dist="38100" dir="2700000" algn="tl">
+                    <a:srgbClr val="000000">
+                      <a:alpha val="43137"/>
+                    </a:srgbClr>
+                  </a:outerShdw>
+                </a:effectLst>
+                <a:latin typeface="+mj-lt"/>
+                <a:ea typeface="+mj-ea"/>
+                <a:cs typeface="+mj-cs"/>
+              </a:rPr>
+              <a:t>Talk to us, email us, send us a tweet, we promise not to bite! </a:t>
             </a:r>
             <a:br>
               <a:rPr lang="en-GB" sz="4800" b="1" dirty="0">
@@ -5629,7 +5748,7 @@
                 <a:ea typeface="+mj-ea"/>
                 <a:cs typeface="+mj-cs"/>
               </a:rPr>
-              <a:t>The Secrets of </a:t>
+              <a:t>NOV – CI/CD for Containers and Microcontainers – Thom </a:t>
             </a:r>
             <a:r>
               <a:rPr lang="en-GB" sz="6600" b="1" dirty="0" err="1">
@@ -5647,7 +5766,7 @@
                 <a:ea typeface="+mj-ea"/>
                 <a:cs typeface="+mj-cs"/>
               </a:rPr>
-              <a:t>MonoGame</a:t>
+              <a:t>Legget</a:t>
             </a:r>
             <a:r>
               <a:rPr lang="en-GB" sz="6600" b="1" dirty="0">
@@ -5665,41 +5784,8 @@
                 <a:ea typeface="+mj-ea"/>
                 <a:cs typeface="+mj-cs"/>
               </a:rPr>
-              <a:t> Trump wants banned</a:t>
-            </a:r>
-          </a:p>
-          <a:p>
-            <a:pPr algn="ctr">
-              <a:spcBef>
-                <a:spcPct val="0"/>
-              </a:spcBef>
-              <a:defRPr/>
-            </a:pPr>
-            <a:r>
-              <a:rPr lang="en-GB" sz="6600" b="1">
-                <a:solidFill>
-                  <a:schemeClr val="bg1"/>
-                </a:solidFill>
-                <a:effectLst>
-                  <a:outerShdw blurRad="38100" dist="38100" dir="2700000" algn="tl">
-                    <a:srgbClr val="000000">
-                      <a:alpha val="43137"/>
-                    </a:srgbClr>
-                  </a:outerShdw>
-                </a:effectLst>
-                <a:latin typeface="+mj-lt"/>
-                <a:ea typeface="+mj-ea"/>
-                <a:cs typeface="+mj-cs"/>
-              </a:rPr>
-              <a:t>-Andy Clarke</a:t>
-            </a:r>
-            <a:endParaRPr lang="en-GB" sz="4400" b="1" dirty="0">
-              <a:solidFill>
-                <a:schemeClr val="bg1">
-                  <a:lumMod val="95000"/>
-                </a:schemeClr>
-              </a:solidFill>
-            </a:endParaRPr>
+              <a:t>/Rik Gibson</a:t>
+            </a:r>
           </a:p>
         </p:txBody>
       </p:sp>

</xml_diff>

<commit_message>
Updated for Andy Clarke in April.
</commit_message>
<xml_diff>
--- a/WelcomePresentation-SmartDevs.pptx
+++ b/WelcomePresentation-SmartDevs.pptx
@@ -214,7 +214,7 @@
           <a:p>
             <a:fld id="{8D928C90-A2F3-492C-9840-8080881BD1C3}" type="datetimeFigureOut">
               <a:rPr lang="en-GB" smtClean="0"/>
-              <a:t>12/03/2018</a:t>
+              <a:t>06/04/2018</a:t>
             </a:fld>
             <a:endParaRPr lang="en-GB"/>
           </a:p>
@@ -935,7 +935,7 @@
             <a:fld id="{8050458D-74A9-43CA-B6DD-6642C7D97BC8}" type="datetimeFigureOut">
               <a:rPr lang="en-US" smtClean="0"/>
               <a:pPr/>
-              <a:t>3/12/2018</a:t>
+              <a:t>4/6/2018</a:t>
             </a:fld>
             <a:endParaRPr lang="en-GB"/>
           </a:p>
@@ -1102,7 +1102,7 @@
             <a:fld id="{8050458D-74A9-43CA-B6DD-6642C7D97BC8}" type="datetimeFigureOut">
               <a:rPr lang="en-US" smtClean="0"/>
               <a:pPr/>
-              <a:t>3/12/2018</a:t>
+              <a:t>4/6/2018</a:t>
             </a:fld>
             <a:endParaRPr lang="en-GB"/>
           </a:p>
@@ -1279,7 +1279,7 @@
             <a:fld id="{8050458D-74A9-43CA-B6DD-6642C7D97BC8}" type="datetimeFigureOut">
               <a:rPr lang="en-US" smtClean="0"/>
               <a:pPr/>
-              <a:t>3/12/2018</a:t>
+              <a:t>4/6/2018</a:t>
             </a:fld>
             <a:endParaRPr lang="en-GB"/>
           </a:p>
@@ -1446,7 +1446,7 @@
             <a:fld id="{8050458D-74A9-43CA-B6DD-6642C7D97BC8}" type="datetimeFigureOut">
               <a:rPr lang="en-US" smtClean="0"/>
               <a:pPr/>
-              <a:t>3/12/2018</a:t>
+              <a:t>4/6/2018</a:t>
             </a:fld>
             <a:endParaRPr lang="en-GB"/>
           </a:p>
@@ -1689,7 +1689,7 @@
             <a:fld id="{8050458D-74A9-43CA-B6DD-6642C7D97BC8}" type="datetimeFigureOut">
               <a:rPr lang="en-US" smtClean="0"/>
               <a:pPr/>
-              <a:t>3/12/2018</a:t>
+              <a:t>4/6/2018</a:t>
             </a:fld>
             <a:endParaRPr lang="en-GB"/>
           </a:p>
@@ -1974,7 +1974,7 @@
             <a:fld id="{8050458D-74A9-43CA-B6DD-6642C7D97BC8}" type="datetimeFigureOut">
               <a:rPr lang="en-US" smtClean="0"/>
               <a:pPr/>
-              <a:t>3/12/2018</a:t>
+              <a:t>4/6/2018</a:t>
             </a:fld>
             <a:endParaRPr lang="en-GB"/>
           </a:p>
@@ -2393,7 +2393,7 @@
             <a:fld id="{8050458D-74A9-43CA-B6DD-6642C7D97BC8}" type="datetimeFigureOut">
               <a:rPr lang="en-US" smtClean="0"/>
               <a:pPr/>
-              <a:t>3/12/2018</a:t>
+              <a:t>4/6/2018</a:t>
             </a:fld>
             <a:endParaRPr lang="en-GB"/>
           </a:p>
@@ -2508,7 +2508,7 @@
             <a:fld id="{8050458D-74A9-43CA-B6DD-6642C7D97BC8}" type="datetimeFigureOut">
               <a:rPr lang="en-US" smtClean="0"/>
               <a:pPr/>
-              <a:t>3/12/2018</a:t>
+              <a:t>4/6/2018</a:t>
             </a:fld>
             <a:endParaRPr lang="en-GB"/>
           </a:p>
@@ -2600,7 +2600,7 @@
             <a:fld id="{8050458D-74A9-43CA-B6DD-6642C7D97BC8}" type="datetimeFigureOut">
               <a:rPr lang="en-US" smtClean="0"/>
               <a:pPr/>
-              <a:t>3/12/2018</a:t>
+              <a:t>4/6/2018</a:t>
             </a:fld>
             <a:endParaRPr lang="en-GB"/>
           </a:p>
@@ -2874,7 +2874,7 @@
             <a:fld id="{8050458D-74A9-43CA-B6DD-6642C7D97BC8}" type="datetimeFigureOut">
               <a:rPr lang="en-US" smtClean="0"/>
               <a:pPr/>
-              <a:t>3/12/2018</a:t>
+              <a:t>4/6/2018</a:t>
             </a:fld>
             <a:endParaRPr lang="en-GB"/>
           </a:p>
@@ -3124,7 +3124,7 @@
             <a:fld id="{8050458D-74A9-43CA-B6DD-6642C7D97BC8}" type="datetimeFigureOut">
               <a:rPr lang="en-US" smtClean="0"/>
               <a:pPr/>
-              <a:t>3/12/2018</a:t>
+              <a:t>4/6/2018</a:t>
             </a:fld>
             <a:endParaRPr lang="en-GB"/>
           </a:p>
@@ -3337,7 +3337,7 @@
             <a:fld id="{8050458D-74A9-43CA-B6DD-6642C7D97BC8}" type="datetimeFigureOut">
               <a:rPr lang="en-US" smtClean="0"/>
               <a:pPr/>
-              <a:t>3/12/2018</a:t>
+              <a:t>4/6/2018</a:t>
             </a:fld>
             <a:endParaRPr lang="en-GB"/>
           </a:p>
@@ -4630,7 +4630,7 @@
                 <a:ea typeface="+mj-ea"/>
                 <a:cs typeface="+mj-cs"/>
               </a:rPr>
-              <a:t>- Manning x 2 FREE BOOKS!</a:t>
+              <a:t>- Manning x 2 FREE BOOKS + 36% off (ug367)!</a:t>
             </a:r>
           </a:p>
           <a:p>
@@ -4666,16 +4666,19 @@
               </a:rPr>
               <a:t>OzCode</a:t>
             </a:r>
-            <a:endParaRPr lang="en-GB" sz="3200" b="1" dirty="0">
-              <a:solidFill>
-                <a:schemeClr val="bg1">
-                  <a:lumMod val="95000"/>
-                </a:schemeClr>
-              </a:solidFill>
-              <a:latin typeface="+mj-lt"/>
-              <a:ea typeface="+mj-ea"/>
-              <a:cs typeface="+mj-cs"/>
-            </a:endParaRPr>
+            <a:r>
+              <a:rPr lang="en-GB" sz="3200" b="1" dirty="0">
+                <a:solidFill>
+                  <a:schemeClr val="bg1">
+                    <a:lumMod val="95000"/>
+                  </a:schemeClr>
+                </a:solidFill>
+                <a:latin typeface="+mj-lt"/>
+                <a:ea typeface="+mj-ea"/>
+                <a:cs typeface="+mj-cs"/>
+              </a:rPr>
+              <a:t> – email r@ryanoneill.com</a:t>
+            </a:r>
           </a:p>
           <a:p>
             <a:pPr>
@@ -4716,77 +4719,7 @@
                 <a:ea typeface="+mj-ea"/>
                 <a:cs typeface="+mj-cs"/>
               </a:rPr>
-              <a:t>- </a:t>
-            </a:r>
-            <a:r>
-              <a:rPr lang="en-GB" sz="3200" b="1" dirty="0" err="1">
-                <a:solidFill>
-                  <a:schemeClr val="bg1">
-                    <a:lumMod val="95000"/>
-                  </a:schemeClr>
-                </a:solidFill>
-                <a:latin typeface="+mj-lt"/>
-                <a:ea typeface="+mj-ea"/>
-                <a:cs typeface="+mj-cs"/>
-              </a:rPr>
-              <a:t>Cloudflare</a:t>
-            </a:r>
-            <a:endParaRPr lang="en-GB" sz="3200" b="1" dirty="0">
-              <a:solidFill>
-                <a:schemeClr val="bg1">
-                  <a:lumMod val="95000"/>
-                </a:schemeClr>
-              </a:solidFill>
-              <a:latin typeface="+mj-lt"/>
-              <a:ea typeface="+mj-ea"/>
-              <a:cs typeface="+mj-cs"/>
-            </a:endParaRPr>
-          </a:p>
-          <a:p>
-            <a:pPr>
-              <a:spcBef>
-                <a:spcPct val="0"/>
-              </a:spcBef>
-              <a:defRPr/>
-            </a:pPr>
-            <a:r>
-              <a:rPr lang="en-GB" sz="3200" b="1" dirty="0">
-                <a:solidFill>
-                  <a:schemeClr val="bg1">
-                    <a:lumMod val="95000"/>
-                  </a:schemeClr>
-                </a:solidFill>
-                <a:latin typeface="+mj-lt"/>
-                <a:ea typeface="+mj-ea"/>
-                <a:cs typeface="+mj-cs"/>
-              </a:rPr>
-              <a:t>- </a:t>
-            </a:r>
-            <a:r>
-              <a:rPr lang="en-GB" sz="3200" b="1" dirty="0" err="1">
-                <a:solidFill>
-                  <a:schemeClr val="bg1">
-                    <a:lumMod val="95000"/>
-                  </a:schemeClr>
-                </a:solidFill>
-                <a:latin typeface="+mj-lt"/>
-                <a:ea typeface="+mj-ea"/>
-                <a:cs typeface="+mj-cs"/>
-              </a:rPr>
-              <a:t>Rippo</a:t>
-            </a:r>
-            <a:r>
-              <a:rPr lang="en-GB" sz="3200" b="1" dirty="0">
-                <a:solidFill>
-                  <a:schemeClr val="bg1">
-                    <a:lumMod val="95000"/>
-                  </a:schemeClr>
-                </a:solidFill>
-                <a:latin typeface="+mj-lt"/>
-                <a:ea typeface="+mj-ea"/>
-                <a:cs typeface="+mj-cs"/>
-              </a:rPr>
-              <a:t>/Ryan – Pizza + Venue</a:t>
+              <a:t>- Rippo/Ryan – Pizza + Venue</a:t>
             </a:r>
             <a:br>
               <a:rPr lang="en-GB" sz="3200" b="1" dirty="0">
@@ -4819,7 +4752,7 @@
               <a:defRPr/>
             </a:pPr>
             <a:r>
-              <a:rPr lang="en-GB" sz="3200" b="1">
+              <a:rPr lang="en-GB" sz="3200" b="1" dirty="0">
                 <a:solidFill>
                   <a:schemeClr val="bg1">
                     <a:lumMod val="95000"/>
@@ -4829,20 +4762,7 @@
                 <a:ea typeface="+mj-ea"/>
                 <a:cs typeface="+mj-cs"/>
               </a:rPr>
-              <a:t>ALL donations </a:t>
-            </a:r>
-            <a:r>
-              <a:rPr lang="en-GB" sz="3200" b="1" dirty="0">
-                <a:solidFill>
-                  <a:schemeClr val="bg1">
-                    <a:lumMod val="95000"/>
-                  </a:schemeClr>
-                </a:solidFill>
-                <a:latin typeface="+mj-lt"/>
-                <a:ea typeface="+mj-ea"/>
-                <a:cs typeface="+mj-cs"/>
-              </a:rPr>
-              <a:t>gladly accepted!</a:t>
+              <a:t>ALL donations gladly accepted!</a:t>
             </a:r>
             <a:br>
               <a:rPr lang="en-GB" sz="6000" b="1" dirty="0">
@@ -5072,7 +4992,7 @@
                 <a:ea typeface="+mj-ea"/>
                 <a:cs typeface="+mj-cs"/>
               </a:rPr>
-              <a:t>Apr – Building IOT end to end using Pi</a:t>
+              <a:t>May – Introduction to Functional Programming – Ian Russell</a:t>
             </a:r>
           </a:p>
           <a:p>
@@ -5083,17 +5003,15 @@
               <a:defRPr/>
             </a:pPr>
             <a:r>
-              <a:rPr lang="en-GB" sz="2800" b="1" dirty="0">
-                <a:solidFill>
-                  <a:schemeClr val="bg1">
-                    <a:lumMod val="95000"/>
-                  </a:schemeClr>
+              <a:rPr lang="en-GB" sz="2800" dirty="0">
+                <a:solidFill>
+                  <a:schemeClr val="bg1"/>
                 </a:solidFill>
                 <a:latin typeface="+mj-lt"/>
                 <a:ea typeface="+mj-ea"/>
                 <a:cs typeface="+mj-cs"/>
               </a:rPr>
-              <a:t>May – Introduction to Functional Programming – Ian Russell</a:t>
+              <a:t>Jun - Spot the difference: automating visual regression testing – Viv Richards</a:t>
             </a:r>
           </a:p>
           <a:p>
@@ -5112,7 +5030,7 @@
                 <a:ea typeface="+mj-ea"/>
                 <a:cs typeface="+mj-cs"/>
               </a:rPr>
-              <a:t>Jun - Spot the difference: automating visual regression testing – Viv Richards</a:t>
+              <a:t>Jul – Kubernetes – Shahid Iqbal</a:t>
             </a:r>
           </a:p>
           <a:p>
@@ -5131,7 +5049,7 @@
                 <a:ea typeface="+mj-ea"/>
                 <a:cs typeface="+mj-cs"/>
               </a:rPr>
-              <a:t>Jul – Kubernetes – Shahid Iqbal</a:t>
+              <a:t>Aug – Ideas?</a:t>
             </a:r>
           </a:p>
         </p:txBody>
@@ -5644,7 +5562,27 @@
                   </a:schemeClr>
                 </a:solidFill>
               </a:rPr>
-              <a:t>d3.js – Tess Barnes</a:t>
+              <a:t>Unity for C# </a:t>
+            </a:r>
+            <a:r>
+              <a:rPr lang="en-GB" sz="6600" b="1" dirty="0" err="1">
+                <a:solidFill>
+                  <a:schemeClr val="bg1">
+                    <a:lumMod val="95000"/>
+                  </a:schemeClr>
+                </a:solidFill>
+              </a:rPr>
+              <a:t>Devs</a:t>
+            </a:r>
+            <a:r>
+              <a:rPr lang="en-GB" sz="6600" b="1" dirty="0">
+                <a:solidFill>
+                  <a:schemeClr val="bg1">
+                    <a:lumMod val="95000"/>
+                  </a:schemeClr>
+                </a:solidFill>
+              </a:rPr>
+              <a:t> – Andy Clarke</a:t>
             </a:r>
           </a:p>
           <a:p>

</xml_diff>